<commit_message>
Add the analog circuit diagram and key signal analysis
</commit_message>
<xml_diff>
--- a/系统设计/系统设计.pptx
+++ b/系统设计/系统设计.pptx
@@ -5,19 +5,22 @@
     <p:sldMasterId id="2147483660" r:id="rId1"/>
   </p:sldMasterIdLst>
   <p:sldIdLst>
-    <p:sldId id="486" r:id="rId2"/>
-    <p:sldId id="483" r:id="rId3"/>
-    <p:sldId id="484" r:id="rId4"/>
+    <p:sldId id="490" r:id="rId2"/>
+    <p:sldId id="486" r:id="rId3"/>
+    <p:sldId id="483" r:id="rId4"/>
     <p:sldId id="485" r:id="rId5"/>
-    <p:sldId id="490" r:id="rId6"/>
-    <p:sldId id="487" r:id="rId7"/>
-    <p:sldId id="491" r:id="rId8"/>
-    <p:sldId id="489" r:id="rId9"/>
-    <p:sldId id="494" r:id="rId10"/>
-    <p:sldId id="488" r:id="rId11"/>
-    <p:sldId id="495" r:id="rId12"/>
-    <p:sldId id="492" r:id="rId13"/>
-    <p:sldId id="493" r:id="rId14"/>
+    <p:sldId id="496" r:id="rId6"/>
+    <p:sldId id="484" r:id="rId7"/>
+    <p:sldId id="498" r:id="rId8"/>
+    <p:sldId id="487" r:id="rId9"/>
+    <p:sldId id="491" r:id="rId10"/>
+    <p:sldId id="497" r:id="rId11"/>
+    <p:sldId id="489" r:id="rId12"/>
+    <p:sldId id="494" r:id="rId13"/>
+    <p:sldId id="488" r:id="rId14"/>
+    <p:sldId id="495" r:id="rId15"/>
+    <p:sldId id="492" r:id="rId16"/>
+    <p:sldId id="493" r:id="rId17"/>
   </p:sldIdLst>
   <p:sldSz cx="12192000" cy="6858000"/>
   <p:notesSz cx="6858000" cy="9144000"/>
@@ -1183,7 +1186,7 @@
           <p:cNvPr id="2" name="标题 1">
             <a:extLst>
               <a:ext uri="{FF2B5EF4-FFF2-40B4-BE49-F238E27FC236}">
-                <a16:creationId xmlns:a16="http://schemas.microsoft.com/office/drawing/2014/main" id="{41A520CB-9AD7-458E-8AA6-736985485B48}"/>
+                <a16:creationId xmlns:a16="http://schemas.microsoft.com/office/drawing/2014/main" id="{F31013C5-F597-43C9-AD9C-A80A7D128405}"/>
               </a:ext>
             </a:extLst>
           </p:cNvPr>
@@ -1201,7 +1204,15 @@
           <a:p>
             <a:r>
               <a:rPr lang="zh-CN" altLang="en-US"/>
-              <a:t>项目背景</a:t>
+              <a:t>百度云文字识别</a:t>
+            </a:r>
+            <a:r>
+              <a:rPr lang="en-US" altLang="zh-CN"/>
+              <a:t>API</a:t>
+            </a:r>
+            <a:r>
+              <a:rPr lang="zh-CN" altLang="en-US"/>
+              <a:t>接口</a:t>
             </a:r>
           </a:p>
         </p:txBody>
@@ -1211,7 +1222,7 @@
           <p:cNvPr id="3" name="内容占位符 2">
             <a:extLst>
               <a:ext uri="{FF2B5EF4-FFF2-40B4-BE49-F238E27FC236}">
-                <a16:creationId xmlns:a16="http://schemas.microsoft.com/office/drawing/2014/main" id="{226C2695-50C2-474A-BDB8-320BBF2A3B74}"/>
+                <a16:creationId xmlns:a16="http://schemas.microsoft.com/office/drawing/2014/main" id="{3D349F08-2B07-43DD-A7C6-29D001598EFE}"/>
               </a:ext>
             </a:extLst>
           </p:cNvPr>
@@ -1229,22 +1240,62 @@
           <a:p>
             <a:r>
               <a:rPr lang="zh-CN" altLang="en-US"/>
-              <a:t>适用范围：在有</a:t>
+              <a:t>通用文字识别</a:t>
+            </a:r>
+            <a:endParaRPr lang="en-US" altLang="zh-CN"/>
+          </a:p>
+          <a:p>
+            <a:pPr lvl="1"/>
+            <a:r>
+              <a:rPr lang="zh-CN" altLang="en-US"/>
+              <a:t>高精度版、高精度含位置版、标准版、标准含位置版</a:t>
+            </a:r>
+            <a:endParaRPr lang="en-US" altLang="zh-CN"/>
+          </a:p>
+          <a:p>
+            <a:pPr lvl="1"/>
+            <a:r>
+              <a:rPr lang="zh-CN" altLang="en-US"/>
+              <a:t>含位置版可以返回文字段的位置</a:t>
+            </a:r>
+            <a:endParaRPr lang="en-US" altLang="zh-CN"/>
+          </a:p>
+          <a:p>
+            <a:r>
+              <a:rPr lang="zh-CN" altLang="en-US"/>
+              <a:t>产品价格</a:t>
+            </a:r>
+            <a:endParaRPr lang="en-US" altLang="zh-CN"/>
+          </a:p>
+          <a:p>
+            <a:pPr lvl="1"/>
+            <a:r>
+              <a:rPr lang="zh-CN" altLang="en-US"/>
+              <a:t>免费测试量：个人认证</a:t>
             </a:r>
             <a:r>
               <a:rPr lang="en-US" altLang="zh-CN"/>
-              <a:t>WIFI</a:t>
-            </a:r>
-            <a:r>
-              <a:rPr lang="zh-CN" altLang="en-US"/>
-              <a:t>的室内条件下</a:t>
+              <a:t>1000</a:t>
+            </a:r>
+            <a:r>
+              <a:rPr lang="zh-CN" altLang="en-US"/>
+              <a:t>次</a:t>
+            </a:r>
+            <a:r>
+              <a:rPr lang="en-US" altLang="zh-CN"/>
+              <a:t>/</a:t>
+            </a:r>
+            <a:r>
+              <a:rPr lang="zh-CN" altLang="en-US"/>
+              <a:t>月</a:t>
             </a:r>
             <a:endParaRPr lang="en-US" altLang="zh-CN"/>
           </a:p>
           <a:p>
-            <a:r>
-              <a:rPr lang="zh-CN" altLang="en-US"/>
-              <a:t>功能</a:t>
+            <a:pPr lvl="2"/>
+            <a:r>
+              <a:rPr lang="zh-CN" altLang="en-US"/>
+              <a:t>并不需要频繁调用，从开发到验证免费额度初步估计是足够的</a:t>
             </a:r>
             <a:endParaRPr lang="en-US" altLang="zh-CN"/>
           </a:p>
@@ -1252,16 +1303,28 @@
             <a:pPr lvl="1"/>
             <a:r>
               <a:rPr lang="zh-CN" altLang="en-US"/>
-              <a:t>辅助盲人语音读书</a:t>
+              <a:t>预付费次数包：</a:t>
+            </a:r>
+            <a:r>
+              <a:rPr lang="en-US" altLang="zh-CN"/>
+              <a:t>1</a:t>
+            </a:r>
+            <a:r>
+              <a:rPr lang="zh-CN" altLang="en-US"/>
+              <a:t>万次</a:t>
+            </a:r>
+            <a:r>
+              <a:rPr lang="en-US" altLang="zh-CN"/>
+              <a:t>/50</a:t>
+            </a:r>
+            <a:r>
+              <a:rPr lang="zh-CN" altLang="en-US"/>
+              <a:t>元</a:t>
             </a:r>
             <a:endParaRPr lang="en-US" altLang="zh-CN"/>
           </a:p>
           <a:p>
             <a:pPr lvl="1"/>
-            <a:r>
-              <a:rPr lang="zh-CN" altLang="en-US"/>
-              <a:t>服务号报警</a:t>
-            </a:r>
             <a:endParaRPr lang="en-US" altLang="zh-CN"/>
           </a:p>
         </p:txBody>
@@ -1269,7 +1332,7 @@
     </p:spTree>
     <p:extLst>
       <p:ext uri="{BB962C8B-B14F-4D97-AF65-F5344CB8AC3E}">
-        <p14:creationId xmlns:p14="http://schemas.microsoft.com/office/powerpoint/2010/main" val="4153325982"/>
+        <p14:creationId xmlns:p14="http://schemas.microsoft.com/office/powerpoint/2010/main" val="1489651938"/>
       </p:ext>
     </p:extLst>
   </p:cSld>
@@ -1301,7 +1364,7 @@
           <p:cNvPr id="2" name="标题 1">
             <a:extLst>
               <a:ext uri="{FF2B5EF4-FFF2-40B4-BE49-F238E27FC236}">
-                <a16:creationId xmlns:a16="http://schemas.microsoft.com/office/drawing/2014/main" id="{FD28CDAB-0B90-4193-AF65-A465E3F33C16}"/>
+                <a16:creationId xmlns:a16="http://schemas.microsoft.com/office/drawing/2014/main" id="{1BDF98F6-A699-48E8-97C8-C6FE38DEBFA5}"/>
               </a:ext>
             </a:extLst>
           </p:cNvPr>
@@ -1319,13 +1382,625 @@
           <a:p>
             <a:r>
               <a:rPr lang="zh-CN" altLang="en-US"/>
-              <a:t>图书位置的提示</a:t>
+              <a:t>提示图书位置移动 方案二</a:t>
             </a:r>
           </a:p>
         </p:txBody>
       </p:sp>
-      <mc:AlternateContent xmlns:mc="http://schemas.openxmlformats.org/markup-compatibility/2006">
-        <mc:Choice xmlns:a14="http://schemas.microsoft.com/office/drawing/2010/main" Requires="a14">
+      <p:pic>
+        <p:nvPicPr>
+          <p:cNvPr id="8" name="内容占位符 7">
+            <a:extLst>
+              <a:ext uri="{FF2B5EF4-FFF2-40B4-BE49-F238E27FC236}">
+                <a16:creationId xmlns:a16="http://schemas.microsoft.com/office/drawing/2014/main" id="{20CFF730-FA72-4F16-87BA-08EDE9304208}"/>
+              </a:ext>
+            </a:extLst>
+          </p:cNvPr>
+          <p:cNvPicPr>
+            <a:picLocks noGrp="1" noChangeAspect="1"/>
+          </p:cNvPicPr>
+          <p:nvPr>
+            <p:ph idx="1"/>
+          </p:nvPr>
+        </p:nvPicPr>
+        <p:blipFill>
+          <a:blip r:embed="rId2">
+            <a:extLst>
+              <a:ext uri="{28A0092B-C50C-407E-A947-70E740481C1C}">
+                <a14:useLocalDpi xmlns:a14="http://schemas.microsoft.com/office/drawing/2010/main" val="0"/>
+              </a:ext>
+            </a:extLst>
+          </a:blip>
+          <a:stretch>
+            <a:fillRect/>
+          </a:stretch>
+        </p:blipFill>
+        <p:spPr>
+          <a:xfrm>
+            <a:off x="941033" y="1642247"/>
+            <a:ext cx="9154494" cy="4960563"/>
+          </a:xfrm>
+        </p:spPr>
+      </p:pic>
+    </p:spTree>
+    <p:extLst>
+      <p:ext uri="{BB962C8B-B14F-4D97-AF65-F5344CB8AC3E}">
+        <p14:creationId xmlns:p14="http://schemas.microsoft.com/office/powerpoint/2010/main" val="4158969249"/>
+      </p:ext>
+    </p:extLst>
+  </p:cSld>
+  <p:clrMapOvr>
+    <a:masterClrMapping/>
+  </p:clrMapOvr>
+</p:sld>
+</file>
+
+<file path=ppt/slides/slide11.xml><?xml version="1.0" encoding="utf-8"?>
+<p:sld xmlns:a="http://schemas.openxmlformats.org/drawingml/2006/main" xmlns:r="http://schemas.openxmlformats.org/officeDocument/2006/relationships" xmlns:p="http://schemas.openxmlformats.org/presentationml/2006/main">
+  <p:cSld>
+    <p:spTree>
+      <p:nvGrpSpPr>
+        <p:cNvPr id="1" name=""/>
+        <p:cNvGrpSpPr/>
+        <p:nvPr/>
+      </p:nvGrpSpPr>
+      <p:grpSpPr>
+        <a:xfrm>
+          <a:off x="0" y="0"/>
+          <a:ext cx="0" cy="0"/>
+          <a:chOff x="0" y="0"/>
+          <a:chExt cx="0" cy="0"/>
+        </a:xfrm>
+      </p:grpSpPr>
+      <p:sp>
+        <p:nvSpPr>
+          <p:cNvPr id="2" name="标题 1">
+            <a:extLst>
+              <a:ext uri="{FF2B5EF4-FFF2-40B4-BE49-F238E27FC236}">
+                <a16:creationId xmlns:a16="http://schemas.microsoft.com/office/drawing/2014/main" id="{33F77340-5760-4A10-8D26-27385B15F659}"/>
+              </a:ext>
+            </a:extLst>
+          </p:cNvPr>
+          <p:cNvSpPr>
+            <a:spLocks noGrp="1"/>
+          </p:cNvSpPr>
+          <p:nvPr>
+            <p:ph type="title"/>
+          </p:nvPr>
+        </p:nvSpPr>
+        <p:spPr/>
+        <p:txBody>
+          <a:bodyPr/>
+          <a:lstStyle/>
+          <a:p>
+            <a:r>
+              <a:rPr lang="zh-CN" altLang="en-US"/>
+              <a:t>图像预处理</a:t>
+            </a:r>
+          </a:p>
+        </p:txBody>
+      </p:sp>
+      <p:sp>
+        <p:nvSpPr>
+          <p:cNvPr id="3" name="内容占位符 2">
+            <a:extLst>
+              <a:ext uri="{FF2B5EF4-FFF2-40B4-BE49-F238E27FC236}">
+                <a16:creationId xmlns:a16="http://schemas.microsoft.com/office/drawing/2014/main" id="{C896692B-FCF4-4485-9643-AEC10FED93E4}"/>
+              </a:ext>
+            </a:extLst>
+          </p:cNvPr>
+          <p:cNvSpPr>
+            <a:spLocks noGrp="1"/>
+          </p:cNvSpPr>
+          <p:nvPr>
+            <p:ph idx="1"/>
+          </p:nvPr>
+        </p:nvSpPr>
+        <p:spPr/>
+        <p:txBody>
+          <a:bodyPr>
+            <a:normAutofit fontScale="92500" lnSpcReduction="20000"/>
+          </a:bodyPr>
+          <a:lstStyle/>
+          <a:p>
+            <a:r>
+              <a:rPr lang="zh-CN" altLang="en-US"/>
+              <a:t>透视校正</a:t>
+            </a:r>
+            <a:endParaRPr lang="en-US" altLang="zh-CN"/>
+          </a:p>
+          <a:p>
+            <a:pPr lvl="1"/>
+            <a:r>
+              <a:rPr lang="zh-CN" altLang="en-US"/>
+              <a:t>方法</a:t>
+            </a:r>
+            <a:endParaRPr lang="en-US" altLang="zh-CN"/>
+          </a:p>
+          <a:p>
+            <a:pPr lvl="2"/>
+            <a:r>
+              <a:rPr lang="zh-CN" altLang="en-US"/>
+              <a:t>使用霍夫线检测的方法，计算检测出的直线平均角度</a:t>
+            </a:r>
+            <a:endParaRPr lang="en-US" altLang="zh-CN"/>
+          </a:p>
+          <a:p>
+            <a:pPr lvl="1"/>
+            <a:r>
+              <a:rPr lang="zh-CN" altLang="en-US"/>
+              <a:t>问题</a:t>
+            </a:r>
+            <a:endParaRPr lang="en-US" altLang="zh-CN"/>
+          </a:p>
+          <a:p>
+            <a:pPr lvl="2"/>
+            <a:r>
+              <a:rPr lang="zh-CN" altLang="en-US"/>
+              <a:t>效果有限</a:t>
+            </a:r>
+            <a:endParaRPr lang="en-US" altLang="zh-CN"/>
+          </a:p>
+          <a:p>
+            <a:pPr lvl="2"/>
+            <a:r>
+              <a:rPr lang="zh-CN" altLang="en-US"/>
+              <a:t>不能解决书籍完全拿反的问题</a:t>
+            </a:r>
+            <a:endParaRPr lang="en-US" altLang="zh-CN"/>
+          </a:p>
+          <a:p>
+            <a:r>
+              <a:rPr lang="zh-CN" altLang="en-US"/>
+              <a:t>清晰度的增强</a:t>
+            </a:r>
+            <a:endParaRPr lang="en-US" altLang="zh-CN"/>
+          </a:p>
+          <a:p>
+            <a:pPr lvl="1"/>
+            <a:r>
+              <a:rPr lang="zh-CN" altLang="en-US"/>
+              <a:t>方法</a:t>
+            </a:r>
+            <a:endParaRPr lang="en-US" altLang="zh-CN"/>
+          </a:p>
+          <a:p>
+            <a:pPr lvl="2"/>
+            <a:r>
+              <a:rPr lang="zh-CN" altLang="en-US"/>
+              <a:t>二值化</a:t>
+            </a:r>
+            <a:endParaRPr lang="en-US" altLang="zh-CN"/>
+          </a:p>
+          <a:p>
+            <a:pPr lvl="2"/>
+            <a:r>
+              <a:rPr lang="zh-CN" altLang="en-US"/>
+              <a:t>摄像头分辨率提高</a:t>
+            </a:r>
+            <a:endParaRPr lang="en-US" altLang="zh-CN"/>
+          </a:p>
+          <a:p>
+            <a:pPr lvl="1"/>
+            <a:r>
+              <a:rPr lang="zh-CN" altLang="en-US"/>
+              <a:t>注：</a:t>
+            </a:r>
+            <a:r>
+              <a:rPr lang="en-US" altLang="zh-CN"/>
+              <a:t>API</a:t>
+            </a:r>
+            <a:r>
+              <a:rPr lang="zh-CN" altLang="en-US"/>
+              <a:t>接口图片大小不能超过</a:t>
+            </a:r>
+            <a:r>
+              <a:rPr lang="en-US" altLang="zh-CN"/>
+              <a:t>4MB</a:t>
+            </a:r>
+            <a:r>
+              <a:rPr lang="zh-CN" altLang="en-US"/>
+              <a:t>（高清版不能超过</a:t>
+            </a:r>
+            <a:r>
+              <a:rPr lang="en-US" altLang="zh-CN"/>
+              <a:t>10MB</a:t>
+            </a:r>
+            <a:r>
+              <a:rPr lang="zh-CN" altLang="en-US"/>
+              <a:t>）</a:t>
+            </a:r>
+            <a:endParaRPr lang="en-US" altLang="zh-CN"/>
+          </a:p>
+        </p:txBody>
+      </p:sp>
+      <p:pic>
+        <p:nvPicPr>
+          <p:cNvPr id="5" name="图片 4">
+            <a:extLst>
+              <a:ext uri="{FF2B5EF4-FFF2-40B4-BE49-F238E27FC236}">
+                <a16:creationId xmlns:a16="http://schemas.microsoft.com/office/drawing/2014/main" id="{E4F8A9EA-8574-45A6-82F3-84742CA77138}"/>
+              </a:ext>
+            </a:extLst>
+          </p:cNvPr>
+          <p:cNvPicPr>
+            <a:picLocks noChangeAspect="1"/>
+          </p:cNvPicPr>
+          <p:nvPr/>
+        </p:nvPicPr>
+        <p:blipFill rotWithShape="1">
+          <a:blip r:embed="rId2">
+            <a:extLst>
+              <a:ext uri="{28A0092B-C50C-407E-A947-70E740481C1C}">
+                <a14:useLocalDpi xmlns:a14="http://schemas.microsoft.com/office/drawing/2010/main" val="0"/>
+              </a:ext>
+            </a:extLst>
+          </a:blip>
+          <a:srcRect r="21059" b="21530"/>
+          <a:stretch/>
+        </p:blipFill>
+        <p:spPr>
+          <a:xfrm>
+            <a:off x="8191395" y="1467034"/>
+            <a:ext cx="3336141" cy="4540639"/>
+          </a:xfrm>
+          <a:prstGeom prst="rect">
+            <a:avLst/>
+          </a:prstGeom>
+        </p:spPr>
+      </p:pic>
+    </p:spTree>
+    <p:extLst>
+      <p:ext uri="{BB962C8B-B14F-4D97-AF65-F5344CB8AC3E}">
+        <p14:creationId xmlns:p14="http://schemas.microsoft.com/office/powerpoint/2010/main" val="267944224"/>
+      </p:ext>
+    </p:extLst>
+  </p:cSld>
+  <p:clrMapOvr>
+    <a:masterClrMapping/>
+  </p:clrMapOvr>
+</p:sld>
+</file>
+
+<file path=ppt/slides/slide12.xml><?xml version="1.0" encoding="utf-8"?>
+<p:sld xmlns:a="http://schemas.openxmlformats.org/drawingml/2006/main" xmlns:r="http://schemas.openxmlformats.org/officeDocument/2006/relationships" xmlns:p="http://schemas.openxmlformats.org/presentationml/2006/main">
+  <p:cSld>
+    <p:spTree>
+      <p:nvGrpSpPr>
+        <p:cNvPr id="1" name=""/>
+        <p:cNvGrpSpPr/>
+        <p:nvPr/>
+      </p:nvGrpSpPr>
+      <p:grpSpPr>
+        <a:xfrm>
+          <a:off x="0" y="0"/>
+          <a:ext cx="0" cy="0"/>
+          <a:chOff x="0" y="0"/>
+          <a:chExt cx="0" cy="0"/>
+        </a:xfrm>
+      </p:grpSpPr>
+      <p:sp>
+        <p:nvSpPr>
+          <p:cNvPr id="2" name="标题 1">
+            <a:extLst>
+              <a:ext uri="{FF2B5EF4-FFF2-40B4-BE49-F238E27FC236}">
+                <a16:creationId xmlns:a16="http://schemas.microsoft.com/office/drawing/2014/main" id="{1AF6043D-7032-4087-B8D9-F54F67F1A07D}"/>
+              </a:ext>
+            </a:extLst>
+          </p:cNvPr>
+          <p:cNvSpPr>
+            <a:spLocks noGrp="1"/>
+          </p:cNvSpPr>
+          <p:nvPr>
+            <p:ph type="title"/>
+          </p:nvPr>
+        </p:nvSpPr>
+        <p:spPr/>
+        <p:txBody>
+          <a:bodyPr/>
+          <a:lstStyle/>
+          <a:p>
+            <a:r>
+              <a:rPr lang="zh-CN" altLang="en-US"/>
+              <a:t>透视校正</a:t>
+            </a:r>
+          </a:p>
+        </p:txBody>
+      </p:sp>
+      <p:sp>
+        <p:nvSpPr>
+          <p:cNvPr id="3" name="内容占位符 2">
+            <a:extLst>
+              <a:ext uri="{FF2B5EF4-FFF2-40B4-BE49-F238E27FC236}">
+                <a16:creationId xmlns:a16="http://schemas.microsoft.com/office/drawing/2014/main" id="{1BC56884-894A-4433-BC26-04198019B36D}"/>
+              </a:ext>
+            </a:extLst>
+          </p:cNvPr>
+          <p:cNvSpPr>
+            <a:spLocks noGrp="1"/>
+          </p:cNvSpPr>
+          <p:nvPr>
+            <p:ph idx="1"/>
+          </p:nvPr>
+        </p:nvSpPr>
+        <p:spPr/>
+        <p:txBody>
+          <a:bodyPr/>
+          <a:lstStyle/>
+          <a:p>
+            <a:r>
+              <a:rPr lang="zh-CN" altLang="en-US"/>
+              <a:t>关键参数</a:t>
+            </a:r>
+            <a:endParaRPr lang="en-US" altLang="zh-CN"/>
+          </a:p>
+          <a:p>
+            <a:pPr lvl="1"/>
+            <a:r>
+              <a:rPr lang="zh-CN" altLang="en-US"/>
+              <a:t>霍夫线检测阈值；图片降采样比例</a:t>
+            </a:r>
+            <a:endParaRPr lang="en-US" altLang="zh-CN"/>
+          </a:p>
+        </p:txBody>
+      </p:sp>
+      <p:pic>
+        <p:nvPicPr>
+          <p:cNvPr id="4" name="图片 3">
+            <a:extLst>
+              <a:ext uri="{FF2B5EF4-FFF2-40B4-BE49-F238E27FC236}">
+                <a16:creationId xmlns:a16="http://schemas.microsoft.com/office/drawing/2014/main" id="{E3006A6C-F781-4D9E-847D-FA9B7243E271}"/>
+              </a:ext>
+            </a:extLst>
+          </p:cNvPr>
+          <p:cNvPicPr>
+            <a:picLocks noChangeAspect="1"/>
+          </p:cNvPicPr>
+          <p:nvPr/>
+        </p:nvPicPr>
+        <p:blipFill rotWithShape="1">
+          <a:blip r:embed="rId2">
+            <a:extLst>
+              <a:ext uri="{28A0092B-C50C-407E-A947-70E740481C1C}">
+                <a14:useLocalDpi xmlns:a14="http://schemas.microsoft.com/office/drawing/2010/main" val="0"/>
+              </a:ext>
+            </a:extLst>
+          </a:blip>
+          <a:srcRect r="21059" b="21530"/>
+          <a:stretch/>
+        </p:blipFill>
+        <p:spPr>
+          <a:xfrm>
+            <a:off x="4803581" y="2639201"/>
+            <a:ext cx="2974128" cy="4047926"/>
+          </a:xfrm>
+          <a:prstGeom prst="rect">
+            <a:avLst/>
+          </a:prstGeom>
+        </p:spPr>
+      </p:pic>
+      <p:pic>
+        <p:nvPicPr>
+          <p:cNvPr id="6" name="图片 5">
+            <a:extLst>
+              <a:ext uri="{FF2B5EF4-FFF2-40B4-BE49-F238E27FC236}">
+                <a16:creationId xmlns:a16="http://schemas.microsoft.com/office/drawing/2014/main" id="{11767345-EACD-4A9D-8A59-515B615CDCEC}"/>
+              </a:ext>
+            </a:extLst>
+          </p:cNvPr>
+          <p:cNvPicPr>
+            <a:picLocks noChangeAspect="1"/>
+          </p:cNvPicPr>
+          <p:nvPr/>
+        </p:nvPicPr>
+        <p:blipFill rotWithShape="1">
+          <a:blip r:embed="rId3">
+            <a:extLst>
+              <a:ext uri="{28A0092B-C50C-407E-A947-70E740481C1C}">
+                <a14:useLocalDpi xmlns:a14="http://schemas.microsoft.com/office/drawing/2010/main" val="0"/>
+              </a:ext>
+            </a:extLst>
+          </a:blip>
+          <a:srcRect r="20263" b="20803"/>
+          <a:stretch/>
+        </p:blipFill>
+        <p:spPr>
+          <a:xfrm>
+            <a:off x="637032" y="2639201"/>
+            <a:ext cx="2976556" cy="4047926"/>
+          </a:xfrm>
+          <a:prstGeom prst="rect">
+            <a:avLst/>
+          </a:prstGeom>
+        </p:spPr>
+      </p:pic>
+      <p:sp>
+        <p:nvSpPr>
+          <p:cNvPr id="7" name="箭头: 右 6">
+            <a:extLst>
+              <a:ext uri="{FF2B5EF4-FFF2-40B4-BE49-F238E27FC236}">
+                <a16:creationId xmlns:a16="http://schemas.microsoft.com/office/drawing/2014/main" id="{05FB6801-9F00-47A5-A4FC-86444B4F87BF}"/>
+              </a:ext>
+            </a:extLst>
+          </p:cNvPr>
+          <p:cNvSpPr/>
+          <p:nvPr/>
+        </p:nvSpPr>
+        <p:spPr>
+          <a:xfrm>
+            <a:off x="3747176" y="4243526"/>
+            <a:ext cx="861134" cy="550416"/>
+          </a:xfrm>
+          <a:prstGeom prst="rightArrow">
+            <a:avLst/>
+          </a:prstGeom>
+        </p:spPr>
+        <p:style>
+          <a:lnRef idx="2">
+            <a:schemeClr val="accent1">
+              <a:shade val="50000"/>
+            </a:schemeClr>
+          </a:lnRef>
+          <a:fillRef idx="1">
+            <a:schemeClr val="accent1"/>
+          </a:fillRef>
+          <a:effectRef idx="0">
+            <a:schemeClr val="accent1"/>
+          </a:effectRef>
+          <a:fontRef idx="minor">
+            <a:schemeClr val="lt1"/>
+          </a:fontRef>
+        </p:style>
+        <p:txBody>
+          <a:bodyPr rtlCol="0" anchor="ctr"/>
+          <a:lstStyle/>
+          <a:p>
+            <a:pPr algn="ctr"/>
+            <a:endParaRPr lang="zh-CN" altLang="en-US"/>
+          </a:p>
+        </p:txBody>
+      </p:sp>
+      <p:sp>
+        <p:nvSpPr>
+          <p:cNvPr id="8" name="箭头: 右 7">
+            <a:extLst>
+              <a:ext uri="{FF2B5EF4-FFF2-40B4-BE49-F238E27FC236}">
+                <a16:creationId xmlns:a16="http://schemas.microsoft.com/office/drawing/2014/main" id="{2AB37F00-3073-41A3-84E8-6DC94B148CAA}"/>
+              </a:ext>
+            </a:extLst>
+          </p:cNvPr>
+          <p:cNvSpPr/>
+          <p:nvPr/>
+        </p:nvSpPr>
+        <p:spPr>
+          <a:xfrm>
+            <a:off x="7978200" y="4243526"/>
+            <a:ext cx="861134" cy="550416"/>
+          </a:xfrm>
+          <a:prstGeom prst="rightArrow">
+            <a:avLst/>
+          </a:prstGeom>
+        </p:spPr>
+        <p:style>
+          <a:lnRef idx="2">
+            <a:schemeClr val="accent1">
+              <a:shade val="50000"/>
+            </a:schemeClr>
+          </a:lnRef>
+          <a:fillRef idx="1">
+            <a:schemeClr val="accent1"/>
+          </a:fillRef>
+          <a:effectRef idx="0">
+            <a:schemeClr val="accent1"/>
+          </a:effectRef>
+          <a:fontRef idx="minor">
+            <a:schemeClr val="lt1"/>
+          </a:fontRef>
+        </p:style>
+        <p:txBody>
+          <a:bodyPr rtlCol="0" anchor="ctr"/>
+          <a:lstStyle/>
+          <a:p>
+            <a:pPr algn="ctr"/>
+            <a:endParaRPr lang="zh-CN" altLang="en-US"/>
+          </a:p>
+        </p:txBody>
+      </p:sp>
+      <p:pic>
+        <p:nvPicPr>
+          <p:cNvPr id="10" name="图片 9">
+            <a:extLst>
+              <a:ext uri="{FF2B5EF4-FFF2-40B4-BE49-F238E27FC236}">
+                <a16:creationId xmlns:a16="http://schemas.microsoft.com/office/drawing/2014/main" id="{B55B565C-2137-46C5-9056-DD69D4CE75CC}"/>
+              </a:ext>
+            </a:extLst>
+          </p:cNvPr>
+          <p:cNvPicPr>
+            <a:picLocks noChangeAspect="1"/>
+          </p:cNvPicPr>
+          <p:nvPr/>
+        </p:nvPicPr>
+        <p:blipFill rotWithShape="1">
+          <a:blip r:embed="rId4">
+            <a:extLst>
+              <a:ext uri="{28A0092B-C50C-407E-A947-70E740481C1C}">
+                <a14:useLocalDpi xmlns:a14="http://schemas.microsoft.com/office/drawing/2010/main" val="0"/>
+              </a:ext>
+            </a:extLst>
+          </a:blip>
+          <a:srcRect r="20462" b="20367"/>
+          <a:stretch/>
+        </p:blipFill>
+        <p:spPr>
+          <a:xfrm>
+            <a:off x="9147641" y="2639201"/>
+            <a:ext cx="2952852" cy="4047926"/>
+          </a:xfrm>
+          <a:prstGeom prst="rect">
+            <a:avLst/>
+          </a:prstGeom>
+        </p:spPr>
+      </p:pic>
+    </p:spTree>
+    <p:extLst>
+      <p:ext uri="{BB962C8B-B14F-4D97-AF65-F5344CB8AC3E}">
+        <p14:creationId xmlns:p14="http://schemas.microsoft.com/office/powerpoint/2010/main" val="2889703436"/>
+      </p:ext>
+    </p:extLst>
+  </p:cSld>
+  <p:clrMapOvr>
+    <a:masterClrMapping/>
+  </p:clrMapOvr>
+</p:sld>
+</file>
+
+<file path=ppt/slides/slide13.xml><?xml version="1.0" encoding="utf-8"?>
+<p:sld xmlns:a="http://schemas.openxmlformats.org/drawingml/2006/main" xmlns:r="http://schemas.openxmlformats.org/officeDocument/2006/relationships" xmlns:p="http://schemas.openxmlformats.org/presentationml/2006/main">
+  <p:cSld>
+    <p:spTree>
+      <p:nvGrpSpPr>
+        <p:cNvPr id="1" name=""/>
+        <p:cNvGrpSpPr/>
+        <p:nvPr/>
+      </p:nvGrpSpPr>
+      <p:grpSpPr>
+        <a:xfrm>
+          <a:off x="0" y="0"/>
+          <a:ext cx="0" cy="0"/>
+          <a:chOff x="0" y="0"/>
+          <a:chExt cx="0" cy="0"/>
+        </a:xfrm>
+      </p:grpSpPr>
+      <p:sp>
+        <p:nvSpPr>
+          <p:cNvPr id="2" name="标题 1">
+            <a:extLst>
+              <a:ext uri="{FF2B5EF4-FFF2-40B4-BE49-F238E27FC236}">
+                <a16:creationId xmlns:a16="http://schemas.microsoft.com/office/drawing/2014/main" id="{FD28CDAB-0B90-4193-AF65-A465E3F33C16}"/>
+              </a:ext>
+            </a:extLst>
+          </p:cNvPr>
+          <p:cNvSpPr>
+            <a:spLocks noGrp="1"/>
+          </p:cNvSpPr>
+          <p:nvPr>
+            <p:ph type="title"/>
+          </p:nvPr>
+        </p:nvSpPr>
+        <p:spPr/>
+        <p:txBody>
+          <a:bodyPr/>
+          <a:lstStyle/>
+          <a:p>
+            <a:r>
+              <a:rPr lang="zh-CN" altLang="en-US"/>
+              <a:t>图书位置的提示</a:t>
+            </a:r>
+          </a:p>
+        </p:txBody>
+      </p:sp>
+      <mc:AlternateContent xmlns:mc="http://schemas.openxmlformats.org/markup-compatibility/2006" xmlns:a14="http://schemas.microsoft.com/office/drawing/2010/main">
+        <mc:Choice Requires="a14">
           <p:sp>
             <p:nvSpPr>
               <p:cNvPr id="3" name="内容占位符 2">
@@ -1527,7 +2202,7 @@
             </p:txBody>
           </p:sp>
         </mc:Choice>
-        <mc:Fallback>
+        <mc:Fallback xmlns="">
           <p:sp>
             <p:nvSpPr>
               <p:cNvPr id="3" name="内容占位符 2">
@@ -1567,8 +2242,8 @@
           </p:sp>
         </mc:Fallback>
       </mc:AlternateContent>
-      <mc:AlternateContent xmlns:mc="http://schemas.openxmlformats.org/markup-compatibility/2006">
-        <mc:Choice xmlns:a14="http://schemas.microsoft.com/office/drawing/2010/main" Requires="a14">
+      <mc:AlternateContent xmlns:mc="http://schemas.openxmlformats.org/markup-compatibility/2006" xmlns:a14="http://schemas.microsoft.com/office/drawing/2010/main">
+        <mc:Choice Requires="a14">
           <p:sp>
             <p:nvSpPr>
               <p:cNvPr id="4" name="文本框 3">
@@ -1597,6 +2272,7 @@
               </a:bodyPr>
               <a:lstStyle/>
               <a:p>
+                <a:pPr/>
                 <a14:m>
                   <m:oMathPara xmlns:m="http://schemas.openxmlformats.org/officeDocument/2006/math">
                     <m:oMathParaPr>
@@ -1802,7 +2478,7 @@
             </p:txBody>
           </p:sp>
         </mc:Choice>
-        <mc:Fallback>
+        <mc:Fallback xmlns="">
           <p:sp>
             <p:nvSpPr>
               <p:cNvPr id="4" name="文本框 3">
@@ -1847,8 +2523,8 @@
           </p:sp>
         </mc:Fallback>
       </mc:AlternateContent>
-      <mc:AlternateContent xmlns:mc="http://schemas.openxmlformats.org/markup-compatibility/2006">
-        <mc:Choice xmlns:a14="http://schemas.microsoft.com/office/drawing/2010/main" Requires="a14">
+      <mc:AlternateContent xmlns:mc="http://schemas.openxmlformats.org/markup-compatibility/2006" xmlns:a14="http://schemas.microsoft.com/office/drawing/2010/main">
+        <mc:Choice Requires="a14">
           <p:sp>
             <p:nvSpPr>
               <p:cNvPr id="6" name="文本框 5">
@@ -1877,6 +2553,7 @@
               </a:bodyPr>
               <a:lstStyle/>
               <a:p>
+                <a:pPr/>
                 <a14:m>
                   <m:oMathPara xmlns:m="http://schemas.openxmlformats.org/officeDocument/2006/math">
                     <m:oMathParaPr>
@@ -2070,7 +2747,7 @@
             </p:txBody>
           </p:sp>
         </mc:Choice>
-        <mc:Fallback>
+        <mc:Fallback xmlns="">
           <p:sp>
             <p:nvSpPr>
               <p:cNvPr id="6" name="文本框 5">
@@ -2174,7 +2851,7 @@
 </p:sld>
 </file>
 
-<file path=ppt/slides/slide11.xml><?xml version="1.0" encoding="utf-8"?>
+<file path=ppt/slides/slide14.xml><?xml version="1.0" encoding="utf-8"?>
 <p:sld xmlns:a="http://schemas.openxmlformats.org/drawingml/2006/main" xmlns:r="http://schemas.openxmlformats.org/officeDocument/2006/relationships" xmlns:p="http://schemas.openxmlformats.org/presentationml/2006/main">
   <p:cSld>
     <p:spTree>
@@ -2861,7 +3538,7 @@
 </p:sld>
 </file>
 
-<file path=ppt/slides/slide12.xml><?xml version="1.0" encoding="utf-8"?>
+<file path=ppt/slides/slide15.xml><?xml version="1.0" encoding="utf-8"?>
 <p:sld xmlns:a="http://schemas.openxmlformats.org/drawingml/2006/main" xmlns:r="http://schemas.openxmlformats.org/officeDocument/2006/relationships" xmlns:p="http://schemas.openxmlformats.org/presentationml/2006/main">
   <p:cSld>
     <p:spTree>
@@ -3062,7 +3739,7 @@
 </p:sld>
 </file>
 
-<file path=ppt/slides/slide13.xml><?xml version="1.0" encoding="utf-8"?>
+<file path=ppt/slides/slide16.xml><?xml version="1.0" encoding="utf-8"?>
 <p:sld xmlns:a="http://schemas.openxmlformats.org/drawingml/2006/main" xmlns:r="http://schemas.openxmlformats.org/officeDocument/2006/relationships" xmlns:p="http://schemas.openxmlformats.org/presentationml/2006/main">
   <p:cSld>
     <p:spTree>
@@ -3522,51 +4199,10 @@
       </p:grpSpPr>
       <p:sp>
         <p:nvSpPr>
-          <p:cNvPr id="3" name="内容占位符 2">
+          <p:cNvPr id="2" name="标题 1">
             <a:extLst>
               <a:ext uri="{FF2B5EF4-FFF2-40B4-BE49-F238E27FC236}">
-                <a16:creationId xmlns:a16="http://schemas.microsoft.com/office/drawing/2014/main" id="{A1DFD568-2750-4439-A494-0F843EE655E0}"/>
-              </a:ext>
-            </a:extLst>
-          </p:cNvPr>
-          <p:cNvSpPr>
-            <a:spLocks noGrp="1"/>
-          </p:cNvSpPr>
-          <p:nvPr>
-            <p:ph idx="1"/>
-          </p:nvPr>
-        </p:nvSpPr>
-        <p:spPr>
-          <a:xfrm>
-            <a:off x="664464" y="1246219"/>
-            <a:ext cx="11375136" cy="5440908"/>
-          </a:xfrm>
-        </p:spPr>
-        <p:txBody>
-          <a:bodyPr/>
-          <a:lstStyle/>
-          <a:p>
-            <a:r>
-              <a:rPr lang="zh-CN" altLang="en-US"/>
-              <a:t>系统产品的规格书</a:t>
-            </a:r>
-            <a:endParaRPr lang="en-US" altLang="zh-CN"/>
-          </a:p>
-          <a:p>
-            <a:r>
-              <a:rPr lang="zh-CN" altLang="en-US"/>
-              <a:t>核心技术方案</a:t>
-            </a:r>
-            <a:endParaRPr lang="zh-CN" altLang="en-US" dirty="0"/>
-          </a:p>
-        </p:txBody>
-      </p:sp>
-      <p:sp>
-        <p:nvSpPr>
-          <p:cNvPr id="7" name="标题 6">
-            <a:extLst>
-              <a:ext uri="{FF2B5EF4-FFF2-40B4-BE49-F238E27FC236}">
-                <a16:creationId xmlns:a16="http://schemas.microsoft.com/office/drawing/2014/main" id="{A972D905-53B0-49B1-8B36-0425390B7D27}"/>
+                <a16:creationId xmlns:a16="http://schemas.microsoft.com/office/drawing/2014/main" id="{41A520CB-9AD7-458E-8AA6-736985485B48}"/>
               </a:ext>
             </a:extLst>
           </p:cNvPr>
@@ -3584,15 +4220,75 @@
           <a:p>
             <a:r>
               <a:rPr lang="zh-CN" altLang="en-US"/>
-              <a:t>系统级设计</a:t>
-            </a:r>
+              <a:t>项目背景</a:t>
+            </a:r>
+          </a:p>
+        </p:txBody>
+      </p:sp>
+      <p:sp>
+        <p:nvSpPr>
+          <p:cNvPr id="3" name="内容占位符 2">
+            <a:extLst>
+              <a:ext uri="{FF2B5EF4-FFF2-40B4-BE49-F238E27FC236}">
+                <a16:creationId xmlns:a16="http://schemas.microsoft.com/office/drawing/2014/main" id="{226C2695-50C2-474A-BDB8-320BBF2A3B74}"/>
+              </a:ext>
+            </a:extLst>
+          </p:cNvPr>
+          <p:cNvSpPr>
+            <a:spLocks noGrp="1"/>
+          </p:cNvSpPr>
+          <p:nvPr>
+            <p:ph idx="1"/>
+          </p:nvPr>
+        </p:nvSpPr>
+        <p:spPr/>
+        <p:txBody>
+          <a:bodyPr/>
+          <a:lstStyle/>
+          <a:p>
+            <a:r>
+              <a:rPr lang="zh-CN" altLang="en-US"/>
+              <a:t>适用范围：在有</a:t>
+            </a:r>
+            <a:r>
+              <a:rPr lang="en-US" altLang="zh-CN"/>
+              <a:t>WIFI</a:t>
+            </a:r>
+            <a:r>
+              <a:rPr lang="zh-CN" altLang="en-US"/>
+              <a:t>的室内条件下</a:t>
+            </a:r>
+            <a:endParaRPr lang="en-US" altLang="zh-CN"/>
+          </a:p>
+          <a:p>
+            <a:r>
+              <a:rPr lang="zh-CN" altLang="en-US"/>
+              <a:t>功能</a:t>
+            </a:r>
+            <a:endParaRPr lang="en-US" altLang="zh-CN"/>
+          </a:p>
+          <a:p>
+            <a:pPr lvl="1"/>
+            <a:r>
+              <a:rPr lang="zh-CN" altLang="en-US"/>
+              <a:t>辅助盲人语音读书</a:t>
+            </a:r>
+            <a:endParaRPr lang="en-US" altLang="zh-CN"/>
+          </a:p>
+          <a:p>
+            <a:pPr lvl="1"/>
+            <a:r>
+              <a:rPr lang="zh-CN" altLang="en-US"/>
+              <a:t>服务号报警</a:t>
+            </a:r>
+            <a:endParaRPr lang="en-US" altLang="zh-CN"/>
           </a:p>
         </p:txBody>
       </p:sp>
     </p:spTree>
     <p:extLst>
       <p:ext uri="{BB962C8B-B14F-4D97-AF65-F5344CB8AC3E}">
-        <p14:creationId xmlns:p14="http://schemas.microsoft.com/office/powerpoint/2010/main" val="2129292749"/>
+        <p14:creationId xmlns:p14="http://schemas.microsoft.com/office/powerpoint/2010/main" val="4153325982"/>
       </p:ext>
     </p:extLst>
   </p:cSld>
@@ -3621,10 +4317,51 @@
       </p:grpSpPr>
       <p:sp>
         <p:nvSpPr>
-          <p:cNvPr id="2" name="标题 1">
+          <p:cNvPr id="3" name="内容占位符 2">
             <a:extLst>
               <a:ext uri="{FF2B5EF4-FFF2-40B4-BE49-F238E27FC236}">
-                <a16:creationId xmlns:a16="http://schemas.microsoft.com/office/drawing/2014/main" id="{6528546D-8FB6-4CED-AF3F-F977514E6F87}"/>
+                <a16:creationId xmlns:a16="http://schemas.microsoft.com/office/drawing/2014/main" id="{A1DFD568-2750-4439-A494-0F843EE655E0}"/>
+              </a:ext>
+            </a:extLst>
+          </p:cNvPr>
+          <p:cNvSpPr>
+            <a:spLocks noGrp="1"/>
+          </p:cNvSpPr>
+          <p:nvPr>
+            <p:ph idx="1"/>
+          </p:nvPr>
+        </p:nvSpPr>
+        <p:spPr>
+          <a:xfrm>
+            <a:off x="664464" y="1246219"/>
+            <a:ext cx="11375136" cy="5440908"/>
+          </a:xfrm>
+        </p:spPr>
+        <p:txBody>
+          <a:bodyPr/>
+          <a:lstStyle/>
+          <a:p>
+            <a:r>
+              <a:rPr lang="zh-CN" altLang="en-US"/>
+              <a:t>系统产品的规格书</a:t>
+            </a:r>
+            <a:endParaRPr lang="en-US" altLang="zh-CN"/>
+          </a:p>
+          <a:p>
+            <a:r>
+              <a:rPr lang="zh-CN" altLang="en-US"/>
+              <a:t>核心技术方案</a:t>
+            </a:r>
+            <a:endParaRPr lang="zh-CN" altLang="en-US" dirty="0"/>
+          </a:p>
+        </p:txBody>
+      </p:sp>
+      <p:sp>
+        <p:nvSpPr>
+          <p:cNvPr id="7" name="标题 6">
+            <a:extLst>
+              <a:ext uri="{FF2B5EF4-FFF2-40B4-BE49-F238E27FC236}">
+                <a16:creationId xmlns:a16="http://schemas.microsoft.com/office/drawing/2014/main" id="{A972D905-53B0-49B1-8B36-0425390B7D27}"/>
               </a:ext>
             </a:extLst>
           </p:cNvPr>
@@ -3642,35 +4379,7 @@
           <a:p>
             <a:r>
               <a:rPr lang="zh-CN" altLang="en-US"/>
-              <a:t>软硬件架构级设计</a:t>
-            </a:r>
-          </a:p>
-        </p:txBody>
-      </p:sp>
-      <p:sp>
-        <p:nvSpPr>
-          <p:cNvPr id="3" name="内容占位符 2">
-            <a:extLst>
-              <a:ext uri="{FF2B5EF4-FFF2-40B4-BE49-F238E27FC236}">
-                <a16:creationId xmlns:a16="http://schemas.microsoft.com/office/drawing/2014/main" id="{A8285A90-BC7B-464D-B8C9-7AA9A8B542B2}"/>
-              </a:ext>
-            </a:extLst>
-          </p:cNvPr>
-          <p:cNvSpPr>
-            <a:spLocks noGrp="1"/>
-          </p:cNvSpPr>
-          <p:nvPr>
-            <p:ph idx="1"/>
-          </p:nvPr>
-        </p:nvSpPr>
-        <p:spPr/>
-        <p:txBody>
-          <a:bodyPr/>
-          <a:lstStyle/>
-          <a:p>
-            <a:r>
-              <a:rPr lang="zh-CN" altLang="en-US"/>
-              <a:t>软硬件模块划分</a:t>
+              <a:t>系统级设计</a:t>
             </a:r>
           </a:p>
         </p:txBody>
@@ -3678,7 +4387,7 @@
     </p:spTree>
     <p:extLst>
       <p:ext uri="{BB962C8B-B14F-4D97-AF65-F5344CB8AC3E}">
-        <p14:creationId xmlns:p14="http://schemas.microsoft.com/office/powerpoint/2010/main" val="914006586"/>
+        <p14:creationId xmlns:p14="http://schemas.microsoft.com/office/powerpoint/2010/main" val="2129292749"/>
       </p:ext>
     </p:extLst>
   </p:cSld>
@@ -3803,7 +4512,7 @@
           <p:cNvPr id="2" name="标题 1">
             <a:extLst>
               <a:ext uri="{FF2B5EF4-FFF2-40B4-BE49-F238E27FC236}">
-                <a16:creationId xmlns:a16="http://schemas.microsoft.com/office/drawing/2014/main" id="{F31013C5-F597-43C9-AD9C-A80A7D128405}"/>
+                <a16:creationId xmlns:a16="http://schemas.microsoft.com/office/drawing/2014/main" id="{0313A686-3C16-4321-99E7-21F30FC4FD98}"/>
               </a:ext>
             </a:extLst>
           </p:cNvPr>
@@ -3821,135 +4530,966 @@
           <a:p>
             <a:r>
               <a:rPr lang="zh-CN" altLang="en-US"/>
-              <a:t>百度云文字识别</a:t>
-            </a:r>
-            <a:r>
-              <a:rPr lang="en-US" altLang="zh-CN"/>
-              <a:t>API</a:t>
-            </a:r>
-            <a:r>
-              <a:rPr lang="zh-CN" altLang="en-US"/>
-              <a:t>接口</a:t>
+              <a:t>关键信号流分析</a:t>
             </a:r>
           </a:p>
         </p:txBody>
       </p:sp>
-      <p:sp>
-        <p:nvSpPr>
-          <p:cNvPr id="3" name="内容占位符 2">
+      <p:grpSp>
+        <p:nvGrpSpPr>
+          <p:cNvPr id="9" name="组合 8">
             <a:extLst>
               <a:ext uri="{FF2B5EF4-FFF2-40B4-BE49-F238E27FC236}">
-                <a16:creationId xmlns:a16="http://schemas.microsoft.com/office/drawing/2014/main" id="{3D349F08-2B07-43DD-A7C6-29D001598EFE}"/>
+                <a16:creationId xmlns:a16="http://schemas.microsoft.com/office/drawing/2014/main" id="{0185686D-3E35-4A4A-83D5-C86A45AF908C}"/>
               </a:ext>
             </a:extLst>
           </p:cNvPr>
-          <p:cNvSpPr>
-            <a:spLocks noGrp="1"/>
-          </p:cNvSpPr>
-          <p:nvPr>
-            <p:ph idx="1"/>
-          </p:nvPr>
-        </p:nvSpPr>
-        <p:spPr/>
-        <p:txBody>
-          <a:bodyPr/>
-          <a:lstStyle/>
-          <a:p>
-            <a:r>
-              <a:rPr lang="zh-CN" altLang="en-US"/>
-              <a:t>通用文字识别</a:t>
-            </a:r>
-            <a:endParaRPr lang="en-US" altLang="zh-CN"/>
-          </a:p>
-          <a:p>
-            <a:pPr lvl="1"/>
-            <a:r>
-              <a:rPr lang="zh-CN" altLang="en-US"/>
-              <a:t>高精度版、高精度含位置版、标准版、标准含位置版</a:t>
-            </a:r>
-            <a:endParaRPr lang="en-US" altLang="zh-CN"/>
-          </a:p>
-          <a:p>
-            <a:pPr lvl="1"/>
-            <a:r>
-              <a:rPr lang="zh-CN" altLang="en-US"/>
-              <a:t>含位置版可以返回文字段的位置</a:t>
-            </a:r>
-            <a:endParaRPr lang="en-US" altLang="zh-CN"/>
-          </a:p>
-          <a:p>
-            <a:r>
-              <a:rPr lang="zh-CN" altLang="en-US"/>
-              <a:t>产品价格</a:t>
-            </a:r>
-            <a:endParaRPr lang="en-US" altLang="zh-CN"/>
-          </a:p>
-          <a:p>
-            <a:pPr lvl="1"/>
-            <a:r>
-              <a:rPr lang="zh-CN" altLang="en-US"/>
-              <a:t>免费测试量：个人认证</a:t>
-            </a:r>
-            <a:r>
-              <a:rPr lang="en-US" altLang="zh-CN"/>
-              <a:t>1000</a:t>
-            </a:r>
-            <a:r>
-              <a:rPr lang="zh-CN" altLang="en-US"/>
-              <a:t>次</a:t>
-            </a:r>
-            <a:r>
-              <a:rPr lang="en-US" altLang="zh-CN"/>
-              <a:t>/</a:t>
-            </a:r>
-            <a:r>
-              <a:rPr lang="zh-CN" altLang="en-US"/>
-              <a:t>月</a:t>
-            </a:r>
-            <a:endParaRPr lang="en-US" altLang="zh-CN"/>
-          </a:p>
-          <a:p>
-            <a:pPr lvl="2"/>
-            <a:r>
-              <a:rPr lang="zh-CN" altLang="en-US"/>
-              <a:t>并不需要频繁调用，从开发到验证免费额度初步估计是足够的</a:t>
-            </a:r>
-            <a:endParaRPr lang="en-US" altLang="zh-CN"/>
-          </a:p>
-          <a:p>
-            <a:pPr lvl="1"/>
-            <a:r>
-              <a:rPr lang="zh-CN" altLang="en-US"/>
-              <a:t>预付费次数包：</a:t>
-            </a:r>
-            <a:r>
-              <a:rPr lang="en-US" altLang="zh-CN"/>
-              <a:t>1</a:t>
-            </a:r>
-            <a:r>
-              <a:rPr lang="zh-CN" altLang="en-US"/>
-              <a:t>万次</a:t>
-            </a:r>
-            <a:r>
-              <a:rPr lang="en-US" altLang="zh-CN"/>
-              <a:t>/50</a:t>
-            </a:r>
-            <a:r>
-              <a:rPr lang="zh-CN" altLang="en-US"/>
-              <a:t>元</a:t>
-            </a:r>
-            <a:endParaRPr lang="en-US" altLang="zh-CN"/>
-          </a:p>
-          <a:p>
-            <a:pPr lvl="1"/>
-            <a:endParaRPr lang="en-US" altLang="zh-CN"/>
-          </a:p>
-        </p:txBody>
-      </p:sp>
+          <p:cNvGrpSpPr/>
+          <p:nvPr/>
+        </p:nvGrpSpPr>
+        <p:grpSpPr>
+          <a:xfrm>
+            <a:off x="976542" y="1366571"/>
+            <a:ext cx="9108490" cy="5165218"/>
+            <a:chOff x="976542" y="1366571"/>
+            <a:chExt cx="9108490" cy="5165218"/>
+          </a:xfrm>
+        </p:grpSpPr>
+        <p:grpSp>
+          <p:nvGrpSpPr>
+            <p:cNvPr id="24" name="组合 23">
+              <a:extLst>
+                <a:ext uri="{FF2B5EF4-FFF2-40B4-BE49-F238E27FC236}">
+                  <a16:creationId xmlns:a16="http://schemas.microsoft.com/office/drawing/2014/main" id="{AD93A743-2F6E-450F-A99A-ADA1E47E463D}"/>
+                </a:ext>
+              </a:extLst>
+            </p:cNvPr>
+            <p:cNvGrpSpPr/>
+            <p:nvPr/>
+          </p:nvGrpSpPr>
+          <p:grpSpPr>
+            <a:xfrm>
+              <a:off x="1713389" y="1366571"/>
+              <a:ext cx="8371643" cy="3888421"/>
+              <a:chOff x="1189607" y="1447059"/>
+              <a:chExt cx="8371643" cy="4381130"/>
+            </a:xfrm>
+          </p:grpSpPr>
+          <p:sp>
+            <p:nvSpPr>
+              <p:cNvPr id="4" name="矩形 3">
+                <a:extLst>
+                  <a:ext uri="{FF2B5EF4-FFF2-40B4-BE49-F238E27FC236}">
+                    <a16:creationId xmlns:a16="http://schemas.microsoft.com/office/drawing/2014/main" id="{EDCE4B13-5387-4A51-BB0A-71D55DDF56E9}"/>
+                  </a:ext>
+                </a:extLst>
+              </p:cNvPr>
+              <p:cNvSpPr/>
+              <p:nvPr/>
+            </p:nvSpPr>
+            <p:spPr>
+              <a:xfrm>
+                <a:off x="1189607" y="1455935"/>
+                <a:ext cx="1447061" cy="674703"/>
+              </a:xfrm>
+              <a:prstGeom prst="rect">
+                <a:avLst/>
+              </a:prstGeom>
+            </p:spPr>
+            <p:style>
+              <a:lnRef idx="2">
+                <a:schemeClr val="accent1">
+                  <a:shade val="50000"/>
+                </a:schemeClr>
+              </a:lnRef>
+              <a:fillRef idx="1">
+                <a:schemeClr val="accent1"/>
+              </a:fillRef>
+              <a:effectRef idx="0">
+                <a:schemeClr val="accent1"/>
+              </a:effectRef>
+              <a:fontRef idx="minor">
+                <a:schemeClr val="lt1"/>
+              </a:fontRef>
+            </p:style>
+            <p:txBody>
+              <a:bodyPr rtlCol="0" anchor="ctr"/>
+              <a:lstStyle/>
+              <a:p>
+                <a:pPr algn="ctr"/>
+                <a:r>
+                  <a:rPr lang="zh-CN" altLang="en-US" sz="2000" b="1"/>
+                  <a:t>按键检测</a:t>
+                </a:r>
+              </a:p>
+            </p:txBody>
+          </p:sp>
+          <p:sp>
+            <p:nvSpPr>
+              <p:cNvPr id="5" name="矩形 4">
+                <a:extLst>
+                  <a:ext uri="{FF2B5EF4-FFF2-40B4-BE49-F238E27FC236}">
+                    <a16:creationId xmlns:a16="http://schemas.microsoft.com/office/drawing/2014/main" id="{4B06B1CC-7E55-4C52-9AAD-12C5020FC1CB}"/>
+                  </a:ext>
+                </a:extLst>
+              </p:cNvPr>
+              <p:cNvSpPr/>
+              <p:nvPr/>
+            </p:nvSpPr>
+            <p:spPr>
+              <a:xfrm>
+                <a:off x="1189607" y="2492802"/>
+                <a:ext cx="1447061" cy="674703"/>
+              </a:xfrm>
+              <a:prstGeom prst="rect">
+                <a:avLst/>
+              </a:prstGeom>
+            </p:spPr>
+            <p:style>
+              <a:lnRef idx="2">
+                <a:schemeClr val="accent1">
+                  <a:shade val="50000"/>
+                </a:schemeClr>
+              </a:lnRef>
+              <a:fillRef idx="1">
+                <a:schemeClr val="accent1"/>
+              </a:fillRef>
+              <a:effectRef idx="0">
+                <a:schemeClr val="accent1"/>
+              </a:effectRef>
+              <a:fontRef idx="minor">
+                <a:schemeClr val="lt1"/>
+              </a:fontRef>
+            </p:style>
+            <p:txBody>
+              <a:bodyPr rtlCol="0" anchor="ctr"/>
+              <a:lstStyle/>
+              <a:p>
+                <a:pPr algn="ctr"/>
+                <a:r>
+                  <a:rPr lang="zh-CN" altLang="en-US" sz="2000" b="1"/>
+                  <a:t>语音单元</a:t>
+                </a:r>
+              </a:p>
+            </p:txBody>
+          </p:sp>
+          <p:sp>
+            <p:nvSpPr>
+              <p:cNvPr id="12" name="矩形 11">
+                <a:extLst>
+                  <a:ext uri="{FF2B5EF4-FFF2-40B4-BE49-F238E27FC236}">
+                    <a16:creationId xmlns:a16="http://schemas.microsoft.com/office/drawing/2014/main" id="{85C504CA-E356-40ED-882B-E233B5839D9A}"/>
+                  </a:ext>
+                </a:extLst>
+              </p:cNvPr>
+              <p:cNvSpPr/>
+              <p:nvPr/>
+            </p:nvSpPr>
+            <p:spPr>
+              <a:xfrm>
+                <a:off x="4551285" y="1447059"/>
+                <a:ext cx="1544715" cy="4381130"/>
+              </a:xfrm>
+              <a:prstGeom prst="rect">
+                <a:avLst/>
+              </a:prstGeom>
+            </p:spPr>
+            <p:style>
+              <a:lnRef idx="2">
+                <a:schemeClr val="accent5">
+                  <a:shade val="50000"/>
+                </a:schemeClr>
+              </a:lnRef>
+              <a:fillRef idx="1">
+                <a:schemeClr val="accent5"/>
+              </a:fillRef>
+              <a:effectRef idx="0">
+                <a:schemeClr val="accent5"/>
+              </a:effectRef>
+              <a:fontRef idx="minor">
+                <a:schemeClr val="lt1"/>
+              </a:fontRef>
+            </p:style>
+            <p:txBody>
+              <a:bodyPr rtlCol="0" anchor="ctr"/>
+              <a:lstStyle/>
+              <a:p>
+                <a:pPr algn="ctr"/>
+                <a:r>
+                  <a:rPr lang="zh-CN" altLang="en-US" sz="2000" b="1"/>
+                  <a:t>控制单元</a:t>
+                </a:r>
+              </a:p>
+            </p:txBody>
+          </p:sp>
+          <p:sp>
+            <p:nvSpPr>
+              <p:cNvPr id="13" name="矩形 12">
+                <a:extLst>
+                  <a:ext uri="{FF2B5EF4-FFF2-40B4-BE49-F238E27FC236}">
+                    <a16:creationId xmlns:a16="http://schemas.microsoft.com/office/drawing/2014/main" id="{507D9A13-9E73-4513-B883-E00FB6031378}"/>
+                  </a:ext>
+                </a:extLst>
+              </p:cNvPr>
+              <p:cNvSpPr/>
+              <p:nvPr/>
+            </p:nvSpPr>
+            <p:spPr>
+              <a:xfrm>
+                <a:off x="1207359" y="4034904"/>
+                <a:ext cx="1447061" cy="1793285"/>
+              </a:xfrm>
+              <a:prstGeom prst="rect">
+                <a:avLst/>
+              </a:prstGeom>
+            </p:spPr>
+            <p:style>
+              <a:lnRef idx="2">
+                <a:schemeClr val="accent1">
+                  <a:shade val="50000"/>
+                </a:schemeClr>
+              </a:lnRef>
+              <a:fillRef idx="1">
+                <a:schemeClr val="accent1"/>
+              </a:fillRef>
+              <a:effectRef idx="0">
+                <a:schemeClr val="accent1"/>
+              </a:effectRef>
+              <a:fontRef idx="minor">
+                <a:schemeClr val="lt1"/>
+              </a:fontRef>
+            </p:style>
+            <p:txBody>
+              <a:bodyPr rtlCol="0" anchor="ctr"/>
+              <a:lstStyle/>
+              <a:p>
+                <a:pPr algn="ctr"/>
+                <a:r>
+                  <a:rPr lang="zh-CN" altLang="en-US" sz="2000" b="1"/>
+                  <a:t>摄像单元</a:t>
+                </a:r>
+              </a:p>
+            </p:txBody>
+          </p:sp>
+          <p:sp>
+            <p:nvSpPr>
+              <p:cNvPr id="14" name="箭头: 右 13">
+                <a:extLst>
+                  <a:ext uri="{FF2B5EF4-FFF2-40B4-BE49-F238E27FC236}">
+                    <a16:creationId xmlns:a16="http://schemas.microsoft.com/office/drawing/2014/main" id="{DB529DF1-2763-4C01-9E56-36D4FD241503}"/>
+                  </a:ext>
+                </a:extLst>
+              </p:cNvPr>
+              <p:cNvSpPr/>
+              <p:nvPr/>
+            </p:nvSpPr>
+            <p:spPr>
+              <a:xfrm>
+                <a:off x="2743200" y="1646806"/>
+                <a:ext cx="1544716" cy="279646"/>
+              </a:xfrm>
+              <a:prstGeom prst="rightArrow">
+                <a:avLst/>
+              </a:prstGeom>
+            </p:spPr>
+            <p:style>
+              <a:lnRef idx="2">
+                <a:schemeClr val="accent1">
+                  <a:shade val="50000"/>
+                </a:schemeClr>
+              </a:lnRef>
+              <a:fillRef idx="1">
+                <a:schemeClr val="accent1"/>
+              </a:fillRef>
+              <a:effectRef idx="0">
+                <a:schemeClr val="accent1"/>
+              </a:effectRef>
+              <a:fontRef idx="minor">
+                <a:schemeClr val="lt1"/>
+              </a:fontRef>
+            </p:style>
+            <p:txBody>
+              <a:bodyPr rtlCol="0" anchor="ctr"/>
+              <a:lstStyle/>
+              <a:p>
+                <a:pPr algn="ctr"/>
+                <a:endParaRPr lang="zh-CN" altLang="en-US" sz="2000" b="1"/>
+              </a:p>
+            </p:txBody>
+          </p:sp>
+          <p:sp>
+            <p:nvSpPr>
+              <p:cNvPr id="15" name="箭头: 右 14">
+                <a:extLst>
+                  <a:ext uri="{FF2B5EF4-FFF2-40B4-BE49-F238E27FC236}">
+                    <a16:creationId xmlns:a16="http://schemas.microsoft.com/office/drawing/2014/main" id="{00BD190D-0405-48E1-82A3-A165CD664BC4}"/>
+                  </a:ext>
+                </a:extLst>
+              </p:cNvPr>
+              <p:cNvSpPr/>
+              <p:nvPr/>
+            </p:nvSpPr>
+            <p:spPr>
+              <a:xfrm>
+                <a:off x="2743199" y="2690331"/>
+                <a:ext cx="1544716" cy="279646"/>
+              </a:xfrm>
+              <a:prstGeom prst="rightArrow">
+                <a:avLst/>
+              </a:prstGeom>
+            </p:spPr>
+            <p:style>
+              <a:lnRef idx="2">
+                <a:schemeClr val="accent1">
+                  <a:shade val="50000"/>
+                </a:schemeClr>
+              </a:lnRef>
+              <a:fillRef idx="1">
+                <a:schemeClr val="accent1"/>
+              </a:fillRef>
+              <a:effectRef idx="0">
+                <a:schemeClr val="accent1"/>
+              </a:effectRef>
+              <a:fontRef idx="minor">
+                <a:schemeClr val="lt1"/>
+              </a:fontRef>
+            </p:style>
+            <p:txBody>
+              <a:bodyPr rtlCol="0" anchor="ctr"/>
+              <a:lstStyle/>
+              <a:p>
+                <a:pPr algn="ctr"/>
+                <a:endParaRPr lang="zh-CN" altLang="en-US" sz="2000" b="1"/>
+              </a:p>
+            </p:txBody>
+          </p:sp>
+          <p:sp>
+            <p:nvSpPr>
+              <p:cNvPr id="16" name="箭头: 右 15">
+                <a:extLst>
+                  <a:ext uri="{FF2B5EF4-FFF2-40B4-BE49-F238E27FC236}">
+                    <a16:creationId xmlns:a16="http://schemas.microsoft.com/office/drawing/2014/main" id="{8CC8D7CF-07A9-4ECA-BCFE-6B90B71289C2}"/>
+                  </a:ext>
+                </a:extLst>
+              </p:cNvPr>
+              <p:cNvSpPr/>
+              <p:nvPr/>
+            </p:nvSpPr>
+            <p:spPr>
+              <a:xfrm>
+                <a:off x="2796466" y="4994092"/>
+                <a:ext cx="1544715" cy="279647"/>
+              </a:xfrm>
+              <a:prstGeom prst="rightArrow">
+                <a:avLst/>
+              </a:prstGeom>
+            </p:spPr>
+            <p:style>
+              <a:lnRef idx="2">
+                <a:schemeClr val="accent1">
+                  <a:shade val="50000"/>
+                </a:schemeClr>
+              </a:lnRef>
+              <a:fillRef idx="1">
+                <a:schemeClr val="accent1"/>
+              </a:fillRef>
+              <a:effectRef idx="0">
+                <a:schemeClr val="accent1"/>
+              </a:effectRef>
+              <a:fontRef idx="minor">
+                <a:schemeClr val="lt1"/>
+              </a:fontRef>
+            </p:style>
+            <p:txBody>
+              <a:bodyPr rtlCol="0" anchor="ctr"/>
+              <a:lstStyle/>
+              <a:p>
+                <a:pPr algn="ctr"/>
+                <a:endParaRPr lang="zh-CN" altLang="en-US" sz="2000" b="1"/>
+              </a:p>
+            </p:txBody>
+          </p:sp>
+          <p:sp>
+            <p:nvSpPr>
+              <p:cNvPr id="17" name="箭头: 右 16">
+                <a:extLst>
+                  <a:ext uri="{FF2B5EF4-FFF2-40B4-BE49-F238E27FC236}">
+                    <a16:creationId xmlns:a16="http://schemas.microsoft.com/office/drawing/2014/main" id="{BAA8DCAF-EAEC-45E7-BBF5-618E5D667214}"/>
+                  </a:ext>
+                </a:extLst>
+              </p:cNvPr>
+              <p:cNvSpPr/>
+              <p:nvPr/>
+            </p:nvSpPr>
+            <p:spPr>
+              <a:xfrm flipH="1">
+                <a:off x="2796466" y="4527616"/>
+                <a:ext cx="1544716" cy="279647"/>
+              </a:xfrm>
+              <a:prstGeom prst="rightArrow">
+                <a:avLst/>
+              </a:prstGeom>
+            </p:spPr>
+            <p:style>
+              <a:lnRef idx="2">
+                <a:schemeClr val="accent5">
+                  <a:shade val="50000"/>
+                </a:schemeClr>
+              </a:lnRef>
+              <a:fillRef idx="1">
+                <a:schemeClr val="accent5"/>
+              </a:fillRef>
+              <a:effectRef idx="0">
+                <a:schemeClr val="accent5"/>
+              </a:effectRef>
+              <a:fontRef idx="minor">
+                <a:schemeClr val="lt1"/>
+              </a:fontRef>
+            </p:style>
+            <p:txBody>
+              <a:bodyPr rtlCol="0" anchor="ctr"/>
+              <a:lstStyle/>
+              <a:p>
+                <a:pPr algn="ctr"/>
+                <a:endParaRPr lang="zh-CN" altLang="en-US" sz="2000" b="1"/>
+              </a:p>
+            </p:txBody>
+          </p:sp>
+          <p:sp>
+            <p:nvSpPr>
+              <p:cNvPr id="18" name="箭头: 右 17">
+                <a:extLst>
+                  <a:ext uri="{FF2B5EF4-FFF2-40B4-BE49-F238E27FC236}">
+                    <a16:creationId xmlns:a16="http://schemas.microsoft.com/office/drawing/2014/main" id="{F15C903D-11CD-4941-BCA7-4E85B7950307}"/>
+                  </a:ext>
+                </a:extLst>
+              </p:cNvPr>
+              <p:cNvSpPr/>
+              <p:nvPr/>
+            </p:nvSpPr>
+            <p:spPr>
+              <a:xfrm>
+                <a:off x="6263196" y="1977695"/>
+                <a:ext cx="1447061" cy="279647"/>
+              </a:xfrm>
+              <a:prstGeom prst="rightArrow">
+                <a:avLst/>
+              </a:prstGeom>
+            </p:spPr>
+            <p:style>
+              <a:lnRef idx="2">
+                <a:schemeClr val="accent5">
+                  <a:shade val="50000"/>
+                </a:schemeClr>
+              </a:lnRef>
+              <a:fillRef idx="1">
+                <a:schemeClr val="accent5"/>
+              </a:fillRef>
+              <a:effectRef idx="0">
+                <a:schemeClr val="accent5"/>
+              </a:effectRef>
+              <a:fontRef idx="minor">
+                <a:schemeClr val="lt1"/>
+              </a:fontRef>
+            </p:style>
+            <p:txBody>
+              <a:bodyPr rtlCol="0" anchor="ctr"/>
+              <a:lstStyle/>
+              <a:p>
+                <a:pPr algn="ctr"/>
+                <a:endParaRPr lang="zh-CN" altLang="en-US" sz="2000" b="1"/>
+              </a:p>
+            </p:txBody>
+          </p:sp>
+          <p:sp>
+            <p:nvSpPr>
+              <p:cNvPr id="19" name="矩形 18">
+                <a:extLst>
+                  <a:ext uri="{FF2B5EF4-FFF2-40B4-BE49-F238E27FC236}">
+                    <a16:creationId xmlns:a16="http://schemas.microsoft.com/office/drawing/2014/main" id="{9CBD1EEC-2039-4628-A98C-0139C976F7F8}"/>
+                  </a:ext>
+                </a:extLst>
+              </p:cNvPr>
+              <p:cNvSpPr/>
+              <p:nvPr/>
+            </p:nvSpPr>
+            <p:spPr>
+              <a:xfrm>
+                <a:off x="7902609" y="1447059"/>
+                <a:ext cx="1658641" cy="1910918"/>
+              </a:xfrm>
+              <a:prstGeom prst="rect">
+                <a:avLst/>
+              </a:prstGeom>
+            </p:spPr>
+            <p:style>
+              <a:lnRef idx="2">
+                <a:schemeClr val="accent1">
+                  <a:shade val="50000"/>
+                </a:schemeClr>
+              </a:lnRef>
+              <a:fillRef idx="1">
+                <a:schemeClr val="accent1"/>
+              </a:fillRef>
+              <a:effectRef idx="0">
+                <a:schemeClr val="accent1"/>
+              </a:effectRef>
+              <a:fontRef idx="minor">
+                <a:schemeClr val="lt1"/>
+              </a:fontRef>
+            </p:style>
+            <p:txBody>
+              <a:bodyPr rtlCol="0" anchor="ctr"/>
+              <a:lstStyle/>
+              <a:p>
+                <a:pPr algn="ctr"/>
+                <a:r>
+                  <a:rPr lang="zh-CN" altLang="en-US" sz="2000" b="1"/>
+                  <a:t>百度云</a:t>
+                </a:r>
+                <a:r>
+                  <a:rPr lang="en-US" altLang="zh-CN" sz="2000" b="1"/>
+                  <a:t>API</a:t>
+                </a:r>
+                <a:endParaRPr lang="zh-CN" altLang="en-US" sz="2000" b="1"/>
+              </a:p>
+            </p:txBody>
+          </p:sp>
+          <p:sp>
+            <p:nvSpPr>
+              <p:cNvPr id="20" name="箭头: 右 19">
+                <a:extLst>
+                  <a:ext uri="{FF2B5EF4-FFF2-40B4-BE49-F238E27FC236}">
+                    <a16:creationId xmlns:a16="http://schemas.microsoft.com/office/drawing/2014/main" id="{342BF1B7-A437-4084-9FC7-CA49E848FF25}"/>
+                  </a:ext>
+                </a:extLst>
+              </p:cNvPr>
+              <p:cNvSpPr/>
+              <p:nvPr/>
+            </p:nvSpPr>
+            <p:spPr>
+              <a:xfrm flipH="1">
+                <a:off x="6226946" y="2402518"/>
+                <a:ext cx="1544716" cy="279647"/>
+              </a:xfrm>
+              <a:prstGeom prst="rightArrow">
+                <a:avLst/>
+              </a:prstGeom>
+            </p:spPr>
+            <p:style>
+              <a:lnRef idx="2">
+                <a:schemeClr val="accent1">
+                  <a:shade val="50000"/>
+                </a:schemeClr>
+              </a:lnRef>
+              <a:fillRef idx="1">
+                <a:schemeClr val="accent1"/>
+              </a:fillRef>
+              <a:effectRef idx="0">
+                <a:schemeClr val="accent1"/>
+              </a:effectRef>
+              <a:fontRef idx="minor">
+                <a:schemeClr val="lt1"/>
+              </a:fontRef>
+            </p:style>
+            <p:txBody>
+              <a:bodyPr rtlCol="0" anchor="ctr"/>
+              <a:lstStyle/>
+              <a:p>
+                <a:pPr algn="ctr"/>
+                <a:endParaRPr lang="zh-CN" altLang="en-US" sz="2000" b="1"/>
+              </a:p>
+            </p:txBody>
+          </p:sp>
+          <p:sp>
+            <p:nvSpPr>
+              <p:cNvPr id="21" name="矩形 20">
+                <a:extLst>
+                  <a:ext uri="{FF2B5EF4-FFF2-40B4-BE49-F238E27FC236}">
+                    <a16:creationId xmlns:a16="http://schemas.microsoft.com/office/drawing/2014/main" id="{74F55602-4D49-4A54-A88C-9E10E02D8B21}"/>
+                  </a:ext>
+                </a:extLst>
+              </p:cNvPr>
+              <p:cNvSpPr/>
+              <p:nvPr/>
+            </p:nvSpPr>
+            <p:spPr>
+              <a:xfrm>
+                <a:off x="7902608" y="3917271"/>
+                <a:ext cx="1658641" cy="1910918"/>
+              </a:xfrm>
+              <a:prstGeom prst="rect">
+                <a:avLst/>
+              </a:prstGeom>
+            </p:spPr>
+            <p:style>
+              <a:lnRef idx="2">
+                <a:schemeClr val="accent1">
+                  <a:shade val="50000"/>
+                </a:schemeClr>
+              </a:lnRef>
+              <a:fillRef idx="1">
+                <a:schemeClr val="accent1"/>
+              </a:fillRef>
+              <a:effectRef idx="0">
+                <a:schemeClr val="accent1"/>
+              </a:effectRef>
+              <a:fontRef idx="minor">
+                <a:schemeClr val="lt1"/>
+              </a:fontRef>
+            </p:style>
+            <p:txBody>
+              <a:bodyPr rtlCol="0" anchor="ctr"/>
+              <a:lstStyle/>
+              <a:p>
+                <a:pPr algn="ctr"/>
+                <a:r>
+                  <a:rPr lang="zh-CN" altLang="en-US" sz="2000" b="1"/>
+                  <a:t>云端服务器</a:t>
+                </a:r>
+              </a:p>
+            </p:txBody>
+          </p:sp>
+          <p:sp>
+            <p:nvSpPr>
+              <p:cNvPr id="22" name="箭头: 右 21">
+                <a:extLst>
+                  <a:ext uri="{FF2B5EF4-FFF2-40B4-BE49-F238E27FC236}">
+                    <a16:creationId xmlns:a16="http://schemas.microsoft.com/office/drawing/2014/main" id="{EC1D61EE-962E-4E16-8FA6-1C859425B58F}"/>
+                  </a:ext>
+                </a:extLst>
+              </p:cNvPr>
+              <p:cNvSpPr/>
+              <p:nvPr/>
+            </p:nvSpPr>
+            <p:spPr>
+              <a:xfrm>
+                <a:off x="6275773" y="4542041"/>
+                <a:ext cx="1447061" cy="279647"/>
+              </a:xfrm>
+              <a:prstGeom prst="rightArrow">
+                <a:avLst/>
+              </a:prstGeom>
+            </p:spPr>
+            <p:style>
+              <a:lnRef idx="2">
+                <a:schemeClr val="accent5">
+                  <a:shade val="50000"/>
+                </a:schemeClr>
+              </a:lnRef>
+              <a:fillRef idx="1">
+                <a:schemeClr val="accent5"/>
+              </a:fillRef>
+              <a:effectRef idx="0">
+                <a:schemeClr val="accent5"/>
+              </a:effectRef>
+              <a:fontRef idx="minor">
+                <a:schemeClr val="lt1"/>
+              </a:fontRef>
+            </p:style>
+            <p:txBody>
+              <a:bodyPr rtlCol="0" anchor="ctr"/>
+              <a:lstStyle/>
+              <a:p>
+                <a:pPr algn="ctr"/>
+                <a:endParaRPr lang="zh-CN" altLang="en-US" sz="2000" b="1"/>
+              </a:p>
+            </p:txBody>
+          </p:sp>
+          <p:sp>
+            <p:nvSpPr>
+              <p:cNvPr id="23" name="箭头: 右 22">
+                <a:extLst>
+                  <a:ext uri="{FF2B5EF4-FFF2-40B4-BE49-F238E27FC236}">
+                    <a16:creationId xmlns:a16="http://schemas.microsoft.com/office/drawing/2014/main" id="{235734F2-25E6-4906-8A3D-8FA57E131979}"/>
+                  </a:ext>
+                </a:extLst>
+              </p:cNvPr>
+              <p:cNvSpPr/>
+              <p:nvPr/>
+            </p:nvSpPr>
+            <p:spPr>
+              <a:xfrm flipH="1">
+                <a:off x="6214368" y="4994092"/>
+                <a:ext cx="1544716" cy="279647"/>
+              </a:xfrm>
+              <a:prstGeom prst="rightArrow">
+                <a:avLst/>
+              </a:prstGeom>
+            </p:spPr>
+            <p:style>
+              <a:lnRef idx="2">
+                <a:schemeClr val="accent1">
+                  <a:shade val="50000"/>
+                </a:schemeClr>
+              </a:lnRef>
+              <a:fillRef idx="1">
+                <a:schemeClr val="accent1"/>
+              </a:fillRef>
+              <a:effectRef idx="0">
+                <a:schemeClr val="accent1"/>
+              </a:effectRef>
+              <a:fontRef idx="minor">
+                <a:schemeClr val="lt1"/>
+              </a:fontRef>
+            </p:style>
+            <p:txBody>
+              <a:bodyPr rtlCol="0" anchor="ctr"/>
+              <a:lstStyle/>
+              <a:p>
+                <a:pPr algn="ctr"/>
+                <a:endParaRPr lang="zh-CN" altLang="en-US" sz="2000" b="1"/>
+              </a:p>
+            </p:txBody>
+          </p:sp>
+        </p:grpSp>
+        <p:sp>
+          <p:nvSpPr>
+            <p:cNvPr id="25" name="矩形 24">
+              <a:extLst>
+                <a:ext uri="{FF2B5EF4-FFF2-40B4-BE49-F238E27FC236}">
+                  <a16:creationId xmlns:a16="http://schemas.microsoft.com/office/drawing/2014/main" id="{88E2A32C-D3F4-48D3-8ACC-7BFA5F34D0A3}"/>
+                </a:ext>
+              </a:extLst>
+            </p:cNvPr>
+            <p:cNvSpPr/>
+            <p:nvPr/>
+          </p:nvSpPr>
+          <p:spPr>
+            <a:xfrm>
+              <a:off x="1819921" y="5932964"/>
+              <a:ext cx="4799861" cy="598825"/>
+            </a:xfrm>
+            <a:prstGeom prst="rect">
+              <a:avLst/>
+            </a:prstGeom>
+          </p:spPr>
+          <p:style>
+            <a:lnRef idx="2">
+              <a:schemeClr val="accent6">
+                <a:shade val="50000"/>
+              </a:schemeClr>
+            </a:lnRef>
+            <a:fillRef idx="1">
+              <a:schemeClr val="accent6"/>
+            </a:fillRef>
+            <a:effectRef idx="0">
+              <a:schemeClr val="accent6"/>
+            </a:effectRef>
+            <a:fontRef idx="minor">
+              <a:schemeClr val="lt1"/>
+            </a:fontRef>
+          </p:style>
+          <p:txBody>
+            <a:bodyPr rtlCol="0" anchor="ctr"/>
+            <a:lstStyle/>
+            <a:p>
+              <a:pPr algn="ctr"/>
+              <a:r>
+                <a:rPr lang="zh-CN" altLang="en-US" sz="2000" b="1"/>
+                <a:t>供电模块</a:t>
+              </a:r>
+            </a:p>
+          </p:txBody>
+        </p:sp>
+        <p:sp>
+          <p:nvSpPr>
+            <p:cNvPr id="3" name="箭头: 上 2">
+              <a:extLst>
+                <a:ext uri="{FF2B5EF4-FFF2-40B4-BE49-F238E27FC236}">
+                  <a16:creationId xmlns:a16="http://schemas.microsoft.com/office/drawing/2014/main" id="{73DF88E3-AE56-45CE-8F1F-5BA0A1B965E2}"/>
+                </a:ext>
+              </a:extLst>
+            </p:cNvPr>
+            <p:cNvSpPr/>
+            <p:nvPr/>
+          </p:nvSpPr>
+          <p:spPr>
+            <a:xfrm>
+              <a:off x="5709820" y="5338745"/>
+              <a:ext cx="275208" cy="510465"/>
+            </a:xfrm>
+            <a:prstGeom prst="upArrow">
+              <a:avLst/>
+            </a:prstGeom>
+          </p:spPr>
+          <p:style>
+            <a:lnRef idx="2">
+              <a:schemeClr val="accent6">
+                <a:shade val="50000"/>
+              </a:schemeClr>
+            </a:lnRef>
+            <a:fillRef idx="1">
+              <a:schemeClr val="accent6"/>
+            </a:fillRef>
+            <a:effectRef idx="0">
+              <a:schemeClr val="accent6"/>
+            </a:effectRef>
+            <a:fontRef idx="minor">
+              <a:schemeClr val="lt1"/>
+            </a:fontRef>
+          </p:style>
+          <p:txBody>
+            <a:bodyPr rtlCol="0" anchor="ctr"/>
+            <a:lstStyle/>
+            <a:p>
+              <a:pPr algn="ctr"/>
+              <a:endParaRPr lang="zh-CN" altLang="en-US"/>
+            </a:p>
+          </p:txBody>
+        </p:sp>
+        <p:sp>
+          <p:nvSpPr>
+            <p:cNvPr id="26" name="箭头: 上 25">
+              <a:extLst>
+                <a:ext uri="{FF2B5EF4-FFF2-40B4-BE49-F238E27FC236}">
+                  <a16:creationId xmlns:a16="http://schemas.microsoft.com/office/drawing/2014/main" id="{D352E4C1-583D-4537-B5CD-68AE683E8C45}"/>
+                </a:ext>
+              </a:extLst>
+            </p:cNvPr>
+            <p:cNvSpPr/>
+            <p:nvPr/>
+          </p:nvSpPr>
+          <p:spPr>
+            <a:xfrm>
+              <a:off x="2317067" y="5338745"/>
+              <a:ext cx="275208" cy="510465"/>
+            </a:xfrm>
+            <a:prstGeom prst="upArrow">
+              <a:avLst/>
+            </a:prstGeom>
+          </p:spPr>
+          <p:style>
+            <a:lnRef idx="2">
+              <a:schemeClr val="accent6">
+                <a:shade val="50000"/>
+              </a:schemeClr>
+            </a:lnRef>
+            <a:fillRef idx="1">
+              <a:schemeClr val="accent6"/>
+            </a:fillRef>
+            <a:effectRef idx="0">
+              <a:schemeClr val="accent6"/>
+            </a:effectRef>
+            <a:fontRef idx="minor">
+              <a:schemeClr val="lt1"/>
+            </a:fontRef>
+          </p:style>
+          <p:txBody>
+            <a:bodyPr rtlCol="0" anchor="ctr"/>
+            <a:lstStyle/>
+            <a:p>
+              <a:pPr algn="ctr"/>
+              <a:endParaRPr lang="zh-CN" altLang="en-US"/>
+            </a:p>
+          </p:txBody>
+        </p:sp>
+        <p:sp>
+          <p:nvSpPr>
+            <p:cNvPr id="7" name="箭头: 圆角右 6">
+              <a:extLst>
+                <a:ext uri="{FF2B5EF4-FFF2-40B4-BE49-F238E27FC236}">
+                  <a16:creationId xmlns:a16="http://schemas.microsoft.com/office/drawing/2014/main" id="{7A83CC7E-2C18-4F37-834C-C16E28B64219}"/>
+                </a:ext>
+              </a:extLst>
+            </p:cNvPr>
+            <p:cNvSpPr/>
+            <p:nvPr/>
+          </p:nvSpPr>
+          <p:spPr>
+            <a:xfrm>
+              <a:off x="976542" y="2462775"/>
+              <a:ext cx="676183" cy="3759883"/>
+            </a:xfrm>
+            <a:prstGeom prst="bentArrow">
+              <a:avLst>
+                <a:gd name="adj1" fmla="val 20181"/>
+                <a:gd name="adj2" fmla="val 25000"/>
+                <a:gd name="adj3" fmla="val 25000"/>
+                <a:gd name="adj4" fmla="val 43750"/>
+              </a:avLst>
+            </a:prstGeom>
+          </p:spPr>
+          <p:style>
+            <a:lnRef idx="2">
+              <a:schemeClr val="accent6">
+                <a:shade val="50000"/>
+              </a:schemeClr>
+            </a:lnRef>
+            <a:fillRef idx="1">
+              <a:schemeClr val="accent6"/>
+            </a:fillRef>
+            <a:effectRef idx="0">
+              <a:schemeClr val="accent6"/>
+            </a:effectRef>
+            <a:fontRef idx="minor">
+              <a:schemeClr val="lt1"/>
+            </a:fontRef>
+          </p:style>
+          <p:txBody>
+            <a:bodyPr rtlCol="0" anchor="ctr"/>
+            <a:lstStyle/>
+            <a:p>
+              <a:pPr algn="ctr"/>
+              <a:endParaRPr lang="zh-CN" altLang="en-US">
+                <a:solidFill>
+                  <a:schemeClr val="tx1"/>
+                </a:solidFill>
+              </a:endParaRPr>
+            </a:p>
+          </p:txBody>
+        </p:sp>
+        <p:sp>
+          <p:nvSpPr>
+            <p:cNvPr id="8" name="矩形 7">
+              <a:extLst>
+                <a:ext uri="{FF2B5EF4-FFF2-40B4-BE49-F238E27FC236}">
+                  <a16:creationId xmlns:a16="http://schemas.microsoft.com/office/drawing/2014/main" id="{F6988291-B7C7-44CA-9D48-A58D6B27109B}"/>
+                </a:ext>
+              </a:extLst>
+            </p:cNvPr>
+            <p:cNvSpPr/>
+            <p:nvPr/>
+          </p:nvSpPr>
+          <p:spPr>
+            <a:xfrm>
+              <a:off x="976542" y="6108586"/>
+              <a:ext cx="754600" cy="114072"/>
+            </a:xfrm>
+            <a:prstGeom prst="rect">
+              <a:avLst/>
+            </a:prstGeom>
+          </p:spPr>
+          <p:style>
+            <a:lnRef idx="2">
+              <a:schemeClr val="accent6">
+                <a:shade val="50000"/>
+              </a:schemeClr>
+            </a:lnRef>
+            <a:fillRef idx="1">
+              <a:schemeClr val="accent6"/>
+            </a:fillRef>
+            <a:effectRef idx="0">
+              <a:schemeClr val="accent6"/>
+            </a:effectRef>
+            <a:fontRef idx="minor">
+              <a:schemeClr val="lt1"/>
+            </a:fontRef>
+          </p:style>
+          <p:txBody>
+            <a:bodyPr rtlCol="0" anchor="ctr"/>
+            <a:lstStyle/>
+            <a:p>
+              <a:pPr algn="ctr"/>
+              <a:endParaRPr lang="zh-CN" altLang="en-US"/>
+            </a:p>
+          </p:txBody>
+        </p:sp>
+      </p:grpSp>
     </p:spTree>
     <p:extLst>
       <p:ext uri="{BB962C8B-B14F-4D97-AF65-F5344CB8AC3E}">
-        <p14:creationId xmlns:p14="http://schemas.microsoft.com/office/powerpoint/2010/main" val="1489651938"/>
+        <p14:creationId xmlns:p14="http://schemas.microsoft.com/office/powerpoint/2010/main" val="2993393659"/>
       </p:ext>
     </p:extLst>
   </p:cSld>
@@ -3981,7 +5521,7 @@
           <p:cNvPr id="2" name="标题 1">
             <a:extLst>
               <a:ext uri="{FF2B5EF4-FFF2-40B4-BE49-F238E27FC236}">
-                <a16:creationId xmlns:a16="http://schemas.microsoft.com/office/drawing/2014/main" id="{61CBC044-37F3-46D3-9F12-817130A71076}"/>
+                <a16:creationId xmlns:a16="http://schemas.microsoft.com/office/drawing/2014/main" id="{6528546D-8FB6-4CED-AF3F-F977514E6F87}"/>
               </a:ext>
             </a:extLst>
           </p:cNvPr>
@@ -3999,68 +5539,122 @@
           <a:p>
             <a:r>
               <a:rPr lang="zh-CN" altLang="en-US"/>
-              <a:t>软件流程图</a:t>
+              <a:t>软硬件架构级设计</a:t>
             </a:r>
           </a:p>
         </p:txBody>
       </p:sp>
-      <p:pic>
-        <p:nvPicPr>
-          <p:cNvPr id="13" name="内容占位符 12">
+      <p:sp>
+        <p:nvSpPr>
+          <p:cNvPr id="3" name="内容占位符 2">
             <a:extLst>
               <a:ext uri="{FF2B5EF4-FFF2-40B4-BE49-F238E27FC236}">
-                <a16:creationId xmlns:a16="http://schemas.microsoft.com/office/drawing/2014/main" id="{79994781-74DE-4786-8D6A-2272F99BC1AB}"/>
+                <a16:creationId xmlns:a16="http://schemas.microsoft.com/office/drawing/2014/main" id="{A8285A90-BC7B-464D-B8C9-7AA9A8B542B2}"/>
               </a:ext>
             </a:extLst>
           </p:cNvPr>
-          <p:cNvPicPr>
-            <a:picLocks noGrp="1" noChangeAspect="1"/>
-          </p:cNvPicPr>
+          <p:cNvSpPr>
+            <a:spLocks noGrp="1"/>
+          </p:cNvSpPr>
           <p:nvPr>
             <p:ph idx="1"/>
           </p:nvPr>
-        </p:nvPicPr>
-        <p:blipFill>
-          <a:blip r:embed="rId2">
-            <a:extLst>
-              <a:ext uri="{28A0092B-C50C-407E-A947-70E740481C1C}">
-                <a14:useLocalDpi xmlns:a14="http://schemas.microsoft.com/office/drawing/2010/main" val="0"/>
-              </a:ext>
-            </a:extLst>
-          </a:blip>
-          <a:stretch>
-            <a:fillRect/>
-          </a:stretch>
-        </p:blipFill>
-        <p:spPr>
-          <a:xfrm>
-            <a:off x="647981" y="1792818"/>
-            <a:ext cx="10896038" cy="4110831"/>
-          </a:xfrm>
-        </p:spPr>
-      </p:pic>
+        </p:nvSpPr>
+        <p:spPr/>
+        <p:txBody>
+          <a:bodyPr>
+            <a:normAutofit fontScale="92500"/>
+          </a:bodyPr>
+          <a:lstStyle/>
+          <a:p>
+            <a:r>
+              <a:rPr lang="zh-CN" altLang="en-US"/>
+              <a:t>软件模块</a:t>
+            </a:r>
+            <a:endParaRPr lang="en-US" altLang="zh-CN"/>
+          </a:p>
+          <a:p>
+            <a:pPr lvl="1"/>
+            <a:r>
+              <a:rPr lang="zh-CN" altLang="en-US"/>
+              <a:t>按键检测</a:t>
+            </a:r>
+            <a:endParaRPr lang="en-US" altLang="zh-CN"/>
+          </a:p>
+          <a:p>
+            <a:pPr lvl="1"/>
+            <a:r>
+              <a:rPr lang="zh-CN" altLang="en-US"/>
+              <a:t>图像处理</a:t>
+            </a:r>
+            <a:endParaRPr lang="en-US" altLang="zh-CN"/>
+          </a:p>
+          <a:p>
+            <a:pPr lvl="1"/>
+            <a:r>
+              <a:rPr lang="zh-CN" altLang="en-US"/>
+              <a:t>书籍位置提醒</a:t>
+            </a:r>
+            <a:endParaRPr lang="en-US" altLang="zh-CN"/>
+          </a:p>
+          <a:p>
+            <a:pPr lvl="1"/>
+            <a:r>
+              <a:rPr lang="zh-CN" altLang="en-US"/>
+              <a:t>调用</a:t>
+            </a:r>
+            <a:r>
+              <a:rPr lang="en-US" altLang="zh-CN"/>
+              <a:t>API</a:t>
+            </a:r>
+          </a:p>
+          <a:p>
+            <a:pPr lvl="1"/>
+            <a:r>
+              <a:rPr lang="zh-CN" altLang="en-US"/>
+              <a:t>上传读书数据</a:t>
+            </a:r>
+            <a:endParaRPr lang="en-US" altLang="zh-CN"/>
+          </a:p>
+          <a:p>
+            <a:r>
+              <a:rPr lang="zh-CN" altLang="en-US"/>
+              <a:t>硬件模块</a:t>
+            </a:r>
+            <a:endParaRPr lang="en-US" altLang="zh-CN"/>
+          </a:p>
+          <a:p>
+            <a:pPr lvl="1"/>
+            <a:r>
+              <a:rPr lang="zh-CN" altLang="en-US"/>
+              <a:t>音频处理模块</a:t>
+            </a:r>
+            <a:endParaRPr lang="en-US" altLang="zh-CN"/>
+          </a:p>
+          <a:p>
+            <a:pPr lvl="1"/>
+            <a:r>
+              <a:rPr lang="zh-CN" altLang="en-US"/>
+              <a:t>电源模块</a:t>
+            </a:r>
+            <a:endParaRPr lang="en-US" altLang="zh-CN"/>
+          </a:p>
+          <a:p>
+            <a:pPr lvl="1"/>
+            <a:endParaRPr lang="zh-CN" altLang="en-US"/>
+          </a:p>
+        </p:txBody>
+      </p:sp>
     </p:spTree>
     <p:extLst>
       <p:ext uri="{BB962C8B-B14F-4D97-AF65-F5344CB8AC3E}">
-        <p14:creationId xmlns:p14="http://schemas.microsoft.com/office/powerpoint/2010/main" val="1256904213"/>
+        <p14:creationId xmlns:p14="http://schemas.microsoft.com/office/powerpoint/2010/main" val="914006586"/>
       </p:ext>
     </p:extLst>
   </p:cSld>
   <p:clrMapOvr>
     <a:masterClrMapping/>
   </p:clrMapOvr>
-  <mc:AlternateContent xmlns:mc="http://schemas.openxmlformats.org/markup-compatibility/2006">
-    <mc:Choice xmlns:p159="http://schemas.microsoft.com/office/powerpoint/2015/09/main" Requires="p159">
-      <p:transition xmlns:p14="http://schemas.microsoft.com/office/powerpoint/2010/main" spd="slow" p14:dur="2000">
-        <p159:morph option="byObject"/>
-      </p:transition>
-    </mc:Choice>
-    <mc:Fallback>
-      <p:transition spd="slow">
-        <p:fade/>
-      </p:transition>
-    </mc:Fallback>
-  </mc:AlternateContent>
 </p:sld>
 </file>
 
@@ -4086,7 +5680,7 @@
           <p:cNvPr id="2" name="标题 1">
             <a:extLst>
               <a:ext uri="{FF2B5EF4-FFF2-40B4-BE49-F238E27FC236}">
-                <a16:creationId xmlns:a16="http://schemas.microsoft.com/office/drawing/2014/main" id="{1BDF98F6-A699-48E8-97C8-C6FE38DEBFA5}"/>
+                <a16:creationId xmlns:a16="http://schemas.microsoft.com/office/drawing/2014/main" id="{6D444BAF-4ADD-4185-8FE6-07FC08E10D01}"/>
               </a:ext>
             </a:extLst>
           </p:cNvPr>
@@ -4104,50 +5698,713 @@
           <a:p>
             <a:r>
               <a:rPr lang="zh-CN" altLang="en-US"/>
-              <a:t>提示图书位置移动</a:t>
+              <a:t>模拟电路设计</a:t>
             </a:r>
           </a:p>
         </p:txBody>
       </p:sp>
-      <p:pic>
-        <p:nvPicPr>
-          <p:cNvPr id="5" name="内容占位符 4">
+      <p:grpSp>
+        <p:nvGrpSpPr>
+          <p:cNvPr id="11" name="组合 10">
             <a:extLst>
               <a:ext uri="{FF2B5EF4-FFF2-40B4-BE49-F238E27FC236}">
-                <a16:creationId xmlns:a16="http://schemas.microsoft.com/office/drawing/2014/main" id="{DA0FB7AF-9231-4779-95C8-328B8B57C813}"/>
+                <a16:creationId xmlns:a16="http://schemas.microsoft.com/office/drawing/2014/main" id="{D04BE829-3E4A-46C6-BA57-8DEFFF1C7573}"/>
               </a:ext>
             </a:extLst>
           </p:cNvPr>
-          <p:cNvPicPr>
-            <a:picLocks noGrp="1" noChangeAspect="1"/>
-          </p:cNvPicPr>
+          <p:cNvGrpSpPr/>
+          <p:nvPr/>
+        </p:nvGrpSpPr>
+        <p:grpSpPr>
+          <a:xfrm>
+            <a:off x="216688" y="4171682"/>
+            <a:ext cx="7565934" cy="1127463"/>
+            <a:chOff x="388458" y="2574522"/>
+            <a:chExt cx="9220823" cy="1251753"/>
+          </a:xfrm>
+        </p:grpSpPr>
+        <p:sp>
+          <p:nvSpPr>
+            <p:cNvPr id="4" name="矩形 3">
+              <a:extLst>
+                <a:ext uri="{FF2B5EF4-FFF2-40B4-BE49-F238E27FC236}">
+                  <a16:creationId xmlns:a16="http://schemas.microsoft.com/office/drawing/2014/main" id="{3D2A0D4F-BA41-4850-A100-30BF2AFC08E1}"/>
+                </a:ext>
+              </a:extLst>
+            </p:cNvPr>
+            <p:cNvSpPr/>
+            <p:nvPr/>
+          </p:nvSpPr>
+          <p:spPr>
+            <a:xfrm>
+              <a:off x="388458" y="2574524"/>
+              <a:ext cx="1485129" cy="1251751"/>
+            </a:xfrm>
+            <a:prstGeom prst="rect">
+              <a:avLst/>
+            </a:prstGeom>
+          </p:spPr>
+          <p:style>
+            <a:lnRef idx="2">
+              <a:schemeClr val="accent1">
+                <a:shade val="50000"/>
+              </a:schemeClr>
+            </a:lnRef>
+            <a:fillRef idx="1">
+              <a:schemeClr val="accent1"/>
+            </a:fillRef>
+            <a:effectRef idx="0">
+              <a:schemeClr val="accent1"/>
+            </a:effectRef>
+            <a:fontRef idx="minor">
+              <a:schemeClr val="lt1"/>
+            </a:fontRef>
+          </p:style>
+          <p:txBody>
+            <a:bodyPr rtlCol="0" anchor="ctr"/>
+            <a:lstStyle/>
+            <a:p>
+              <a:pPr algn="ctr"/>
+              <a:r>
+                <a:rPr lang="zh-CN" altLang="en-US" sz="2000" b="1"/>
+                <a:t>驻极体</a:t>
+              </a:r>
+            </a:p>
+          </p:txBody>
+        </p:sp>
+        <p:sp>
+          <p:nvSpPr>
+            <p:cNvPr id="5" name="矩形 4">
+              <a:extLst>
+                <a:ext uri="{FF2B5EF4-FFF2-40B4-BE49-F238E27FC236}">
+                  <a16:creationId xmlns:a16="http://schemas.microsoft.com/office/drawing/2014/main" id="{2164F4AF-E673-429B-B7F8-89874496D472}"/>
+                </a:ext>
+              </a:extLst>
+            </p:cNvPr>
+            <p:cNvSpPr/>
+            <p:nvPr/>
+          </p:nvSpPr>
+          <p:spPr>
+            <a:xfrm>
+              <a:off x="2715887" y="2574524"/>
+              <a:ext cx="1688918" cy="1251751"/>
+            </a:xfrm>
+            <a:prstGeom prst="rect">
+              <a:avLst/>
+            </a:prstGeom>
+          </p:spPr>
+          <p:style>
+            <a:lnRef idx="2">
+              <a:schemeClr val="accent1">
+                <a:shade val="50000"/>
+              </a:schemeClr>
+            </a:lnRef>
+            <a:fillRef idx="1">
+              <a:schemeClr val="accent1"/>
+            </a:fillRef>
+            <a:effectRef idx="0">
+              <a:schemeClr val="accent1"/>
+            </a:effectRef>
+            <a:fontRef idx="minor">
+              <a:schemeClr val="lt1"/>
+            </a:fontRef>
+          </p:style>
+          <p:txBody>
+            <a:bodyPr rtlCol="0" anchor="ctr"/>
+            <a:lstStyle/>
+            <a:p>
+              <a:pPr algn="ctr"/>
+              <a:r>
+                <a:rPr lang="zh-CN" altLang="en-US" sz="2000" b="1"/>
+                <a:t>放大器</a:t>
+              </a:r>
+            </a:p>
+          </p:txBody>
+        </p:sp>
+        <p:sp>
+          <p:nvSpPr>
+            <p:cNvPr id="6" name="矩形 5">
+              <a:extLst>
+                <a:ext uri="{FF2B5EF4-FFF2-40B4-BE49-F238E27FC236}">
+                  <a16:creationId xmlns:a16="http://schemas.microsoft.com/office/drawing/2014/main" id="{75B2BFE4-E30A-4982-804C-55922ED0AEB1}"/>
+                </a:ext>
+              </a:extLst>
+            </p:cNvPr>
+            <p:cNvSpPr/>
+            <p:nvPr/>
+          </p:nvSpPr>
+          <p:spPr>
+            <a:xfrm>
+              <a:off x="5318126" y="2574524"/>
+              <a:ext cx="1688917" cy="1251751"/>
+            </a:xfrm>
+            <a:prstGeom prst="rect">
+              <a:avLst/>
+            </a:prstGeom>
+          </p:spPr>
+          <p:style>
+            <a:lnRef idx="2">
+              <a:schemeClr val="accent1">
+                <a:shade val="50000"/>
+              </a:schemeClr>
+            </a:lnRef>
+            <a:fillRef idx="1">
+              <a:schemeClr val="accent1"/>
+            </a:fillRef>
+            <a:effectRef idx="0">
+              <a:schemeClr val="accent1"/>
+            </a:effectRef>
+            <a:fontRef idx="minor">
+              <a:schemeClr val="lt1"/>
+            </a:fontRef>
+          </p:style>
+          <p:txBody>
+            <a:bodyPr rtlCol="0" anchor="ctr"/>
+            <a:lstStyle/>
+            <a:p>
+              <a:pPr algn="ctr"/>
+              <a:r>
+                <a:rPr lang="zh-CN" altLang="en-US" sz="2000" b="1"/>
+                <a:t>带通滤波器</a:t>
+              </a:r>
+            </a:p>
+          </p:txBody>
+        </p:sp>
+        <p:sp>
+          <p:nvSpPr>
+            <p:cNvPr id="7" name="箭头: 右 6">
+              <a:extLst>
+                <a:ext uri="{FF2B5EF4-FFF2-40B4-BE49-F238E27FC236}">
+                  <a16:creationId xmlns:a16="http://schemas.microsoft.com/office/drawing/2014/main" id="{4D2BD8DB-53BA-49F1-AD80-88590C4065CF}"/>
+                </a:ext>
+              </a:extLst>
+            </p:cNvPr>
+            <p:cNvSpPr/>
+            <p:nvPr/>
+          </p:nvSpPr>
+          <p:spPr>
+            <a:xfrm>
+              <a:off x="1975481" y="3062795"/>
+              <a:ext cx="709533" cy="275207"/>
+            </a:xfrm>
+            <a:prstGeom prst="rightArrow">
+              <a:avLst/>
+            </a:prstGeom>
+          </p:spPr>
+          <p:style>
+            <a:lnRef idx="2">
+              <a:schemeClr val="accent1">
+                <a:shade val="50000"/>
+              </a:schemeClr>
+            </a:lnRef>
+            <a:fillRef idx="1">
+              <a:schemeClr val="accent1"/>
+            </a:fillRef>
+            <a:effectRef idx="0">
+              <a:schemeClr val="accent1"/>
+            </a:effectRef>
+            <a:fontRef idx="minor">
+              <a:schemeClr val="lt1"/>
+            </a:fontRef>
+          </p:style>
+          <p:txBody>
+            <a:bodyPr rtlCol="0" anchor="ctr"/>
+            <a:lstStyle/>
+            <a:p>
+              <a:pPr algn="ctr"/>
+              <a:endParaRPr lang="zh-CN" altLang="en-US"/>
+            </a:p>
+          </p:txBody>
+        </p:sp>
+        <p:sp>
+          <p:nvSpPr>
+            <p:cNvPr id="8" name="箭头: 右 7">
+              <a:extLst>
+                <a:ext uri="{FF2B5EF4-FFF2-40B4-BE49-F238E27FC236}">
+                  <a16:creationId xmlns:a16="http://schemas.microsoft.com/office/drawing/2014/main" id="{0F2A02C4-8DC7-4364-AFA6-A02A5D356AC8}"/>
+                </a:ext>
+              </a:extLst>
+            </p:cNvPr>
+            <p:cNvSpPr/>
+            <p:nvPr/>
+          </p:nvSpPr>
+          <p:spPr>
+            <a:xfrm>
+              <a:off x="4537572" y="3062795"/>
+              <a:ext cx="709533" cy="275207"/>
+            </a:xfrm>
+            <a:prstGeom prst="rightArrow">
+              <a:avLst/>
+            </a:prstGeom>
+          </p:spPr>
+          <p:style>
+            <a:lnRef idx="2">
+              <a:schemeClr val="accent1">
+                <a:shade val="50000"/>
+              </a:schemeClr>
+            </a:lnRef>
+            <a:fillRef idx="1">
+              <a:schemeClr val="accent1"/>
+            </a:fillRef>
+            <a:effectRef idx="0">
+              <a:schemeClr val="accent1"/>
+            </a:effectRef>
+            <a:fontRef idx="minor">
+              <a:schemeClr val="lt1"/>
+            </a:fontRef>
+          </p:style>
+          <p:txBody>
+            <a:bodyPr rtlCol="0" anchor="ctr"/>
+            <a:lstStyle/>
+            <a:p>
+              <a:pPr algn="ctr"/>
+              <a:endParaRPr lang="zh-CN" altLang="en-US"/>
+            </a:p>
+          </p:txBody>
+        </p:sp>
+        <p:sp>
+          <p:nvSpPr>
+            <p:cNvPr id="9" name="矩形 8">
+              <a:extLst>
+                <a:ext uri="{FF2B5EF4-FFF2-40B4-BE49-F238E27FC236}">
+                  <a16:creationId xmlns:a16="http://schemas.microsoft.com/office/drawing/2014/main" id="{11735CC7-E95D-432D-9BFA-AC393666AF50}"/>
+                </a:ext>
+              </a:extLst>
+            </p:cNvPr>
+            <p:cNvSpPr/>
+            <p:nvPr/>
+          </p:nvSpPr>
+          <p:spPr>
+            <a:xfrm>
+              <a:off x="7920364" y="2574522"/>
+              <a:ext cx="1688917" cy="1251751"/>
+            </a:xfrm>
+            <a:prstGeom prst="rect">
+              <a:avLst/>
+            </a:prstGeom>
+          </p:spPr>
+          <p:style>
+            <a:lnRef idx="2">
+              <a:schemeClr val="accent1">
+                <a:shade val="50000"/>
+              </a:schemeClr>
+            </a:lnRef>
+            <a:fillRef idx="1">
+              <a:schemeClr val="accent1"/>
+            </a:fillRef>
+            <a:effectRef idx="0">
+              <a:schemeClr val="accent1"/>
+            </a:effectRef>
+            <a:fontRef idx="minor">
+              <a:schemeClr val="lt1"/>
+            </a:fontRef>
+          </p:style>
+          <p:txBody>
+            <a:bodyPr rtlCol="0" anchor="ctr"/>
+            <a:lstStyle/>
+            <a:p>
+              <a:pPr algn="ctr"/>
+              <a:r>
+                <a:rPr lang="zh-CN" altLang="en-US" sz="2000" b="1"/>
+                <a:t>电平调整</a:t>
+              </a:r>
+            </a:p>
+          </p:txBody>
+        </p:sp>
+        <p:sp>
+          <p:nvSpPr>
+            <p:cNvPr id="10" name="箭头: 右 9">
+              <a:extLst>
+                <a:ext uri="{FF2B5EF4-FFF2-40B4-BE49-F238E27FC236}">
+                  <a16:creationId xmlns:a16="http://schemas.microsoft.com/office/drawing/2014/main" id="{55C407A4-6907-4564-80DA-A5DD72882320}"/>
+                </a:ext>
+              </a:extLst>
+            </p:cNvPr>
+            <p:cNvSpPr/>
+            <p:nvPr/>
+          </p:nvSpPr>
+          <p:spPr>
+            <a:xfrm>
+              <a:off x="7108937" y="3062793"/>
+              <a:ext cx="709533" cy="275207"/>
+            </a:xfrm>
+            <a:prstGeom prst="rightArrow">
+              <a:avLst/>
+            </a:prstGeom>
+          </p:spPr>
+          <p:style>
+            <a:lnRef idx="2">
+              <a:schemeClr val="accent1">
+                <a:shade val="50000"/>
+              </a:schemeClr>
+            </a:lnRef>
+            <a:fillRef idx="1">
+              <a:schemeClr val="accent1"/>
+            </a:fillRef>
+            <a:effectRef idx="0">
+              <a:schemeClr val="accent1"/>
+            </a:effectRef>
+            <a:fontRef idx="minor">
+              <a:schemeClr val="lt1"/>
+            </a:fontRef>
+          </p:style>
+          <p:txBody>
+            <a:bodyPr rtlCol="0" anchor="ctr"/>
+            <a:lstStyle/>
+            <a:p>
+              <a:pPr algn="ctr"/>
+              <a:endParaRPr lang="zh-CN" altLang="en-US"/>
+            </a:p>
+          </p:txBody>
+        </p:sp>
+      </p:grpSp>
+      <p:sp>
+        <p:nvSpPr>
+          <p:cNvPr id="14" name="矩形 13">
+            <a:extLst>
+              <a:ext uri="{FF2B5EF4-FFF2-40B4-BE49-F238E27FC236}">
+                <a16:creationId xmlns:a16="http://schemas.microsoft.com/office/drawing/2014/main" id="{FABF93CF-2929-4437-B24F-ADFAB0D541F3}"/>
+              </a:ext>
+            </a:extLst>
+          </p:cNvPr>
+          <p:cNvSpPr/>
+          <p:nvPr/>
+        </p:nvSpPr>
+        <p:spPr>
+          <a:xfrm>
+            <a:off x="8550885" y="4171682"/>
+            <a:ext cx="1559791" cy="1127461"/>
+          </a:xfrm>
+          <a:prstGeom prst="rect">
+            <a:avLst/>
+          </a:prstGeom>
+        </p:spPr>
+        <p:style>
+          <a:lnRef idx="2">
+            <a:schemeClr val="accent1">
+              <a:shade val="50000"/>
+            </a:schemeClr>
+          </a:lnRef>
+          <a:fillRef idx="1">
+            <a:schemeClr val="accent1"/>
+          </a:fillRef>
+          <a:effectRef idx="0">
+            <a:schemeClr val="accent1"/>
+          </a:effectRef>
+          <a:fontRef idx="minor">
+            <a:schemeClr val="lt1"/>
+          </a:fontRef>
+        </p:style>
+        <p:txBody>
+          <a:bodyPr rtlCol="0" anchor="ctr"/>
+          <a:lstStyle/>
+          <a:p>
+            <a:pPr algn="ctr"/>
+            <a:r>
+              <a:rPr lang="zh-CN" altLang="en-US" sz="2000" b="1"/>
+              <a:t>模数转换</a:t>
+            </a:r>
+          </a:p>
+        </p:txBody>
+      </p:sp>
+      <p:sp>
+        <p:nvSpPr>
+          <p:cNvPr id="15" name="箭头: 右 14">
+            <a:extLst>
+              <a:ext uri="{FF2B5EF4-FFF2-40B4-BE49-F238E27FC236}">
+                <a16:creationId xmlns:a16="http://schemas.microsoft.com/office/drawing/2014/main" id="{BAF803BD-37EC-409D-9F2A-1A4ACB7FF1DB}"/>
+              </a:ext>
+            </a:extLst>
+          </p:cNvPr>
+          <p:cNvSpPr/>
+          <p:nvPr/>
+        </p:nvSpPr>
+        <p:spPr>
+          <a:xfrm>
+            <a:off x="10200297" y="4542319"/>
+            <a:ext cx="577048" cy="292963"/>
+          </a:xfrm>
+          <a:prstGeom prst="rightArrow">
+            <a:avLst/>
+          </a:prstGeom>
+        </p:spPr>
+        <p:style>
+          <a:lnRef idx="2">
+            <a:schemeClr val="accent1">
+              <a:shade val="50000"/>
+            </a:schemeClr>
+          </a:lnRef>
+          <a:fillRef idx="1">
+            <a:schemeClr val="accent1"/>
+          </a:fillRef>
+          <a:effectRef idx="0">
+            <a:schemeClr val="accent1"/>
+          </a:effectRef>
+          <a:fontRef idx="minor">
+            <a:schemeClr val="lt1"/>
+          </a:fontRef>
+        </p:style>
+        <p:txBody>
+          <a:bodyPr rtlCol="0" anchor="ctr"/>
+          <a:lstStyle/>
+          <a:p>
+            <a:pPr algn="ctr"/>
+            <a:endParaRPr lang="zh-CN" altLang="en-US"/>
+          </a:p>
+        </p:txBody>
+      </p:sp>
+      <p:sp>
+        <p:nvSpPr>
+          <p:cNvPr id="16" name="矩形 15">
+            <a:extLst>
+              <a:ext uri="{FF2B5EF4-FFF2-40B4-BE49-F238E27FC236}">
+                <a16:creationId xmlns:a16="http://schemas.microsoft.com/office/drawing/2014/main" id="{539C8E94-B3AA-4C5D-865E-A02300F96477}"/>
+              </a:ext>
+            </a:extLst>
+          </p:cNvPr>
+          <p:cNvSpPr/>
+          <p:nvPr/>
+        </p:nvSpPr>
+        <p:spPr>
+          <a:xfrm>
+            <a:off x="10878939" y="4149139"/>
+            <a:ext cx="1313061" cy="1127461"/>
+          </a:xfrm>
+          <a:prstGeom prst="rect">
+            <a:avLst/>
+          </a:prstGeom>
+        </p:spPr>
+        <p:style>
+          <a:lnRef idx="2">
+            <a:schemeClr val="accent1">
+              <a:shade val="50000"/>
+            </a:schemeClr>
+          </a:lnRef>
+          <a:fillRef idx="1">
+            <a:schemeClr val="accent1"/>
+          </a:fillRef>
+          <a:effectRef idx="0">
+            <a:schemeClr val="accent1"/>
+          </a:effectRef>
+          <a:fontRef idx="minor">
+            <a:schemeClr val="lt1"/>
+          </a:fontRef>
+        </p:style>
+        <p:txBody>
+          <a:bodyPr rtlCol="0" anchor="ctr"/>
+          <a:lstStyle/>
+          <a:p>
+            <a:pPr algn="ctr"/>
+            <a:r>
+              <a:rPr lang="zh-CN" altLang="en-US" sz="2000" b="1"/>
+              <a:t>树莓派</a:t>
+            </a:r>
+          </a:p>
+        </p:txBody>
+      </p:sp>
+      <p:sp>
+        <p:nvSpPr>
+          <p:cNvPr id="17" name="内容占位符 2">
+            <a:extLst>
+              <a:ext uri="{FF2B5EF4-FFF2-40B4-BE49-F238E27FC236}">
+                <a16:creationId xmlns:a16="http://schemas.microsoft.com/office/drawing/2014/main" id="{399B85F4-2819-47BF-9311-A4EDD6861691}"/>
+              </a:ext>
+            </a:extLst>
+          </p:cNvPr>
+          <p:cNvSpPr>
+            <a:spLocks noGrp="1"/>
+          </p:cNvSpPr>
           <p:nvPr>
             <p:ph idx="1"/>
           </p:nvPr>
-        </p:nvPicPr>
-        <p:blipFill>
-          <a:blip r:embed="rId2">
-            <a:extLst>
-              <a:ext uri="{28A0092B-C50C-407E-A947-70E740481C1C}">
-                <a14:useLocalDpi xmlns:a14="http://schemas.microsoft.com/office/drawing/2010/main" val="0"/>
-              </a:ext>
-            </a:extLst>
-          </a:blip>
-          <a:stretch>
-            <a:fillRect/>
-          </a:stretch>
-        </p:blipFill>
+        </p:nvSpPr>
         <p:spPr>
           <a:xfrm>
-            <a:off x="839572" y="1682217"/>
-            <a:ext cx="9443198" cy="4558785"/>
+            <a:off x="664464" y="1246219"/>
+            <a:ext cx="10515600" cy="5440908"/>
           </a:xfrm>
         </p:spPr>
-      </p:pic>
+        <p:txBody>
+          <a:bodyPr>
+            <a:normAutofit/>
+          </a:bodyPr>
+          <a:lstStyle/>
+          <a:p>
+            <a:r>
+              <a:rPr lang="zh-CN" altLang="en-US"/>
+              <a:t>语音调理电路</a:t>
+            </a:r>
+            <a:endParaRPr lang="en-US" altLang="zh-CN"/>
+          </a:p>
+          <a:p>
+            <a:pPr lvl="1"/>
+            <a:r>
+              <a:rPr lang="zh-CN" altLang="en-US"/>
+              <a:t>树莓派支持的微型麦克风效果种类少而且效果一般</a:t>
+            </a:r>
+            <a:endParaRPr lang="en-US" altLang="zh-CN"/>
+          </a:p>
+          <a:p>
+            <a:pPr lvl="1"/>
+            <a:r>
+              <a:rPr lang="zh-CN" altLang="en-US"/>
+              <a:t>因此我们将模拟硬件电路放到了语音调理模块</a:t>
+            </a:r>
+          </a:p>
+        </p:txBody>
+      </p:sp>
+      <p:sp>
+        <p:nvSpPr>
+          <p:cNvPr id="18" name="矩形 17">
+            <a:extLst>
+              <a:ext uri="{FF2B5EF4-FFF2-40B4-BE49-F238E27FC236}">
+                <a16:creationId xmlns:a16="http://schemas.microsoft.com/office/drawing/2014/main" id="{F1E2C242-B592-4DFD-AB60-E9B4371FD839}"/>
+              </a:ext>
+            </a:extLst>
+          </p:cNvPr>
+          <p:cNvSpPr/>
+          <p:nvPr/>
+        </p:nvSpPr>
+        <p:spPr>
+          <a:xfrm>
+            <a:off x="94559" y="3781064"/>
+            <a:ext cx="7901126" cy="1899821"/>
+          </a:xfrm>
+          <a:prstGeom prst="rect">
+            <a:avLst/>
+          </a:prstGeom>
+          <a:noFill/>
+          <a:ln w="38100" cap="flat" cmpd="sng" algn="ctr">
+            <a:solidFill>
+              <a:schemeClr val="accent5"/>
+            </a:solidFill>
+            <a:prstDash val="solid"/>
+            <a:round/>
+            <a:headEnd type="none" w="med" len="med"/>
+            <a:tailEnd type="none" w="med" len="med"/>
+          </a:ln>
+        </p:spPr>
+        <p:style>
+          <a:lnRef idx="0">
+            <a:scrgbClr r="0" g="0" b="0"/>
+          </a:lnRef>
+          <a:fillRef idx="0">
+            <a:scrgbClr r="0" g="0" b="0"/>
+          </a:fillRef>
+          <a:effectRef idx="0">
+            <a:scrgbClr r="0" g="0" b="0"/>
+          </a:effectRef>
+          <a:fontRef idx="minor">
+            <a:schemeClr val="accent5"/>
+          </a:fontRef>
+        </p:style>
+        <p:txBody>
+          <a:bodyPr rtlCol="0" anchor="ctr"/>
+          <a:lstStyle/>
+          <a:p>
+            <a:pPr algn="ctr"/>
+            <a:endParaRPr lang="zh-CN" altLang="en-US"/>
+          </a:p>
+        </p:txBody>
+      </p:sp>
+      <p:sp>
+        <p:nvSpPr>
+          <p:cNvPr id="12" name="箭头: 右 11">
+            <a:extLst>
+              <a:ext uri="{FF2B5EF4-FFF2-40B4-BE49-F238E27FC236}">
+                <a16:creationId xmlns:a16="http://schemas.microsoft.com/office/drawing/2014/main" id="{2B31F251-6D8B-4C43-8BB8-378334097762}"/>
+              </a:ext>
+            </a:extLst>
+          </p:cNvPr>
+          <p:cNvSpPr/>
+          <p:nvPr/>
+        </p:nvSpPr>
+        <p:spPr>
+          <a:xfrm>
+            <a:off x="7896705" y="4566389"/>
+            <a:ext cx="577048" cy="292963"/>
+          </a:xfrm>
+          <a:prstGeom prst="rightArrow">
+            <a:avLst/>
+          </a:prstGeom>
+        </p:spPr>
+        <p:style>
+          <a:lnRef idx="2">
+            <a:schemeClr val="accent1">
+              <a:shade val="50000"/>
+            </a:schemeClr>
+          </a:lnRef>
+          <a:fillRef idx="1">
+            <a:schemeClr val="accent1"/>
+          </a:fillRef>
+          <a:effectRef idx="0">
+            <a:schemeClr val="accent1"/>
+          </a:effectRef>
+          <a:fontRef idx="minor">
+            <a:schemeClr val="lt1"/>
+          </a:fontRef>
+        </p:style>
+        <p:txBody>
+          <a:bodyPr rtlCol="0" anchor="ctr"/>
+          <a:lstStyle/>
+          <a:p>
+            <a:pPr algn="ctr"/>
+            <a:endParaRPr lang="zh-CN" altLang="en-US"/>
+          </a:p>
+        </p:txBody>
+      </p:sp>
+      <p:sp>
+        <p:nvSpPr>
+          <p:cNvPr id="19" name="矩形 18">
+            <a:extLst>
+              <a:ext uri="{FF2B5EF4-FFF2-40B4-BE49-F238E27FC236}">
+                <a16:creationId xmlns:a16="http://schemas.microsoft.com/office/drawing/2014/main" id="{02890807-4E12-42AA-A0A4-2AF94F588F74}"/>
+              </a:ext>
+            </a:extLst>
+          </p:cNvPr>
+          <p:cNvSpPr/>
+          <p:nvPr/>
+        </p:nvSpPr>
+        <p:spPr>
+          <a:xfrm>
+            <a:off x="4409836" y="5851085"/>
+            <a:ext cx="3775393" cy="523220"/>
+          </a:xfrm>
+          <a:prstGeom prst="rect">
+            <a:avLst/>
+          </a:prstGeom>
+          <a:noFill/>
+        </p:spPr>
+        <p:txBody>
+          <a:bodyPr wrap="none" lIns="91440" tIns="45720" rIns="91440" bIns="45720">
+            <a:spAutoFit/>
+          </a:bodyPr>
+          <a:lstStyle/>
+          <a:p>
+            <a:pPr algn="ctr"/>
+            <a:r>
+              <a:rPr lang="zh-CN" altLang="en-US" sz="2800" b="1" cap="none" spc="0">
+                <a:ln w="0"/>
+                <a:solidFill>
+                  <a:schemeClr val="accent1"/>
+                </a:solidFill>
+                <a:effectLst>
+                  <a:outerShdw blurRad="38100" dist="25400" dir="5400000" algn="ctr" rotWithShape="0">
+                    <a:srgbClr val="6E747A">
+                      <a:alpha val="43000"/>
+                    </a:srgbClr>
+                  </a:outerShdw>
+                </a:effectLst>
+              </a:rPr>
+              <a:t>语音信号调理电路框图</a:t>
+            </a:r>
+          </a:p>
+        </p:txBody>
+      </p:sp>
     </p:spTree>
     <p:extLst>
       <p:ext uri="{BB962C8B-B14F-4D97-AF65-F5344CB8AC3E}">
-        <p14:creationId xmlns:p14="http://schemas.microsoft.com/office/powerpoint/2010/main" val="4240375110"/>
+        <p14:creationId xmlns:p14="http://schemas.microsoft.com/office/powerpoint/2010/main" val="2693964799"/>
       </p:ext>
     </p:extLst>
   </p:cSld>
@@ -4179,7 +6436,7 @@
           <p:cNvPr id="2" name="标题 1">
             <a:extLst>
               <a:ext uri="{FF2B5EF4-FFF2-40B4-BE49-F238E27FC236}">
-                <a16:creationId xmlns:a16="http://schemas.microsoft.com/office/drawing/2014/main" id="{33F77340-5760-4A10-8D26-27385B15F659}"/>
+                <a16:creationId xmlns:a16="http://schemas.microsoft.com/office/drawing/2014/main" id="{61CBC044-37F3-46D3-9F12-817130A71076}"/>
               </a:ext>
             </a:extLst>
           </p:cNvPr>
@@ -4197,160 +6454,28 @@
           <a:p>
             <a:r>
               <a:rPr lang="zh-CN" altLang="en-US"/>
-              <a:t>图像预处理</a:t>
-            </a:r>
-          </a:p>
-        </p:txBody>
-      </p:sp>
-      <p:sp>
-        <p:nvSpPr>
-          <p:cNvPr id="3" name="内容占位符 2">
-            <a:extLst>
-              <a:ext uri="{FF2B5EF4-FFF2-40B4-BE49-F238E27FC236}">
-                <a16:creationId xmlns:a16="http://schemas.microsoft.com/office/drawing/2014/main" id="{C896692B-FCF4-4485-9643-AEC10FED93E4}"/>
-              </a:ext>
-            </a:extLst>
-          </p:cNvPr>
-          <p:cNvSpPr>
-            <a:spLocks noGrp="1"/>
-          </p:cNvSpPr>
-          <p:nvPr>
-            <p:ph idx="1"/>
-          </p:nvPr>
-        </p:nvSpPr>
-        <p:spPr/>
-        <p:txBody>
-          <a:bodyPr>
-            <a:normAutofit fontScale="92500" lnSpcReduction="20000"/>
-          </a:bodyPr>
-          <a:lstStyle/>
-          <a:p>
-            <a:r>
-              <a:rPr lang="zh-CN" altLang="en-US"/>
-              <a:t>透视校正</a:t>
-            </a:r>
-            <a:endParaRPr lang="en-US" altLang="zh-CN"/>
-          </a:p>
-          <a:p>
-            <a:pPr lvl="1"/>
-            <a:r>
-              <a:rPr lang="zh-CN" altLang="en-US"/>
-              <a:t>方法</a:t>
-            </a:r>
-            <a:endParaRPr lang="en-US" altLang="zh-CN"/>
-          </a:p>
-          <a:p>
-            <a:pPr lvl="2"/>
-            <a:r>
-              <a:rPr lang="zh-CN" altLang="en-US"/>
-              <a:t>使用霍夫线检测的方法，计算检测出的直线平均角度</a:t>
-            </a:r>
-            <a:endParaRPr lang="en-US" altLang="zh-CN"/>
-          </a:p>
-          <a:p>
-            <a:pPr lvl="1"/>
-            <a:r>
-              <a:rPr lang="zh-CN" altLang="en-US"/>
-              <a:t>问题</a:t>
-            </a:r>
-            <a:endParaRPr lang="en-US" altLang="zh-CN"/>
-          </a:p>
-          <a:p>
-            <a:pPr lvl="2"/>
-            <a:r>
-              <a:rPr lang="zh-CN" altLang="en-US"/>
-              <a:t>效果有限</a:t>
-            </a:r>
-            <a:endParaRPr lang="en-US" altLang="zh-CN"/>
-          </a:p>
-          <a:p>
-            <a:pPr lvl="2"/>
-            <a:r>
-              <a:rPr lang="zh-CN" altLang="en-US"/>
-              <a:t>不能解决书籍完全拿反的问题</a:t>
-            </a:r>
-            <a:endParaRPr lang="en-US" altLang="zh-CN"/>
-          </a:p>
-          <a:p>
-            <a:r>
-              <a:rPr lang="zh-CN" altLang="en-US"/>
-              <a:t>清晰度的增强</a:t>
-            </a:r>
-            <a:endParaRPr lang="en-US" altLang="zh-CN"/>
-          </a:p>
-          <a:p>
-            <a:pPr lvl="1"/>
-            <a:r>
-              <a:rPr lang="zh-CN" altLang="en-US"/>
-              <a:t>方法</a:t>
-            </a:r>
-            <a:endParaRPr lang="en-US" altLang="zh-CN"/>
-          </a:p>
-          <a:p>
-            <a:pPr lvl="2"/>
-            <a:r>
-              <a:rPr lang="zh-CN" altLang="en-US"/>
-              <a:t>二值化</a:t>
-            </a:r>
-            <a:endParaRPr lang="en-US" altLang="zh-CN"/>
-          </a:p>
-          <a:p>
-            <a:pPr lvl="2"/>
-            <a:r>
-              <a:rPr lang="zh-CN" altLang="en-US"/>
-              <a:t>摄像头分辨率提高</a:t>
-            </a:r>
-            <a:endParaRPr lang="en-US" altLang="zh-CN"/>
-          </a:p>
-          <a:p>
-            <a:pPr lvl="1"/>
-            <a:r>
-              <a:rPr lang="zh-CN" altLang="en-US"/>
-              <a:t>注：</a:t>
-            </a:r>
-            <a:r>
-              <a:rPr lang="en-US" altLang="zh-CN"/>
-              <a:t>API</a:t>
-            </a:r>
-            <a:r>
-              <a:rPr lang="zh-CN" altLang="en-US"/>
-              <a:t>接口图片大小不能超过</a:t>
-            </a:r>
-            <a:r>
-              <a:rPr lang="en-US" altLang="zh-CN"/>
-              <a:t>4MB</a:t>
-            </a:r>
-            <a:r>
-              <a:rPr lang="zh-CN" altLang="en-US"/>
-              <a:t>（高清版不能超过</a:t>
-            </a:r>
-            <a:r>
-              <a:rPr lang="en-US" altLang="zh-CN"/>
-              <a:t>10MB</a:t>
-            </a:r>
-            <a:r>
-              <a:rPr lang="zh-CN" altLang="en-US"/>
-              <a:t>）</a:t>
-            </a:r>
-            <a:endParaRPr lang="en-US" altLang="zh-CN"/>
+              <a:t>软件流程图</a:t>
+            </a:r>
           </a:p>
         </p:txBody>
       </p:sp>
       <p:pic>
         <p:nvPicPr>
-          <p:cNvPr id="5" name="图片 4">
+          <p:cNvPr id="13" name="内容占位符 12">
             <a:extLst>
               <a:ext uri="{FF2B5EF4-FFF2-40B4-BE49-F238E27FC236}">
-                <a16:creationId xmlns:a16="http://schemas.microsoft.com/office/drawing/2014/main" id="{E4F8A9EA-8574-45A6-82F3-84742CA77138}"/>
+                <a16:creationId xmlns:a16="http://schemas.microsoft.com/office/drawing/2014/main" id="{79994781-74DE-4786-8D6A-2272F99BC1AB}"/>
               </a:ext>
             </a:extLst>
           </p:cNvPr>
           <p:cNvPicPr>
-            <a:picLocks noChangeAspect="1"/>
+            <a:picLocks noGrp="1" noChangeAspect="1"/>
           </p:cNvPicPr>
-          <p:nvPr/>
+          <p:nvPr>
+            <p:ph idx="1"/>
+          </p:nvPr>
         </p:nvPicPr>
-        <p:blipFill rotWithShape="1">
+        <p:blipFill>
           <a:blip r:embed="rId2">
             <a:extLst>
               <a:ext uri="{28A0092B-C50C-407E-A947-70E740481C1C}">
@@ -4358,29 +6483,39 @@
               </a:ext>
             </a:extLst>
           </a:blip>
-          <a:srcRect r="21059" b="21530"/>
-          <a:stretch/>
+          <a:stretch>
+            <a:fillRect/>
+          </a:stretch>
         </p:blipFill>
         <p:spPr>
           <a:xfrm>
-            <a:off x="8191395" y="1467034"/>
-            <a:ext cx="3336141" cy="4540639"/>
+            <a:off x="647981" y="1792818"/>
+            <a:ext cx="10896038" cy="4110831"/>
           </a:xfrm>
-          <a:prstGeom prst="rect">
-            <a:avLst/>
-          </a:prstGeom>
         </p:spPr>
       </p:pic>
     </p:spTree>
     <p:extLst>
       <p:ext uri="{BB962C8B-B14F-4D97-AF65-F5344CB8AC3E}">
-        <p14:creationId xmlns:p14="http://schemas.microsoft.com/office/powerpoint/2010/main" val="267944224"/>
+        <p14:creationId xmlns:p14="http://schemas.microsoft.com/office/powerpoint/2010/main" val="1256904213"/>
       </p:ext>
     </p:extLst>
   </p:cSld>
   <p:clrMapOvr>
     <a:masterClrMapping/>
   </p:clrMapOvr>
+  <mc:AlternateContent xmlns:mc="http://schemas.openxmlformats.org/markup-compatibility/2006" xmlns:p159="http://schemas.microsoft.com/office/powerpoint/2015/09/main">
+    <mc:Choice Requires="p159">
+      <p:transition xmlns:p14="http://schemas.microsoft.com/office/powerpoint/2010/main" spd="slow" p14:dur="2000">
+        <p159:morph option="byObject"/>
+      </p:transition>
+    </mc:Choice>
+    <mc:Fallback xmlns="">
+      <p:transition spd="slow">
+        <p:fade/>
+      </p:transition>
+    </mc:Fallback>
+  </mc:AlternateContent>
 </p:sld>
 </file>
 
@@ -4406,7 +6541,7 @@
           <p:cNvPr id="2" name="标题 1">
             <a:extLst>
               <a:ext uri="{FF2B5EF4-FFF2-40B4-BE49-F238E27FC236}">
-                <a16:creationId xmlns:a16="http://schemas.microsoft.com/office/drawing/2014/main" id="{1AF6043D-7032-4087-B8D9-F54F67F1A07D}"/>
+                <a16:creationId xmlns:a16="http://schemas.microsoft.com/office/drawing/2014/main" id="{1BDF98F6-A699-48E8-97C8-C6FE38DEBFA5}"/>
               </a:ext>
             </a:extLst>
           </p:cNvPr>
@@ -4424,63 +6559,28 @@
           <a:p>
             <a:r>
               <a:rPr lang="zh-CN" altLang="en-US"/>
-              <a:t>透视校正</a:t>
-            </a:r>
-          </a:p>
-        </p:txBody>
-      </p:sp>
-      <p:sp>
-        <p:nvSpPr>
-          <p:cNvPr id="3" name="内容占位符 2">
-            <a:extLst>
-              <a:ext uri="{FF2B5EF4-FFF2-40B4-BE49-F238E27FC236}">
-                <a16:creationId xmlns:a16="http://schemas.microsoft.com/office/drawing/2014/main" id="{1BC56884-894A-4433-BC26-04198019B36D}"/>
-              </a:ext>
-            </a:extLst>
-          </p:cNvPr>
-          <p:cNvSpPr>
-            <a:spLocks noGrp="1"/>
-          </p:cNvSpPr>
-          <p:nvPr>
-            <p:ph idx="1"/>
-          </p:nvPr>
-        </p:nvSpPr>
-        <p:spPr/>
-        <p:txBody>
-          <a:bodyPr/>
-          <a:lstStyle/>
-          <a:p>
-            <a:r>
-              <a:rPr lang="zh-CN" altLang="en-US"/>
-              <a:t>关键参数</a:t>
-            </a:r>
-            <a:endParaRPr lang="en-US" altLang="zh-CN"/>
-          </a:p>
-          <a:p>
-            <a:pPr lvl="1"/>
-            <a:r>
-              <a:rPr lang="zh-CN" altLang="en-US"/>
-              <a:t>霍夫线检测阈值；图片降采样比例</a:t>
-            </a:r>
-            <a:endParaRPr lang="en-US" altLang="zh-CN"/>
+              <a:t>提示图书位置移动 方案一</a:t>
+            </a:r>
           </a:p>
         </p:txBody>
       </p:sp>
       <p:pic>
         <p:nvPicPr>
-          <p:cNvPr id="4" name="图片 3">
+          <p:cNvPr id="5" name="内容占位符 4">
             <a:extLst>
               <a:ext uri="{FF2B5EF4-FFF2-40B4-BE49-F238E27FC236}">
-                <a16:creationId xmlns:a16="http://schemas.microsoft.com/office/drawing/2014/main" id="{E3006A6C-F781-4D9E-847D-FA9B7243E271}"/>
+                <a16:creationId xmlns:a16="http://schemas.microsoft.com/office/drawing/2014/main" id="{DA0FB7AF-9231-4779-95C8-328B8B57C813}"/>
               </a:ext>
             </a:extLst>
           </p:cNvPr>
           <p:cNvPicPr>
-            <a:picLocks noChangeAspect="1"/>
+            <a:picLocks noGrp="1" noChangeAspect="1"/>
           </p:cNvPicPr>
-          <p:nvPr/>
+          <p:nvPr>
+            <p:ph idx="1"/>
+          </p:nvPr>
         </p:nvPicPr>
-        <p:blipFill rotWithShape="1">
+        <p:blipFill>
           <a:blip r:embed="rId2">
             <a:extLst>
               <a:ext uri="{28A0092B-C50C-407E-A947-70E740481C1C}">
@@ -4488,185 +6588,21 @@
               </a:ext>
             </a:extLst>
           </a:blip>
-          <a:srcRect r="21059" b="21530"/>
-          <a:stretch/>
+          <a:stretch>
+            <a:fillRect/>
+          </a:stretch>
         </p:blipFill>
         <p:spPr>
           <a:xfrm>
-            <a:off x="4803581" y="2639201"/>
-            <a:ext cx="2974128" cy="4047926"/>
+            <a:off x="853198" y="1631127"/>
+            <a:ext cx="9935204" cy="4796306"/>
           </a:xfrm>
-          <a:prstGeom prst="rect">
-            <a:avLst/>
-          </a:prstGeom>
-        </p:spPr>
-      </p:pic>
-      <p:pic>
-        <p:nvPicPr>
-          <p:cNvPr id="6" name="图片 5">
-            <a:extLst>
-              <a:ext uri="{FF2B5EF4-FFF2-40B4-BE49-F238E27FC236}">
-                <a16:creationId xmlns:a16="http://schemas.microsoft.com/office/drawing/2014/main" id="{11767345-EACD-4A9D-8A59-515B615CDCEC}"/>
-              </a:ext>
-            </a:extLst>
-          </p:cNvPr>
-          <p:cNvPicPr>
-            <a:picLocks noChangeAspect="1"/>
-          </p:cNvPicPr>
-          <p:nvPr/>
-        </p:nvPicPr>
-        <p:blipFill rotWithShape="1">
-          <a:blip r:embed="rId3">
-            <a:extLst>
-              <a:ext uri="{28A0092B-C50C-407E-A947-70E740481C1C}">
-                <a14:useLocalDpi xmlns:a14="http://schemas.microsoft.com/office/drawing/2010/main" val="0"/>
-              </a:ext>
-            </a:extLst>
-          </a:blip>
-          <a:srcRect r="20263" b="20803"/>
-          <a:stretch/>
-        </p:blipFill>
-        <p:spPr>
-          <a:xfrm>
-            <a:off x="637032" y="2639201"/>
-            <a:ext cx="2976556" cy="4047926"/>
-          </a:xfrm>
-          <a:prstGeom prst="rect">
-            <a:avLst/>
-          </a:prstGeom>
-        </p:spPr>
-      </p:pic>
-      <p:sp>
-        <p:nvSpPr>
-          <p:cNvPr id="7" name="箭头: 右 6">
-            <a:extLst>
-              <a:ext uri="{FF2B5EF4-FFF2-40B4-BE49-F238E27FC236}">
-                <a16:creationId xmlns:a16="http://schemas.microsoft.com/office/drawing/2014/main" id="{05FB6801-9F00-47A5-A4FC-86444B4F87BF}"/>
-              </a:ext>
-            </a:extLst>
-          </p:cNvPr>
-          <p:cNvSpPr/>
-          <p:nvPr/>
-        </p:nvSpPr>
-        <p:spPr>
-          <a:xfrm>
-            <a:off x="3747176" y="4243526"/>
-            <a:ext cx="861134" cy="550416"/>
-          </a:xfrm>
-          <a:prstGeom prst="rightArrow">
-            <a:avLst/>
-          </a:prstGeom>
-        </p:spPr>
-        <p:style>
-          <a:lnRef idx="2">
-            <a:schemeClr val="accent1">
-              <a:shade val="50000"/>
-            </a:schemeClr>
-          </a:lnRef>
-          <a:fillRef idx="1">
-            <a:schemeClr val="accent1"/>
-          </a:fillRef>
-          <a:effectRef idx="0">
-            <a:schemeClr val="accent1"/>
-          </a:effectRef>
-          <a:fontRef idx="minor">
-            <a:schemeClr val="lt1"/>
-          </a:fontRef>
-        </p:style>
-        <p:txBody>
-          <a:bodyPr rtlCol="0" anchor="ctr"/>
-          <a:lstStyle/>
-          <a:p>
-            <a:pPr algn="ctr"/>
-            <a:endParaRPr lang="zh-CN" altLang="en-US"/>
-          </a:p>
-        </p:txBody>
-      </p:sp>
-      <p:sp>
-        <p:nvSpPr>
-          <p:cNvPr id="8" name="箭头: 右 7">
-            <a:extLst>
-              <a:ext uri="{FF2B5EF4-FFF2-40B4-BE49-F238E27FC236}">
-                <a16:creationId xmlns:a16="http://schemas.microsoft.com/office/drawing/2014/main" id="{2AB37F00-3073-41A3-84E8-6DC94B148CAA}"/>
-              </a:ext>
-            </a:extLst>
-          </p:cNvPr>
-          <p:cNvSpPr/>
-          <p:nvPr/>
-        </p:nvSpPr>
-        <p:spPr>
-          <a:xfrm>
-            <a:off x="7978200" y="4243526"/>
-            <a:ext cx="861134" cy="550416"/>
-          </a:xfrm>
-          <a:prstGeom prst="rightArrow">
-            <a:avLst/>
-          </a:prstGeom>
-        </p:spPr>
-        <p:style>
-          <a:lnRef idx="2">
-            <a:schemeClr val="accent1">
-              <a:shade val="50000"/>
-            </a:schemeClr>
-          </a:lnRef>
-          <a:fillRef idx="1">
-            <a:schemeClr val="accent1"/>
-          </a:fillRef>
-          <a:effectRef idx="0">
-            <a:schemeClr val="accent1"/>
-          </a:effectRef>
-          <a:fontRef idx="minor">
-            <a:schemeClr val="lt1"/>
-          </a:fontRef>
-        </p:style>
-        <p:txBody>
-          <a:bodyPr rtlCol="0" anchor="ctr"/>
-          <a:lstStyle/>
-          <a:p>
-            <a:pPr algn="ctr"/>
-            <a:endParaRPr lang="zh-CN" altLang="en-US"/>
-          </a:p>
-        </p:txBody>
-      </p:sp>
-      <p:pic>
-        <p:nvPicPr>
-          <p:cNvPr id="10" name="图片 9">
-            <a:extLst>
-              <a:ext uri="{FF2B5EF4-FFF2-40B4-BE49-F238E27FC236}">
-                <a16:creationId xmlns:a16="http://schemas.microsoft.com/office/drawing/2014/main" id="{B55B565C-2137-46C5-9056-DD69D4CE75CC}"/>
-              </a:ext>
-            </a:extLst>
-          </p:cNvPr>
-          <p:cNvPicPr>
-            <a:picLocks noChangeAspect="1"/>
-          </p:cNvPicPr>
-          <p:nvPr/>
-        </p:nvPicPr>
-        <p:blipFill rotWithShape="1">
-          <a:blip r:embed="rId4">
-            <a:extLst>
-              <a:ext uri="{28A0092B-C50C-407E-A947-70E740481C1C}">
-                <a14:useLocalDpi xmlns:a14="http://schemas.microsoft.com/office/drawing/2010/main" val="0"/>
-              </a:ext>
-            </a:extLst>
-          </a:blip>
-          <a:srcRect r="20462" b="20367"/>
-          <a:stretch/>
-        </p:blipFill>
-        <p:spPr>
-          <a:xfrm>
-            <a:off x="9147641" y="2639201"/>
-            <a:ext cx="2952852" cy="4047926"/>
-          </a:xfrm>
-          <a:prstGeom prst="rect">
-            <a:avLst/>
-          </a:prstGeom>
         </p:spPr>
       </p:pic>
     </p:spTree>
     <p:extLst>
       <p:ext uri="{BB962C8B-B14F-4D97-AF65-F5344CB8AC3E}">
-        <p14:creationId xmlns:p14="http://schemas.microsoft.com/office/powerpoint/2010/main" val="2889703436"/>
+        <p14:creationId xmlns:p14="http://schemas.microsoft.com/office/powerpoint/2010/main" val="4240375110"/>
       </p:ext>
     </p:extLst>
   </p:cSld>

</xml_diff>

<commit_message>
Add the diagram picture
</commit_message>
<xml_diff>
--- a/系统设计/系统设计.pptx
+++ b/系统设计/系统设计.pptx
@@ -4,19 +4,22 @@
   <p:sldMasterIdLst>
     <p:sldMasterId id="2147483660" r:id="rId1"/>
   </p:sldMasterIdLst>
+  <p:notesMasterIdLst>
+    <p:notesMasterId r:id="rId18"/>
+  </p:notesMasterIdLst>
   <p:sldIdLst>
     <p:sldId id="490" r:id="rId2"/>
     <p:sldId id="486" r:id="rId3"/>
-    <p:sldId id="483" r:id="rId4"/>
-    <p:sldId id="485" r:id="rId5"/>
-    <p:sldId id="496" r:id="rId6"/>
-    <p:sldId id="484" r:id="rId7"/>
+    <p:sldId id="484" r:id="rId4"/>
+    <p:sldId id="496" r:id="rId5"/>
+    <p:sldId id="499" r:id="rId6"/>
+    <p:sldId id="500" r:id="rId7"/>
     <p:sldId id="498" r:id="rId8"/>
     <p:sldId id="487" r:id="rId9"/>
-    <p:sldId id="491" r:id="rId10"/>
-    <p:sldId id="497" r:id="rId11"/>
-    <p:sldId id="489" r:id="rId12"/>
-    <p:sldId id="494" r:id="rId13"/>
+    <p:sldId id="489" r:id="rId10"/>
+    <p:sldId id="494" r:id="rId11"/>
+    <p:sldId id="491" r:id="rId12"/>
+    <p:sldId id="497" r:id="rId13"/>
     <p:sldId id="488" r:id="rId14"/>
     <p:sldId id="495" r:id="rId15"/>
     <p:sldId id="492" r:id="rId16"/>
@@ -125,6 +128,355 @@
     </p:ext>
   </p:extLst>
 </p:presentation>
+</file>
+
+<file path=ppt/notesMasters/notesMaster1.xml><?xml version="1.0" encoding="utf-8"?>
+<p:notesMaster xmlns:a="http://schemas.openxmlformats.org/drawingml/2006/main" xmlns:r="http://schemas.openxmlformats.org/officeDocument/2006/relationships" xmlns:p="http://schemas.openxmlformats.org/presentationml/2006/main">
+  <p:cSld>
+    <p:bg>
+      <p:bgRef idx="1001">
+        <a:schemeClr val="bg1"/>
+      </p:bgRef>
+    </p:bg>
+    <p:spTree>
+      <p:nvGrpSpPr>
+        <p:cNvPr id="1" name=""/>
+        <p:cNvGrpSpPr/>
+        <p:nvPr/>
+      </p:nvGrpSpPr>
+      <p:grpSpPr>
+        <a:xfrm>
+          <a:off x="0" y="0"/>
+          <a:ext cx="0" cy="0"/>
+          <a:chOff x="0" y="0"/>
+          <a:chExt cx="0" cy="0"/>
+        </a:xfrm>
+      </p:grpSpPr>
+      <p:sp>
+        <p:nvSpPr>
+          <p:cNvPr id="2" name="页眉占位符 1"/>
+          <p:cNvSpPr>
+            <a:spLocks noGrp="1"/>
+          </p:cNvSpPr>
+          <p:nvPr>
+            <p:ph type="hdr" sz="quarter"/>
+          </p:nvPr>
+        </p:nvSpPr>
+        <p:spPr>
+          <a:xfrm>
+            <a:off x="0" y="0"/>
+            <a:ext cx="2971800" cy="458788"/>
+          </a:xfrm>
+          <a:prstGeom prst="rect">
+            <a:avLst/>
+          </a:prstGeom>
+        </p:spPr>
+        <p:txBody>
+          <a:bodyPr vert="horz" lIns="91440" tIns="45720" rIns="91440" bIns="45720" rtlCol="0"/>
+          <a:lstStyle>
+            <a:lvl1pPr algn="l">
+              <a:defRPr sz="1200"/>
+            </a:lvl1pPr>
+          </a:lstStyle>
+          <a:p>
+            <a:endParaRPr lang="zh-CN" altLang="en-US"/>
+          </a:p>
+        </p:txBody>
+      </p:sp>
+      <p:sp>
+        <p:nvSpPr>
+          <p:cNvPr id="3" name="日期占位符 2"/>
+          <p:cNvSpPr>
+            <a:spLocks noGrp="1"/>
+          </p:cNvSpPr>
+          <p:nvPr>
+            <p:ph type="dt" idx="1"/>
+          </p:nvPr>
+        </p:nvSpPr>
+        <p:spPr>
+          <a:xfrm>
+            <a:off x="3884613" y="0"/>
+            <a:ext cx="2971800" cy="458788"/>
+          </a:xfrm>
+          <a:prstGeom prst="rect">
+            <a:avLst/>
+          </a:prstGeom>
+        </p:spPr>
+        <p:txBody>
+          <a:bodyPr vert="horz" lIns="91440" tIns="45720" rIns="91440" bIns="45720" rtlCol="0"/>
+          <a:lstStyle>
+            <a:lvl1pPr algn="r">
+              <a:defRPr sz="1200"/>
+            </a:lvl1pPr>
+          </a:lstStyle>
+          <a:p>
+            <a:fld id="{DD3E9601-30D4-4ACD-B5EC-D1E926FDFD69}" type="datetimeFigureOut">
+              <a:rPr lang="zh-CN" altLang="en-US" smtClean="0"/>
+              <a:t>2022/4/11</a:t>
+            </a:fld>
+            <a:endParaRPr lang="zh-CN" altLang="en-US"/>
+          </a:p>
+        </p:txBody>
+      </p:sp>
+      <p:sp>
+        <p:nvSpPr>
+          <p:cNvPr id="4" name="幻灯片图像占位符 3"/>
+          <p:cNvSpPr>
+            <a:spLocks noGrp="1" noRot="1" noChangeAspect="1"/>
+          </p:cNvSpPr>
+          <p:nvPr>
+            <p:ph type="sldImg" idx="2"/>
+          </p:nvPr>
+        </p:nvSpPr>
+        <p:spPr>
+          <a:xfrm>
+            <a:off x="685800" y="1143000"/>
+            <a:ext cx="5486400" cy="3086100"/>
+          </a:xfrm>
+          <a:prstGeom prst="rect">
+            <a:avLst/>
+          </a:prstGeom>
+          <a:noFill/>
+          <a:ln w="12700">
+            <a:solidFill>
+              <a:prstClr val="black"/>
+            </a:solidFill>
+          </a:ln>
+        </p:spPr>
+        <p:txBody>
+          <a:bodyPr vert="horz" lIns="91440" tIns="45720" rIns="91440" bIns="45720" rtlCol="0" anchor="ctr"/>
+          <a:lstStyle/>
+          <a:p>
+            <a:endParaRPr lang="zh-CN" altLang="en-US"/>
+          </a:p>
+        </p:txBody>
+      </p:sp>
+      <p:sp>
+        <p:nvSpPr>
+          <p:cNvPr id="5" name="备注占位符 4"/>
+          <p:cNvSpPr>
+            <a:spLocks noGrp="1"/>
+          </p:cNvSpPr>
+          <p:nvPr>
+            <p:ph type="body" sz="quarter" idx="3"/>
+          </p:nvPr>
+        </p:nvSpPr>
+        <p:spPr>
+          <a:xfrm>
+            <a:off x="685800" y="4400550"/>
+            <a:ext cx="5486400" cy="3600450"/>
+          </a:xfrm>
+          <a:prstGeom prst="rect">
+            <a:avLst/>
+          </a:prstGeom>
+        </p:spPr>
+        <p:txBody>
+          <a:bodyPr vert="horz" lIns="91440" tIns="45720" rIns="91440" bIns="45720" rtlCol="0"/>
+          <a:lstStyle/>
+          <a:p>
+            <a:pPr lvl="0"/>
+            <a:r>
+              <a:rPr lang="zh-CN" altLang="en-US"/>
+              <a:t>单击此处编辑母版文本样式</a:t>
+            </a:r>
+          </a:p>
+          <a:p>
+            <a:pPr lvl="1"/>
+            <a:r>
+              <a:rPr lang="zh-CN" altLang="en-US"/>
+              <a:t>二级</a:t>
+            </a:r>
+          </a:p>
+          <a:p>
+            <a:pPr lvl="2"/>
+            <a:r>
+              <a:rPr lang="zh-CN" altLang="en-US"/>
+              <a:t>三级</a:t>
+            </a:r>
+          </a:p>
+          <a:p>
+            <a:pPr lvl="3"/>
+            <a:r>
+              <a:rPr lang="zh-CN" altLang="en-US"/>
+              <a:t>四级</a:t>
+            </a:r>
+          </a:p>
+          <a:p>
+            <a:pPr lvl="4"/>
+            <a:r>
+              <a:rPr lang="zh-CN" altLang="en-US"/>
+              <a:t>五级</a:t>
+            </a:r>
+          </a:p>
+        </p:txBody>
+      </p:sp>
+      <p:sp>
+        <p:nvSpPr>
+          <p:cNvPr id="6" name="页脚占位符 5"/>
+          <p:cNvSpPr>
+            <a:spLocks noGrp="1"/>
+          </p:cNvSpPr>
+          <p:nvPr>
+            <p:ph type="ftr" sz="quarter" idx="4"/>
+          </p:nvPr>
+        </p:nvSpPr>
+        <p:spPr>
+          <a:xfrm>
+            <a:off x="0" y="8685213"/>
+            <a:ext cx="2971800" cy="458787"/>
+          </a:xfrm>
+          <a:prstGeom prst="rect">
+            <a:avLst/>
+          </a:prstGeom>
+        </p:spPr>
+        <p:txBody>
+          <a:bodyPr vert="horz" lIns="91440" tIns="45720" rIns="91440" bIns="45720" rtlCol="0" anchor="b"/>
+          <a:lstStyle>
+            <a:lvl1pPr algn="l">
+              <a:defRPr sz="1200"/>
+            </a:lvl1pPr>
+          </a:lstStyle>
+          <a:p>
+            <a:endParaRPr lang="zh-CN" altLang="en-US"/>
+          </a:p>
+        </p:txBody>
+      </p:sp>
+      <p:sp>
+        <p:nvSpPr>
+          <p:cNvPr id="7" name="灯片编号占位符 6"/>
+          <p:cNvSpPr>
+            <a:spLocks noGrp="1"/>
+          </p:cNvSpPr>
+          <p:nvPr>
+            <p:ph type="sldNum" sz="quarter" idx="5"/>
+          </p:nvPr>
+        </p:nvSpPr>
+        <p:spPr>
+          <a:xfrm>
+            <a:off x="3884613" y="8685213"/>
+            <a:ext cx="2971800" cy="458787"/>
+          </a:xfrm>
+          <a:prstGeom prst="rect">
+            <a:avLst/>
+          </a:prstGeom>
+        </p:spPr>
+        <p:txBody>
+          <a:bodyPr vert="horz" lIns="91440" tIns="45720" rIns="91440" bIns="45720" rtlCol="0" anchor="b"/>
+          <a:lstStyle>
+            <a:lvl1pPr algn="r">
+              <a:defRPr sz="1200"/>
+            </a:lvl1pPr>
+          </a:lstStyle>
+          <a:p>
+            <a:fld id="{39644C0B-163E-45B0-89C0-530C4D52ED8A}" type="slidenum">
+              <a:rPr lang="zh-CN" altLang="en-US" smtClean="0"/>
+              <a:t>‹#›</a:t>
+            </a:fld>
+            <a:endParaRPr lang="zh-CN" altLang="en-US"/>
+          </a:p>
+        </p:txBody>
+      </p:sp>
+    </p:spTree>
+    <p:extLst>
+      <p:ext uri="{BB962C8B-B14F-4D97-AF65-F5344CB8AC3E}">
+        <p14:creationId xmlns:p14="http://schemas.microsoft.com/office/powerpoint/2010/main" val="2339262696"/>
+      </p:ext>
+    </p:extLst>
+  </p:cSld>
+  <p:clrMap bg1="lt1" tx1="dk1" bg2="lt2" tx2="dk2" accent1="accent1" accent2="accent2" accent3="accent3" accent4="accent4" accent5="accent5" accent6="accent6" hlink="hlink" folHlink="folHlink"/>
+  <p:notesStyle>
+    <a:lvl1pPr marL="0" algn="l" defTabSz="914400" rtl="0" eaLnBrk="1" latinLnBrk="0" hangingPunct="1">
+      <a:defRPr sz="1200" kern="1200">
+        <a:solidFill>
+          <a:schemeClr val="tx1"/>
+        </a:solidFill>
+        <a:latin typeface="+mn-lt"/>
+        <a:ea typeface="+mn-ea"/>
+        <a:cs typeface="+mn-cs"/>
+      </a:defRPr>
+    </a:lvl1pPr>
+    <a:lvl2pPr marL="457200" algn="l" defTabSz="914400" rtl="0" eaLnBrk="1" latinLnBrk="0" hangingPunct="1">
+      <a:defRPr sz="1200" kern="1200">
+        <a:solidFill>
+          <a:schemeClr val="tx1"/>
+        </a:solidFill>
+        <a:latin typeface="+mn-lt"/>
+        <a:ea typeface="+mn-ea"/>
+        <a:cs typeface="+mn-cs"/>
+      </a:defRPr>
+    </a:lvl2pPr>
+    <a:lvl3pPr marL="914400" algn="l" defTabSz="914400" rtl="0" eaLnBrk="1" latinLnBrk="0" hangingPunct="1">
+      <a:defRPr sz="1200" kern="1200">
+        <a:solidFill>
+          <a:schemeClr val="tx1"/>
+        </a:solidFill>
+        <a:latin typeface="+mn-lt"/>
+        <a:ea typeface="+mn-ea"/>
+        <a:cs typeface="+mn-cs"/>
+      </a:defRPr>
+    </a:lvl3pPr>
+    <a:lvl4pPr marL="1371600" algn="l" defTabSz="914400" rtl="0" eaLnBrk="1" latinLnBrk="0" hangingPunct="1">
+      <a:defRPr sz="1200" kern="1200">
+        <a:solidFill>
+          <a:schemeClr val="tx1"/>
+        </a:solidFill>
+        <a:latin typeface="+mn-lt"/>
+        <a:ea typeface="+mn-ea"/>
+        <a:cs typeface="+mn-cs"/>
+      </a:defRPr>
+    </a:lvl4pPr>
+    <a:lvl5pPr marL="1828800" algn="l" defTabSz="914400" rtl="0" eaLnBrk="1" latinLnBrk="0" hangingPunct="1">
+      <a:defRPr sz="1200" kern="1200">
+        <a:solidFill>
+          <a:schemeClr val="tx1"/>
+        </a:solidFill>
+        <a:latin typeface="+mn-lt"/>
+        <a:ea typeface="+mn-ea"/>
+        <a:cs typeface="+mn-cs"/>
+      </a:defRPr>
+    </a:lvl5pPr>
+    <a:lvl6pPr marL="2286000" algn="l" defTabSz="914400" rtl="0" eaLnBrk="1" latinLnBrk="0" hangingPunct="1">
+      <a:defRPr sz="1200" kern="1200">
+        <a:solidFill>
+          <a:schemeClr val="tx1"/>
+        </a:solidFill>
+        <a:latin typeface="+mn-lt"/>
+        <a:ea typeface="+mn-ea"/>
+        <a:cs typeface="+mn-cs"/>
+      </a:defRPr>
+    </a:lvl6pPr>
+    <a:lvl7pPr marL="2743200" algn="l" defTabSz="914400" rtl="0" eaLnBrk="1" latinLnBrk="0" hangingPunct="1">
+      <a:defRPr sz="1200" kern="1200">
+        <a:solidFill>
+          <a:schemeClr val="tx1"/>
+        </a:solidFill>
+        <a:latin typeface="+mn-lt"/>
+        <a:ea typeface="+mn-ea"/>
+        <a:cs typeface="+mn-cs"/>
+      </a:defRPr>
+    </a:lvl7pPr>
+    <a:lvl8pPr marL="3200400" algn="l" defTabSz="914400" rtl="0" eaLnBrk="1" latinLnBrk="0" hangingPunct="1">
+      <a:defRPr sz="1200" kern="1200">
+        <a:solidFill>
+          <a:schemeClr val="tx1"/>
+        </a:solidFill>
+        <a:latin typeface="+mn-lt"/>
+        <a:ea typeface="+mn-ea"/>
+        <a:cs typeface="+mn-cs"/>
+      </a:defRPr>
+    </a:lvl8pPr>
+    <a:lvl9pPr marL="3657600" algn="l" defTabSz="914400" rtl="0" eaLnBrk="1" latinLnBrk="0" hangingPunct="1">
+      <a:defRPr sz="1200" kern="1200">
+        <a:solidFill>
+          <a:schemeClr val="tx1"/>
+        </a:solidFill>
+        <a:latin typeface="+mn-lt"/>
+        <a:ea typeface="+mn-ea"/>
+        <a:cs typeface="+mn-cs"/>
+      </a:defRPr>
+    </a:lvl9pPr>
+  </p:notesStyle>
+</p:notesMaster>
 </file>
 
 <file path=ppt/slideLayouts/slideLayout1.xml><?xml version="1.0" encoding="utf-8"?>
@@ -1364,326 +1716,6 @@
           <p:cNvPr id="2" name="标题 1">
             <a:extLst>
               <a:ext uri="{FF2B5EF4-FFF2-40B4-BE49-F238E27FC236}">
-                <a16:creationId xmlns:a16="http://schemas.microsoft.com/office/drawing/2014/main" id="{1BDF98F6-A699-48E8-97C8-C6FE38DEBFA5}"/>
-              </a:ext>
-            </a:extLst>
-          </p:cNvPr>
-          <p:cNvSpPr>
-            <a:spLocks noGrp="1"/>
-          </p:cNvSpPr>
-          <p:nvPr>
-            <p:ph type="title"/>
-          </p:nvPr>
-        </p:nvSpPr>
-        <p:spPr/>
-        <p:txBody>
-          <a:bodyPr/>
-          <a:lstStyle/>
-          <a:p>
-            <a:r>
-              <a:rPr lang="zh-CN" altLang="en-US"/>
-              <a:t>提示图书位置移动 方案二</a:t>
-            </a:r>
-          </a:p>
-        </p:txBody>
-      </p:sp>
-      <p:pic>
-        <p:nvPicPr>
-          <p:cNvPr id="8" name="内容占位符 7">
-            <a:extLst>
-              <a:ext uri="{FF2B5EF4-FFF2-40B4-BE49-F238E27FC236}">
-                <a16:creationId xmlns:a16="http://schemas.microsoft.com/office/drawing/2014/main" id="{20CFF730-FA72-4F16-87BA-08EDE9304208}"/>
-              </a:ext>
-            </a:extLst>
-          </p:cNvPr>
-          <p:cNvPicPr>
-            <a:picLocks noGrp="1" noChangeAspect="1"/>
-          </p:cNvPicPr>
-          <p:nvPr>
-            <p:ph idx="1"/>
-          </p:nvPr>
-        </p:nvPicPr>
-        <p:blipFill>
-          <a:blip r:embed="rId2">
-            <a:extLst>
-              <a:ext uri="{28A0092B-C50C-407E-A947-70E740481C1C}">
-                <a14:useLocalDpi xmlns:a14="http://schemas.microsoft.com/office/drawing/2010/main" val="0"/>
-              </a:ext>
-            </a:extLst>
-          </a:blip>
-          <a:stretch>
-            <a:fillRect/>
-          </a:stretch>
-        </p:blipFill>
-        <p:spPr>
-          <a:xfrm>
-            <a:off x="941033" y="1642247"/>
-            <a:ext cx="9154494" cy="4960563"/>
-          </a:xfrm>
-        </p:spPr>
-      </p:pic>
-    </p:spTree>
-    <p:extLst>
-      <p:ext uri="{BB962C8B-B14F-4D97-AF65-F5344CB8AC3E}">
-        <p14:creationId xmlns:p14="http://schemas.microsoft.com/office/powerpoint/2010/main" val="4158969249"/>
-      </p:ext>
-    </p:extLst>
-  </p:cSld>
-  <p:clrMapOvr>
-    <a:masterClrMapping/>
-  </p:clrMapOvr>
-</p:sld>
-</file>
-
-<file path=ppt/slides/slide11.xml><?xml version="1.0" encoding="utf-8"?>
-<p:sld xmlns:a="http://schemas.openxmlformats.org/drawingml/2006/main" xmlns:r="http://schemas.openxmlformats.org/officeDocument/2006/relationships" xmlns:p="http://schemas.openxmlformats.org/presentationml/2006/main">
-  <p:cSld>
-    <p:spTree>
-      <p:nvGrpSpPr>
-        <p:cNvPr id="1" name=""/>
-        <p:cNvGrpSpPr/>
-        <p:nvPr/>
-      </p:nvGrpSpPr>
-      <p:grpSpPr>
-        <a:xfrm>
-          <a:off x="0" y="0"/>
-          <a:ext cx="0" cy="0"/>
-          <a:chOff x="0" y="0"/>
-          <a:chExt cx="0" cy="0"/>
-        </a:xfrm>
-      </p:grpSpPr>
-      <p:sp>
-        <p:nvSpPr>
-          <p:cNvPr id="2" name="标题 1">
-            <a:extLst>
-              <a:ext uri="{FF2B5EF4-FFF2-40B4-BE49-F238E27FC236}">
-                <a16:creationId xmlns:a16="http://schemas.microsoft.com/office/drawing/2014/main" id="{33F77340-5760-4A10-8D26-27385B15F659}"/>
-              </a:ext>
-            </a:extLst>
-          </p:cNvPr>
-          <p:cNvSpPr>
-            <a:spLocks noGrp="1"/>
-          </p:cNvSpPr>
-          <p:nvPr>
-            <p:ph type="title"/>
-          </p:nvPr>
-        </p:nvSpPr>
-        <p:spPr/>
-        <p:txBody>
-          <a:bodyPr/>
-          <a:lstStyle/>
-          <a:p>
-            <a:r>
-              <a:rPr lang="zh-CN" altLang="en-US"/>
-              <a:t>图像预处理</a:t>
-            </a:r>
-          </a:p>
-        </p:txBody>
-      </p:sp>
-      <p:sp>
-        <p:nvSpPr>
-          <p:cNvPr id="3" name="内容占位符 2">
-            <a:extLst>
-              <a:ext uri="{FF2B5EF4-FFF2-40B4-BE49-F238E27FC236}">
-                <a16:creationId xmlns:a16="http://schemas.microsoft.com/office/drawing/2014/main" id="{C896692B-FCF4-4485-9643-AEC10FED93E4}"/>
-              </a:ext>
-            </a:extLst>
-          </p:cNvPr>
-          <p:cNvSpPr>
-            <a:spLocks noGrp="1"/>
-          </p:cNvSpPr>
-          <p:nvPr>
-            <p:ph idx="1"/>
-          </p:nvPr>
-        </p:nvSpPr>
-        <p:spPr/>
-        <p:txBody>
-          <a:bodyPr>
-            <a:normAutofit fontScale="92500" lnSpcReduction="20000"/>
-          </a:bodyPr>
-          <a:lstStyle/>
-          <a:p>
-            <a:r>
-              <a:rPr lang="zh-CN" altLang="en-US"/>
-              <a:t>透视校正</a:t>
-            </a:r>
-            <a:endParaRPr lang="en-US" altLang="zh-CN"/>
-          </a:p>
-          <a:p>
-            <a:pPr lvl="1"/>
-            <a:r>
-              <a:rPr lang="zh-CN" altLang="en-US"/>
-              <a:t>方法</a:t>
-            </a:r>
-            <a:endParaRPr lang="en-US" altLang="zh-CN"/>
-          </a:p>
-          <a:p>
-            <a:pPr lvl="2"/>
-            <a:r>
-              <a:rPr lang="zh-CN" altLang="en-US"/>
-              <a:t>使用霍夫线检测的方法，计算检测出的直线平均角度</a:t>
-            </a:r>
-            <a:endParaRPr lang="en-US" altLang="zh-CN"/>
-          </a:p>
-          <a:p>
-            <a:pPr lvl="1"/>
-            <a:r>
-              <a:rPr lang="zh-CN" altLang="en-US"/>
-              <a:t>问题</a:t>
-            </a:r>
-            <a:endParaRPr lang="en-US" altLang="zh-CN"/>
-          </a:p>
-          <a:p>
-            <a:pPr lvl="2"/>
-            <a:r>
-              <a:rPr lang="zh-CN" altLang="en-US"/>
-              <a:t>效果有限</a:t>
-            </a:r>
-            <a:endParaRPr lang="en-US" altLang="zh-CN"/>
-          </a:p>
-          <a:p>
-            <a:pPr lvl="2"/>
-            <a:r>
-              <a:rPr lang="zh-CN" altLang="en-US"/>
-              <a:t>不能解决书籍完全拿反的问题</a:t>
-            </a:r>
-            <a:endParaRPr lang="en-US" altLang="zh-CN"/>
-          </a:p>
-          <a:p>
-            <a:r>
-              <a:rPr lang="zh-CN" altLang="en-US"/>
-              <a:t>清晰度的增强</a:t>
-            </a:r>
-            <a:endParaRPr lang="en-US" altLang="zh-CN"/>
-          </a:p>
-          <a:p>
-            <a:pPr lvl="1"/>
-            <a:r>
-              <a:rPr lang="zh-CN" altLang="en-US"/>
-              <a:t>方法</a:t>
-            </a:r>
-            <a:endParaRPr lang="en-US" altLang="zh-CN"/>
-          </a:p>
-          <a:p>
-            <a:pPr lvl="2"/>
-            <a:r>
-              <a:rPr lang="zh-CN" altLang="en-US"/>
-              <a:t>二值化</a:t>
-            </a:r>
-            <a:endParaRPr lang="en-US" altLang="zh-CN"/>
-          </a:p>
-          <a:p>
-            <a:pPr lvl="2"/>
-            <a:r>
-              <a:rPr lang="zh-CN" altLang="en-US"/>
-              <a:t>摄像头分辨率提高</a:t>
-            </a:r>
-            <a:endParaRPr lang="en-US" altLang="zh-CN"/>
-          </a:p>
-          <a:p>
-            <a:pPr lvl="1"/>
-            <a:r>
-              <a:rPr lang="zh-CN" altLang="en-US"/>
-              <a:t>注：</a:t>
-            </a:r>
-            <a:r>
-              <a:rPr lang="en-US" altLang="zh-CN"/>
-              <a:t>API</a:t>
-            </a:r>
-            <a:r>
-              <a:rPr lang="zh-CN" altLang="en-US"/>
-              <a:t>接口图片大小不能超过</a:t>
-            </a:r>
-            <a:r>
-              <a:rPr lang="en-US" altLang="zh-CN"/>
-              <a:t>4MB</a:t>
-            </a:r>
-            <a:r>
-              <a:rPr lang="zh-CN" altLang="en-US"/>
-              <a:t>（高清版不能超过</a:t>
-            </a:r>
-            <a:r>
-              <a:rPr lang="en-US" altLang="zh-CN"/>
-              <a:t>10MB</a:t>
-            </a:r>
-            <a:r>
-              <a:rPr lang="zh-CN" altLang="en-US"/>
-              <a:t>）</a:t>
-            </a:r>
-            <a:endParaRPr lang="en-US" altLang="zh-CN"/>
-          </a:p>
-        </p:txBody>
-      </p:sp>
-      <p:pic>
-        <p:nvPicPr>
-          <p:cNvPr id="5" name="图片 4">
-            <a:extLst>
-              <a:ext uri="{FF2B5EF4-FFF2-40B4-BE49-F238E27FC236}">
-                <a16:creationId xmlns:a16="http://schemas.microsoft.com/office/drawing/2014/main" id="{E4F8A9EA-8574-45A6-82F3-84742CA77138}"/>
-              </a:ext>
-            </a:extLst>
-          </p:cNvPr>
-          <p:cNvPicPr>
-            <a:picLocks noChangeAspect="1"/>
-          </p:cNvPicPr>
-          <p:nvPr/>
-        </p:nvPicPr>
-        <p:blipFill rotWithShape="1">
-          <a:blip r:embed="rId2">
-            <a:extLst>
-              <a:ext uri="{28A0092B-C50C-407E-A947-70E740481C1C}">
-                <a14:useLocalDpi xmlns:a14="http://schemas.microsoft.com/office/drawing/2010/main" val="0"/>
-              </a:ext>
-            </a:extLst>
-          </a:blip>
-          <a:srcRect r="21059" b="21530"/>
-          <a:stretch/>
-        </p:blipFill>
-        <p:spPr>
-          <a:xfrm>
-            <a:off x="8191395" y="1467034"/>
-            <a:ext cx="3336141" cy="4540639"/>
-          </a:xfrm>
-          <a:prstGeom prst="rect">
-            <a:avLst/>
-          </a:prstGeom>
-        </p:spPr>
-      </p:pic>
-    </p:spTree>
-    <p:extLst>
-      <p:ext uri="{BB962C8B-B14F-4D97-AF65-F5344CB8AC3E}">
-        <p14:creationId xmlns:p14="http://schemas.microsoft.com/office/powerpoint/2010/main" val="267944224"/>
-      </p:ext>
-    </p:extLst>
-  </p:cSld>
-  <p:clrMapOvr>
-    <a:masterClrMapping/>
-  </p:clrMapOvr>
-</p:sld>
-</file>
-
-<file path=ppt/slides/slide12.xml><?xml version="1.0" encoding="utf-8"?>
-<p:sld xmlns:a="http://schemas.openxmlformats.org/drawingml/2006/main" xmlns:r="http://schemas.openxmlformats.org/officeDocument/2006/relationships" xmlns:p="http://schemas.openxmlformats.org/presentationml/2006/main">
-  <p:cSld>
-    <p:spTree>
-      <p:nvGrpSpPr>
-        <p:cNvPr id="1" name=""/>
-        <p:cNvGrpSpPr/>
-        <p:nvPr/>
-      </p:nvGrpSpPr>
-      <p:grpSpPr>
-        <a:xfrm>
-          <a:off x="0" y="0"/>
-          <a:ext cx="0" cy="0"/>
-          <a:chOff x="0" y="0"/>
-          <a:chExt cx="0" cy="0"/>
-        </a:xfrm>
-      </p:grpSpPr>
-      <p:sp>
-        <p:nvSpPr>
-          <p:cNvPr id="2" name="标题 1">
-            <a:extLst>
-              <a:ext uri="{FF2B5EF4-FFF2-40B4-BE49-F238E27FC236}">
                 <a16:creationId xmlns:a16="http://schemas.microsoft.com/office/drawing/2014/main" id="{1AF6043D-7032-4087-B8D9-F54F67F1A07D}"/>
               </a:ext>
             </a:extLst>
@@ -1966,6 +1998,192 @@
     <p:extLst>
       <p:ext uri="{BB962C8B-B14F-4D97-AF65-F5344CB8AC3E}">
         <p14:creationId xmlns:p14="http://schemas.microsoft.com/office/powerpoint/2010/main" val="2889703436"/>
+      </p:ext>
+    </p:extLst>
+  </p:cSld>
+  <p:clrMapOvr>
+    <a:masterClrMapping/>
+  </p:clrMapOvr>
+</p:sld>
+</file>
+
+<file path=ppt/slides/slide11.xml><?xml version="1.0" encoding="utf-8"?>
+<p:sld xmlns:a="http://schemas.openxmlformats.org/drawingml/2006/main" xmlns:r="http://schemas.openxmlformats.org/officeDocument/2006/relationships" xmlns:p="http://schemas.openxmlformats.org/presentationml/2006/main">
+  <p:cSld>
+    <p:spTree>
+      <p:nvGrpSpPr>
+        <p:cNvPr id="1" name=""/>
+        <p:cNvGrpSpPr/>
+        <p:nvPr/>
+      </p:nvGrpSpPr>
+      <p:grpSpPr>
+        <a:xfrm>
+          <a:off x="0" y="0"/>
+          <a:ext cx="0" cy="0"/>
+          <a:chOff x="0" y="0"/>
+          <a:chExt cx="0" cy="0"/>
+        </a:xfrm>
+      </p:grpSpPr>
+      <p:sp>
+        <p:nvSpPr>
+          <p:cNvPr id="2" name="标题 1">
+            <a:extLst>
+              <a:ext uri="{FF2B5EF4-FFF2-40B4-BE49-F238E27FC236}">
+                <a16:creationId xmlns:a16="http://schemas.microsoft.com/office/drawing/2014/main" id="{1BDF98F6-A699-48E8-97C8-C6FE38DEBFA5}"/>
+              </a:ext>
+            </a:extLst>
+          </p:cNvPr>
+          <p:cNvSpPr>
+            <a:spLocks noGrp="1"/>
+          </p:cNvSpPr>
+          <p:nvPr>
+            <p:ph type="title"/>
+          </p:nvPr>
+        </p:nvSpPr>
+        <p:spPr/>
+        <p:txBody>
+          <a:bodyPr/>
+          <a:lstStyle/>
+          <a:p>
+            <a:r>
+              <a:rPr lang="zh-CN" altLang="en-US"/>
+              <a:t>提示图书位置移动 方案一</a:t>
+            </a:r>
+          </a:p>
+        </p:txBody>
+      </p:sp>
+      <p:pic>
+        <p:nvPicPr>
+          <p:cNvPr id="5" name="内容占位符 4">
+            <a:extLst>
+              <a:ext uri="{FF2B5EF4-FFF2-40B4-BE49-F238E27FC236}">
+                <a16:creationId xmlns:a16="http://schemas.microsoft.com/office/drawing/2014/main" id="{DA0FB7AF-9231-4779-95C8-328B8B57C813}"/>
+              </a:ext>
+            </a:extLst>
+          </p:cNvPr>
+          <p:cNvPicPr>
+            <a:picLocks noGrp="1" noChangeAspect="1"/>
+          </p:cNvPicPr>
+          <p:nvPr>
+            <p:ph idx="1"/>
+          </p:nvPr>
+        </p:nvPicPr>
+        <p:blipFill>
+          <a:blip r:embed="rId2">
+            <a:extLst>
+              <a:ext uri="{28A0092B-C50C-407E-A947-70E740481C1C}">
+                <a14:useLocalDpi xmlns:a14="http://schemas.microsoft.com/office/drawing/2010/main" val="0"/>
+              </a:ext>
+            </a:extLst>
+          </a:blip>
+          <a:stretch>
+            <a:fillRect/>
+          </a:stretch>
+        </p:blipFill>
+        <p:spPr>
+          <a:xfrm>
+            <a:off x="853198" y="1631127"/>
+            <a:ext cx="9935204" cy="4796306"/>
+          </a:xfrm>
+        </p:spPr>
+      </p:pic>
+    </p:spTree>
+    <p:extLst>
+      <p:ext uri="{BB962C8B-B14F-4D97-AF65-F5344CB8AC3E}">
+        <p14:creationId xmlns:p14="http://schemas.microsoft.com/office/powerpoint/2010/main" val="4240375110"/>
+      </p:ext>
+    </p:extLst>
+  </p:cSld>
+  <p:clrMapOvr>
+    <a:masterClrMapping/>
+  </p:clrMapOvr>
+</p:sld>
+</file>
+
+<file path=ppt/slides/slide12.xml><?xml version="1.0" encoding="utf-8"?>
+<p:sld xmlns:a="http://schemas.openxmlformats.org/drawingml/2006/main" xmlns:r="http://schemas.openxmlformats.org/officeDocument/2006/relationships" xmlns:p="http://schemas.openxmlformats.org/presentationml/2006/main">
+  <p:cSld>
+    <p:spTree>
+      <p:nvGrpSpPr>
+        <p:cNvPr id="1" name=""/>
+        <p:cNvGrpSpPr/>
+        <p:nvPr/>
+      </p:nvGrpSpPr>
+      <p:grpSpPr>
+        <a:xfrm>
+          <a:off x="0" y="0"/>
+          <a:ext cx="0" cy="0"/>
+          <a:chOff x="0" y="0"/>
+          <a:chExt cx="0" cy="0"/>
+        </a:xfrm>
+      </p:grpSpPr>
+      <p:sp>
+        <p:nvSpPr>
+          <p:cNvPr id="2" name="标题 1">
+            <a:extLst>
+              <a:ext uri="{FF2B5EF4-FFF2-40B4-BE49-F238E27FC236}">
+                <a16:creationId xmlns:a16="http://schemas.microsoft.com/office/drawing/2014/main" id="{1BDF98F6-A699-48E8-97C8-C6FE38DEBFA5}"/>
+              </a:ext>
+            </a:extLst>
+          </p:cNvPr>
+          <p:cNvSpPr>
+            <a:spLocks noGrp="1"/>
+          </p:cNvSpPr>
+          <p:nvPr>
+            <p:ph type="title"/>
+          </p:nvPr>
+        </p:nvSpPr>
+        <p:spPr/>
+        <p:txBody>
+          <a:bodyPr/>
+          <a:lstStyle/>
+          <a:p>
+            <a:r>
+              <a:rPr lang="zh-CN" altLang="en-US"/>
+              <a:t>提示图书位置移动 方案二</a:t>
+            </a:r>
+          </a:p>
+        </p:txBody>
+      </p:sp>
+      <p:pic>
+        <p:nvPicPr>
+          <p:cNvPr id="8" name="内容占位符 7">
+            <a:extLst>
+              <a:ext uri="{FF2B5EF4-FFF2-40B4-BE49-F238E27FC236}">
+                <a16:creationId xmlns:a16="http://schemas.microsoft.com/office/drawing/2014/main" id="{20CFF730-FA72-4F16-87BA-08EDE9304208}"/>
+              </a:ext>
+            </a:extLst>
+          </p:cNvPr>
+          <p:cNvPicPr>
+            <a:picLocks noGrp="1" noChangeAspect="1"/>
+          </p:cNvPicPr>
+          <p:nvPr>
+            <p:ph idx="1"/>
+          </p:nvPr>
+        </p:nvPicPr>
+        <p:blipFill>
+          <a:blip r:embed="rId2">
+            <a:extLst>
+              <a:ext uri="{28A0092B-C50C-407E-A947-70E740481C1C}">
+                <a14:useLocalDpi xmlns:a14="http://schemas.microsoft.com/office/drawing/2010/main" val="0"/>
+              </a:ext>
+            </a:extLst>
+          </a:blip>
+          <a:stretch>
+            <a:fillRect/>
+          </a:stretch>
+        </p:blipFill>
+        <p:spPr>
+          <a:xfrm>
+            <a:off x="941033" y="1642247"/>
+            <a:ext cx="9154494" cy="4960563"/>
+          </a:xfrm>
+        </p:spPr>
+      </p:pic>
+    </p:spTree>
+    <p:extLst>
+      <p:ext uri="{BB962C8B-B14F-4D97-AF65-F5344CB8AC3E}">
+        <p14:creationId xmlns:p14="http://schemas.microsoft.com/office/powerpoint/2010/main" val="4158969249"/>
       </p:ext>
     </p:extLst>
   </p:cSld>
@@ -3891,7 +4109,7 @@
           <p:nvPr>
             <p:extLst>
               <p:ext uri="{D42A27DB-BD31-4B8C-83A1-F6EECF244321}">
-                <p14:modId xmlns:p14="http://schemas.microsoft.com/office/powerpoint/2010/main" val="1842509716"/>
+                <p14:modId xmlns:p14="http://schemas.microsoft.com/office/powerpoint/2010/main" val="3226965138"/>
               </p:ext>
             </p:extLst>
           </p:nvPr>
@@ -3951,7 +4169,7 @@
                     <a:p>
                       <a:pPr algn="ctr"/>
                       <a:r>
-                        <a:rPr lang="zh-CN" altLang="en-US"/>
+                        <a:rPr lang="zh-CN" altLang="en-US" sz="1800"/>
                         <a:t>方案</a:t>
                       </a:r>
                     </a:p>
@@ -3965,7 +4183,7 @@
                     <a:p>
                       <a:pPr algn="ctr"/>
                       <a:r>
-                        <a:rPr lang="zh-CN" altLang="en-US"/>
+                        <a:rPr lang="zh-CN" altLang="en-US" sz="1800"/>
                         <a:t>精度（待进一步评估）</a:t>
                       </a:r>
                     </a:p>
@@ -3979,7 +4197,7 @@
                     <a:p>
                       <a:pPr algn="ctr"/>
                       <a:r>
-                        <a:rPr lang="zh-CN" altLang="en-US"/>
+                        <a:rPr lang="zh-CN" altLang="en-US" sz="1800"/>
                         <a:t>鲁棒性</a:t>
                       </a:r>
                     </a:p>
@@ -3993,7 +4211,7 @@
                     <a:p>
                       <a:pPr algn="ctr"/>
                       <a:r>
-                        <a:rPr lang="zh-CN" altLang="en-US"/>
+                        <a:rPr lang="zh-CN" altLang="en-US" sz="1800"/>
                         <a:t>实时性</a:t>
                       </a:r>
                     </a:p>
@@ -4007,7 +4225,7 @@
                     <a:p>
                       <a:pPr algn="ctr"/>
                       <a:r>
-                        <a:rPr lang="zh-CN" altLang="en-US"/>
+                        <a:rPr lang="zh-CN" altLang="en-US" sz="1800"/>
                         <a:t>灵活性</a:t>
                       </a:r>
                     </a:p>
@@ -4028,7 +4246,7 @@
                     <a:p>
                       <a:pPr algn="ctr"/>
                       <a:r>
-                        <a:rPr lang="en-US" altLang="zh-CN" b="1">
+                        <a:rPr lang="en-US" altLang="zh-CN" sz="2000" b="1">
                           <a:solidFill>
                             <a:srgbClr val="FF0000"/>
                           </a:solidFill>
@@ -4036,7 +4254,7 @@
                         <a:t>Opencv</a:t>
                       </a:r>
                       <a:r>
-                        <a:rPr lang="zh-CN" altLang="en-US" b="1">
+                        <a:rPr lang="zh-CN" altLang="en-US" sz="2000" b="1">
                           <a:solidFill>
                             <a:srgbClr val="FF0000"/>
                           </a:solidFill>
@@ -4054,10 +4272,10 @@
                     <a:p>
                       <a:pPr algn="ctr"/>
                       <a:r>
-                        <a:rPr lang="en-US" altLang="zh-CN"/>
+                        <a:rPr lang="en-US" altLang="zh-CN" sz="2000"/>
                         <a:t>=</a:t>
                       </a:r>
-                      <a:endParaRPr lang="zh-CN" altLang="en-US"/>
+                      <a:endParaRPr lang="zh-CN" altLang="en-US" sz="2000"/>
                     </a:p>
                   </a:txBody>
                   <a:tcPr anchor="ctr"/>
@@ -4067,7 +4285,7 @@
                     <a:bodyPr/>
                     <a:lstStyle/>
                     <a:p>
-                      <a:endParaRPr lang="zh-CN" altLang="en-US"/>
+                      <a:endParaRPr lang="zh-CN" altLang="en-US" sz="2000"/>
                     </a:p>
                   </a:txBody>
                   <a:tcPr anchor="ctr"/>
@@ -4079,7 +4297,7 @@
                     <a:p>
                       <a:pPr algn="ctr"/>
                       <a:r>
-                        <a:rPr lang="zh-CN" altLang="en-US"/>
+                        <a:rPr lang="zh-CN" altLang="en-US" sz="2000"/>
                         <a:t>√</a:t>
                       </a:r>
                     </a:p>
@@ -4093,7 +4311,7 @@
                     <a:p>
                       <a:pPr algn="ctr"/>
                       <a:r>
-                        <a:rPr lang="zh-CN" altLang="en-US"/>
+                        <a:rPr lang="zh-CN" altLang="en-US" sz="2000"/>
                         <a:t>√</a:t>
                       </a:r>
                     </a:p>
@@ -4114,15 +4332,15 @@
                     <a:p>
                       <a:pPr algn="ctr"/>
                       <a:r>
-                        <a:rPr lang="zh-CN" altLang="en-US" b="1"/>
+                        <a:rPr lang="zh-CN" altLang="en-US" sz="2000" b="1"/>
                         <a:t>利用</a:t>
                       </a:r>
                       <a:r>
-                        <a:rPr lang="en-US" altLang="zh-CN" b="1"/>
+                        <a:rPr lang="en-US" altLang="zh-CN" sz="2000" b="1"/>
                         <a:t>API</a:t>
                       </a:r>
                       <a:r>
-                        <a:rPr lang="zh-CN" altLang="en-US" b="1"/>
+                        <a:rPr lang="zh-CN" altLang="en-US" sz="2000" b="1"/>
                         <a:t>接口</a:t>
                       </a:r>
                     </a:p>
@@ -4136,10 +4354,10 @@
                     <a:p>
                       <a:pPr algn="ctr"/>
                       <a:r>
-                        <a:rPr lang="en-US" altLang="zh-CN"/>
+                        <a:rPr lang="en-US" altLang="zh-CN" sz="2000"/>
                         <a:t>=</a:t>
                       </a:r>
-                      <a:endParaRPr lang="zh-CN" altLang="en-US"/>
+                      <a:endParaRPr lang="zh-CN" altLang="en-US" sz="2000"/>
                     </a:p>
                   </a:txBody>
                   <a:tcPr anchor="ctr"/>
@@ -4151,7 +4369,7 @@
                     <a:p>
                       <a:pPr algn="ctr"/>
                       <a:r>
-                        <a:rPr lang="zh-CN" altLang="en-US"/>
+                        <a:rPr lang="zh-CN" altLang="en-US" sz="2000"/>
                         <a:t>√</a:t>
                       </a:r>
                     </a:p>
@@ -4163,7 +4381,7 @@
                     <a:bodyPr/>
                     <a:lstStyle/>
                     <a:p>
-                      <a:endParaRPr lang="zh-CN" altLang="en-US"/>
+                      <a:endParaRPr lang="zh-CN" altLang="en-US" sz="2000"/>
                     </a:p>
                   </a:txBody>
                   <a:tcPr anchor="ctr"/>
@@ -4173,7 +4391,7 @@
                     <a:bodyPr/>
                     <a:lstStyle/>
                     <a:p>
-                      <a:endParaRPr lang="zh-CN" altLang="en-US"/>
+                      <a:endParaRPr lang="zh-CN" altLang="en-US" sz="2000"/>
                     </a:p>
                   </a:txBody>
                   <a:tcPr anchor="ctr"/>
@@ -4264,12 +4482,41 @@
         </p:nvSpPr>
         <p:spPr/>
         <p:txBody>
-          <a:bodyPr/>
+          <a:bodyPr>
+            <a:normAutofit fontScale="92500" lnSpcReduction="10000"/>
+          </a:bodyPr>
           <a:lstStyle/>
           <a:p>
             <a:r>
               <a:rPr lang="zh-CN" altLang="en-US"/>
-              <a:t>适用范围：在有</a:t>
+              <a:t>项目名：</a:t>
+            </a:r>
+            <a:r>
+              <a:rPr lang="zh-CN" altLang="en-US">
+                <a:solidFill>
+                  <a:srgbClr val="FF0000"/>
+                </a:solidFill>
+              </a:rPr>
+              <a:t>智能盲人辅助系统</a:t>
+            </a:r>
+            <a:endParaRPr lang="en-US" altLang="zh-CN">
+              <a:solidFill>
+                <a:srgbClr val="FF0000"/>
+              </a:solidFill>
+            </a:endParaRPr>
+          </a:p>
+          <a:p>
+            <a:r>
+              <a:rPr lang="zh-CN" altLang="en-US"/>
+              <a:t>适用范围</a:t>
+            </a:r>
+            <a:endParaRPr lang="en-US" altLang="zh-CN"/>
+          </a:p>
+          <a:p>
+            <a:pPr lvl="1"/>
+            <a:r>
+              <a:rPr lang="zh-CN" altLang="en-US"/>
+              <a:t>在有</a:t>
             </a:r>
             <a:r>
               <a:rPr lang="en-US" altLang="zh-CN"/>
@@ -4277,14 +4524,14 @@
             </a:r>
             <a:r>
               <a:rPr lang="zh-CN" altLang="en-US"/>
-              <a:t>的室内条件下</a:t>
+              <a:t>的室内条件下，为盲人提供体验性好的语音读书功能</a:t>
             </a:r>
             <a:endParaRPr lang="en-US" altLang="zh-CN"/>
           </a:p>
           <a:p>
             <a:r>
               <a:rPr lang="zh-CN" altLang="en-US"/>
-              <a:t>功能</a:t>
+              <a:t>系统功能</a:t>
             </a:r>
             <a:endParaRPr lang="en-US" altLang="zh-CN"/>
           </a:p>
@@ -4292,7 +4539,7 @@
             <a:pPr lvl="1"/>
             <a:r>
               <a:rPr lang="zh-CN" altLang="en-US"/>
-              <a:t>辅助盲人语音读书</a:t>
+              <a:t>通过摄像头捕捉当前画面，利用深度学习技术提取文字并合成语音</a:t>
             </a:r>
             <a:endParaRPr lang="en-US" altLang="zh-CN"/>
           </a:p>
@@ -4300,8 +4547,35 @@
             <a:pPr lvl="1"/>
             <a:r>
               <a:rPr lang="zh-CN" altLang="en-US"/>
-              <a:t>服务号报警</a:t>
-            </a:r>
+              <a:t>能对图书位置进行提示，以获得更完整的页面</a:t>
+            </a:r>
+            <a:endParaRPr lang="en-US" altLang="zh-CN"/>
+          </a:p>
+          <a:p>
+            <a:pPr lvl="1"/>
+            <a:r>
+              <a:rPr lang="zh-CN" altLang="en-US"/>
+              <a:t>将读书记录数据传至云端，方便保存阅读记录</a:t>
+            </a:r>
+            <a:endParaRPr lang="en-US" altLang="zh-CN"/>
+          </a:p>
+          <a:p>
+            <a:r>
+              <a:rPr lang="zh-CN" altLang="en-US"/>
+              <a:t>系统指标</a:t>
+            </a:r>
+            <a:endParaRPr lang="en-US" altLang="zh-CN"/>
+          </a:p>
+          <a:p>
+            <a:pPr lvl="1"/>
+            <a:r>
+              <a:rPr lang="zh-CN" altLang="en-US"/>
+              <a:t>文字识别的准确率、语音合成的流畅程度、辅助阅读的有效性</a:t>
+            </a:r>
+            <a:endParaRPr lang="en-US" altLang="zh-CN"/>
+          </a:p>
+          <a:p>
+            <a:pPr lvl="1"/>
             <a:endParaRPr lang="en-US" altLang="zh-CN"/>
           </a:p>
         </p:txBody>
@@ -4338,51 +4612,10 @@
       </p:grpSpPr>
       <p:sp>
         <p:nvSpPr>
-          <p:cNvPr id="3" name="内容占位符 2">
+          <p:cNvPr id="2" name="标题 1">
             <a:extLst>
               <a:ext uri="{FF2B5EF4-FFF2-40B4-BE49-F238E27FC236}">
-                <a16:creationId xmlns:a16="http://schemas.microsoft.com/office/drawing/2014/main" id="{A1DFD568-2750-4439-A494-0F843EE655E0}"/>
-              </a:ext>
-            </a:extLst>
-          </p:cNvPr>
-          <p:cNvSpPr>
-            <a:spLocks noGrp="1"/>
-          </p:cNvSpPr>
-          <p:nvPr>
-            <p:ph idx="1"/>
-          </p:nvPr>
-        </p:nvSpPr>
-        <p:spPr>
-          <a:xfrm>
-            <a:off x="664464" y="1246219"/>
-            <a:ext cx="11375136" cy="5440908"/>
-          </a:xfrm>
-        </p:spPr>
-        <p:txBody>
-          <a:bodyPr/>
-          <a:lstStyle/>
-          <a:p>
-            <a:r>
-              <a:rPr lang="zh-CN" altLang="en-US"/>
-              <a:t>系统产品的规格书</a:t>
-            </a:r>
-            <a:endParaRPr lang="en-US" altLang="zh-CN"/>
-          </a:p>
-          <a:p>
-            <a:r>
-              <a:rPr lang="zh-CN" altLang="en-US"/>
-              <a:t>核心技术方案</a:t>
-            </a:r>
-            <a:endParaRPr lang="zh-CN" altLang="en-US" dirty="0"/>
-          </a:p>
-        </p:txBody>
-      </p:sp>
-      <p:sp>
-        <p:nvSpPr>
-          <p:cNvPr id="7" name="标题 6">
-            <a:extLst>
-              <a:ext uri="{FF2B5EF4-FFF2-40B4-BE49-F238E27FC236}">
-                <a16:creationId xmlns:a16="http://schemas.microsoft.com/office/drawing/2014/main" id="{A972D905-53B0-49B1-8B36-0425390B7D27}"/>
+                <a16:creationId xmlns:a16="http://schemas.microsoft.com/office/drawing/2014/main" id="{6528546D-8FB6-4CED-AF3F-F977514E6F87}"/>
               </a:ext>
             </a:extLst>
           </p:cNvPr>
@@ -4400,65 +4633,7 @@
           <a:p>
             <a:r>
               <a:rPr lang="zh-CN" altLang="en-US"/>
-              <a:t>系统级设计</a:t>
-            </a:r>
-          </a:p>
-        </p:txBody>
-      </p:sp>
-    </p:spTree>
-    <p:extLst>
-      <p:ext uri="{BB962C8B-B14F-4D97-AF65-F5344CB8AC3E}">
-        <p14:creationId xmlns:p14="http://schemas.microsoft.com/office/powerpoint/2010/main" val="2129292749"/>
-      </p:ext>
-    </p:extLst>
-  </p:cSld>
-  <p:clrMapOvr>
-    <a:masterClrMapping/>
-  </p:clrMapOvr>
-</p:sld>
-</file>
-
-<file path=ppt/slides/slide4.xml><?xml version="1.0" encoding="utf-8"?>
-<p:sld xmlns:a="http://schemas.openxmlformats.org/drawingml/2006/main" xmlns:r="http://schemas.openxmlformats.org/officeDocument/2006/relationships" xmlns:p="http://schemas.openxmlformats.org/presentationml/2006/main">
-  <p:cSld>
-    <p:spTree>
-      <p:nvGrpSpPr>
-        <p:cNvPr id="1" name=""/>
-        <p:cNvGrpSpPr/>
-        <p:nvPr/>
-      </p:nvGrpSpPr>
-      <p:grpSpPr>
-        <a:xfrm>
-          <a:off x="0" y="0"/>
-          <a:ext cx="0" cy="0"/>
-          <a:chOff x="0" y="0"/>
-          <a:chExt cx="0" cy="0"/>
-        </a:xfrm>
-      </p:grpSpPr>
-      <p:sp>
-        <p:nvSpPr>
-          <p:cNvPr id="2" name="标题 1">
-            <a:extLst>
-              <a:ext uri="{FF2B5EF4-FFF2-40B4-BE49-F238E27FC236}">
-                <a16:creationId xmlns:a16="http://schemas.microsoft.com/office/drawing/2014/main" id="{0313A686-3C16-4321-99E7-21F30FC4FD98}"/>
-              </a:ext>
-            </a:extLst>
-          </p:cNvPr>
-          <p:cNvSpPr>
-            <a:spLocks noGrp="1"/>
-          </p:cNvSpPr>
-          <p:nvPr>
-            <p:ph type="title"/>
-          </p:nvPr>
-        </p:nvSpPr>
-        <p:spPr/>
-        <p:txBody>
-          <a:bodyPr/>
-          <a:lstStyle/>
-          <a:p>
-            <a:r>
-              <a:rPr lang="zh-CN" altLang="en-US"/>
-              <a:t>软硬件模块级设计</a:t>
+              <a:t>软硬件架构级设计</a:t>
             </a:r>
           </a:p>
         </p:txBody>
@@ -4468,7 +4643,7 @@
           <p:cNvPr id="3" name="内容占位符 2">
             <a:extLst>
               <a:ext uri="{FF2B5EF4-FFF2-40B4-BE49-F238E27FC236}">
-                <a16:creationId xmlns:a16="http://schemas.microsoft.com/office/drawing/2014/main" id="{3FD9A6D8-093B-4FDD-BD5A-FB631F7FF7C5}"/>
+                <a16:creationId xmlns:a16="http://schemas.microsoft.com/office/drawing/2014/main" id="{A8285A90-BC7B-464D-B8C9-7AA9A8B542B2}"/>
               </a:ext>
             </a:extLst>
           </p:cNvPr>
@@ -4481,27 +4656,1100 @@
         </p:nvSpPr>
         <p:spPr/>
         <p:txBody>
-          <a:bodyPr/>
+          <a:bodyPr>
+            <a:normAutofit fontScale="92500"/>
+          </a:bodyPr>
           <a:lstStyle/>
           <a:p>
             <a:r>
               <a:rPr lang="zh-CN" altLang="en-US"/>
-              <a:t>智能硬件设备</a:t>
+              <a:t>软件模块</a:t>
             </a:r>
             <a:endParaRPr lang="en-US" altLang="zh-CN"/>
           </a:p>
           <a:p>
-            <a:r>
-              <a:rPr lang="zh-CN" altLang="en-US"/>
-              <a:t>智能服务平台</a:t>
-            </a:r>
+            <a:pPr lvl="1"/>
+            <a:r>
+              <a:rPr lang="zh-CN" altLang="en-US"/>
+              <a:t>指令交互</a:t>
+            </a:r>
+            <a:endParaRPr lang="en-US" altLang="zh-CN"/>
+          </a:p>
+          <a:p>
+            <a:pPr lvl="1"/>
+            <a:r>
+              <a:rPr lang="zh-CN" altLang="en-US"/>
+              <a:t>图像处理</a:t>
+            </a:r>
+            <a:endParaRPr lang="en-US" altLang="zh-CN"/>
+          </a:p>
+          <a:p>
+            <a:pPr lvl="1"/>
+            <a:r>
+              <a:rPr lang="zh-CN" altLang="en-US"/>
+              <a:t>调用深度学习</a:t>
+            </a:r>
+            <a:r>
+              <a:rPr lang="en-US" altLang="zh-CN"/>
+              <a:t>API</a:t>
+            </a:r>
+          </a:p>
+          <a:p>
+            <a:pPr lvl="1"/>
+            <a:r>
+              <a:rPr lang="zh-CN" altLang="en-US"/>
+              <a:t>云端上传读书数据</a:t>
+            </a:r>
+            <a:endParaRPr lang="en-US" altLang="zh-CN"/>
+          </a:p>
+          <a:p>
+            <a:pPr lvl="1"/>
+            <a:r>
+              <a:rPr lang="zh-CN" altLang="en-US"/>
+              <a:t>中央控制</a:t>
+            </a:r>
+            <a:endParaRPr lang="en-US" altLang="zh-CN"/>
+          </a:p>
+          <a:p>
+            <a:r>
+              <a:rPr lang="zh-CN" altLang="en-US"/>
+              <a:t>硬件模块</a:t>
+            </a:r>
+            <a:endParaRPr lang="en-US" altLang="zh-CN"/>
+          </a:p>
+          <a:p>
+            <a:pPr lvl="1"/>
+            <a:r>
+              <a:rPr lang="zh-CN" altLang="en-US"/>
+              <a:t>音频调理</a:t>
+            </a:r>
+            <a:endParaRPr lang="en-US" altLang="zh-CN"/>
+          </a:p>
+          <a:p>
+            <a:pPr lvl="1"/>
+            <a:r>
+              <a:rPr lang="zh-CN" altLang="en-US"/>
+              <a:t>供电</a:t>
+            </a:r>
+            <a:endParaRPr lang="en-US" altLang="zh-CN"/>
+          </a:p>
+          <a:p>
+            <a:pPr lvl="1"/>
+            <a:endParaRPr lang="zh-CN" altLang="en-US"/>
           </a:p>
         </p:txBody>
       </p:sp>
+      <p:grpSp>
+        <p:nvGrpSpPr>
+          <p:cNvPr id="28" name="组合 27">
+            <a:extLst>
+              <a:ext uri="{FF2B5EF4-FFF2-40B4-BE49-F238E27FC236}">
+                <a16:creationId xmlns:a16="http://schemas.microsoft.com/office/drawing/2014/main" id="{F3F72E6F-4BF1-4C6C-951B-D449197CD34E}"/>
+              </a:ext>
+            </a:extLst>
+          </p:cNvPr>
+          <p:cNvGrpSpPr/>
+          <p:nvPr/>
+        </p:nvGrpSpPr>
+        <p:grpSpPr>
+          <a:xfrm>
+            <a:off x="4731798" y="1633491"/>
+            <a:ext cx="7332955" cy="5053636"/>
+            <a:chOff x="4731798" y="1633491"/>
+            <a:chExt cx="7332955" cy="5053636"/>
+          </a:xfrm>
+        </p:grpSpPr>
+        <p:sp>
+          <p:nvSpPr>
+            <p:cNvPr id="6" name="矩形 5">
+              <a:extLst>
+                <a:ext uri="{FF2B5EF4-FFF2-40B4-BE49-F238E27FC236}">
+                  <a16:creationId xmlns:a16="http://schemas.microsoft.com/office/drawing/2014/main" id="{71204830-9C4D-4500-977C-F3B2FFC08F84}"/>
+                </a:ext>
+              </a:extLst>
+            </p:cNvPr>
+            <p:cNvSpPr/>
+            <p:nvPr/>
+          </p:nvSpPr>
+          <p:spPr>
+            <a:xfrm>
+              <a:off x="7815500" y="1997477"/>
+              <a:ext cx="1543531" cy="852256"/>
+            </a:xfrm>
+            <a:prstGeom prst="rect">
+              <a:avLst/>
+            </a:prstGeom>
+          </p:spPr>
+          <p:style>
+            <a:lnRef idx="2">
+              <a:schemeClr val="accent1">
+                <a:shade val="50000"/>
+              </a:schemeClr>
+            </a:lnRef>
+            <a:fillRef idx="1">
+              <a:schemeClr val="accent1"/>
+            </a:fillRef>
+            <a:effectRef idx="0">
+              <a:schemeClr val="accent1"/>
+            </a:effectRef>
+            <a:fontRef idx="minor">
+              <a:schemeClr val="lt1"/>
+            </a:fontRef>
+          </p:style>
+          <p:txBody>
+            <a:bodyPr rtlCol="0" anchor="ctr"/>
+            <a:lstStyle/>
+            <a:p>
+              <a:pPr algn="ctr"/>
+              <a:r>
+                <a:rPr lang="zh-CN" altLang="en-US"/>
+                <a:t>指令交互</a:t>
+              </a:r>
+            </a:p>
+          </p:txBody>
+        </p:sp>
+        <p:sp>
+          <p:nvSpPr>
+            <p:cNvPr id="7" name="矩形 6">
+              <a:extLst>
+                <a:ext uri="{FF2B5EF4-FFF2-40B4-BE49-F238E27FC236}">
+                  <a16:creationId xmlns:a16="http://schemas.microsoft.com/office/drawing/2014/main" id="{B3C490C1-4EF8-4622-BF8D-5CC98C16B16D}"/>
+                </a:ext>
+              </a:extLst>
+            </p:cNvPr>
+            <p:cNvSpPr/>
+            <p:nvPr/>
+          </p:nvSpPr>
+          <p:spPr>
+            <a:xfrm>
+              <a:off x="5360337" y="1997477"/>
+              <a:ext cx="1543531" cy="852256"/>
+            </a:xfrm>
+            <a:prstGeom prst="rect">
+              <a:avLst/>
+            </a:prstGeom>
+          </p:spPr>
+          <p:style>
+            <a:lnRef idx="2">
+              <a:schemeClr val="accent6">
+                <a:shade val="50000"/>
+              </a:schemeClr>
+            </a:lnRef>
+            <a:fillRef idx="1">
+              <a:schemeClr val="accent6"/>
+            </a:fillRef>
+            <a:effectRef idx="0">
+              <a:schemeClr val="accent6"/>
+            </a:effectRef>
+            <a:fontRef idx="minor">
+              <a:schemeClr val="lt1"/>
+            </a:fontRef>
+          </p:style>
+          <p:txBody>
+            <a:bodyPr rtlCol="0" anchor="ctr"/>
+            <a:lstStyle/>
+            <a:p>
+              <a:pPr algn="ctr"/>
+              <a:r>
+                <a:rPr lang="zh-CN" altLang="en-US"/>
+                <a:t>音频调理</a:t>
+              </a:r>
+            </a:p>
+          </p:txBody>
+        </p:sp>
+        <p:sp>
+          <p:nvSpPr>
+            <p:cNvPr id="8" name="矩形 7">
+              <a:extLst>
+                <a:ext uri="{FF2B5EF4-FFF2-40B4-BE49-F238E27FC236}">
+                  <a16:creationId xmlns:a16="http://schemas.microsoft.com/office/drawing/2014/main" id="{D4BC69CB-F98B-47FC-B772-082FB5E9E7A0}"/>
+                </a:ext>
+              </a:extLst>
+            </p:cNvPr>
+            <p:cNvSpPr/>
+            <p:nvPr/>
+          </p:nvSpPr>
+          <p:spPr>
+            <a:xfrm>
+              <a:off x="10270663" y="1997477"/>
+              <a:ext cx="1543531" cy="852256"/>
+            </a:xfrm>
+            <a:prstGeom prst="rect">
+              <a:avLst/>
+            </a:prstGeom>
+          </p:spPr>
+          <p:style>
+            <a:lnRef idx="2">
+              <a:schemeClr val="accent1">
+                <a:shade val="50000"/>
+              </a:schemeClr>
+            </a:lnRef>
+            <a:fillRef idx="1">
+              <a:schemeClr val="accent1"/>
+            </a:fillRef>
+            <a:effectRef idx="0">
+              <a:schemeClr val="accent1"/>
+            </a:effectRef>
+            <a:fontRef idx="minor">
+              <a:schemeClr val="lt1"/>
+            </a:fontRef>
+          </p:style>
+          <p:txBody>
+            <a:bodyPr rtlCol="0" anchor="ctr"/>
+            <a:lstStyle/>
+            <a:p>
+              <a:pPr algn="ctr"/>
+              <a:r>
+                <a:rPr lang="zh-CN" altLang="en-US"/>
+                <a:t>图像处理</a:t>
+              </a:r>
+            </a:p>
+          </p:txBody>
+        </p:sp>
+        <p:sp>
+          <p:nvSpPr>
+            <p:cNvPr id="9" name="箭头: 右 8">
+              <a:extLst>
+                <a:ext uri="{FF2B5EF4-FFF2-40B4-BE49-F238E27FC236}">
+                  <a16:creationId xmlns:a16="http://schemas.microsoft.com/office/drawing/2014/main" id="{22FFA0E4-FA4D-4807-8E60-51D83CD7F543}"/>
+                </a:ext>
+              </a:extLst>
+            </p:cNvPr>
+            <p:cNvSpPr/>
+            <p:nvPr/>
+          </p:nvSpPr>
+          <p:spPr>
+            <a:xfrm>
+              <a:off x="7007441" y="2294879"/>
+              <a:ext cx="704486" cy="257452"/>
+            </a:xfrm>
+            <a:prstGeom prst="rightArrow">
+              <a:avLst/>
+            </a:prstGeom>
+          </p:spPr>
+          <p:style>
+            <a:lnRef idx="2">
+              <a:schemeClr val="accent6">
+                <a:shade val="50000"/>
+              </a:schemeClr>
+            </a:lnRef>
+            <a:fillRef idx="1">
+              <a:schemeClr val="accent6"/>
+            </a:fillRef>
+            <a:effectRef idx="0">
+              <a:schemeClr val="accent6"/>
+            </a:effectRef>
+            <a:fontRef idx="minor">
+              <a:schemeClr val="lt1"/>
+            </a:fontRef>
+          </p:style>
+          <p:txBody>
+            <a:bodyPr rtlCol="0" anchor="ctr"/>
+            <a:lstStyle/>
+            <a:p>
+              <a:pPr algn="ctr"/>
+              <a:endParaRPr lang="zh-CN" altLang="en-US"/>
+            </a:p>
+          </p:txBody>
+        </p:sp>
+        <p:sp>
+          <p:nvSpPr>
+            <p:cNvPr id="10" name="箭头: 右 9">
+              <a:extLst>
+                <a:ext uri="{FF2B5EF4-FFF2-40B4-BE49-F238E27FC236}">
+                  <a16:creationId xmlns:a16="http://schemas.microsoft.com/office/drawing/2014/main" id="{95ADD5F7-822E-4418-931A-E26DE4DA4D91}"/>
+                </a:ext>
+              </a:extLst>
+            </p:cNvPr>
+            <p:cNvSpPr/>
+            <p:nvPr/>
+          </p:nvSpPr>
+          <p:spPr>
+            <a:xfrm>
+              <a:off x="9462604" y="2294879"/>
+              <a:ext cx="704486" cy="257452"/>
+            </a:xfrm>
+            <a:prstGeom prst="rightArrow">
+              <a:avLst/>
+            </a:prstGeom>
+          </p:spPr>
+          <p:style>
+            <a:lnRef idx="2">
+              <a:schemeClr val="accent1">
+                <a:shade val="50000"/>
+              </a:schemeClr>
+            </a:lnRef>
+            <a:fillRef idx="1">
+              <a:schemeClr val="accent1"/>
+            </a:fillRef>
+            <a:effectRef idx="0">
+              <a:schemeClr val="accent1"/>
+            </a:effectRef>
+            <a:fontRef idx="minor">
+              <a:schemeClr val="lt1"/>
+            </a:fontRef>
+          </p:style>
+          <p:txBody>
+            <a:bodyPr rtlCol="0" anchor="ctr"/>
+            <a:lstStyle/>
+            <a:p>
+              <a:pPr algn="ctr"/>
+              <a:endParaRPr lang="zh-CN" altLang="en-US"/>
+            </a:p>
+          </p:txBody>
+        </p:sp>
+        <p:sp>
+          <p:nvSpPr>
+            <p:cNvPr id="11" name="矩形 10">
+              <a:extLst>
+                <a:ext uri="{FF2B5EF4-FFF2-40B4-BE49-F238E27FC236}">
+                  <a16:creationId xmlns:a16="http://schemas.microsoft.com/office/drawing/2014/main" id="{62DDE8CE-FE99-4F9E-A12B-A027BCC168F9}"/>
+                </a:ext>
+              </a:extLst>
+            </p:cNvPr>
+            <p:cNvSpPr/>
+            <p:nvPr/>
+          </p:nvSpPr>
+          <p:spPr>
+            <a:xfrm>
+              <a:off x="7815500" y="3663161"/>
+              <a:ext cx="1543531" cy="1197365"/>
+            </a:xfrm>
+            <a:prstGeom prst="rect">
+              <a:avLst/>
+            </a:prstGeom>
+          </p:spPr>
+          <p:style>
+            <a:lnRef idx="2">
+              <a:schemeClr val="accent1">
+                <a:shade val="50000"/>
+              </a:schemeClr>
+            </a:lnRef>
+            <a:fillRef idx="1">
+              <a:schemeClr val="accent1"/>
+            </a:fillRef>
+            <a:effectRef idx="0">
+              <a:schemeClr val="accent1"/>
+            </a:effectRef>
+            <a:fontRef idx="minor">
+              <a:schemeClr val="lt1"/>
+            </a:fontRef>
+          </p:style>
+          <p:txBody>
+            <a:bodyPr rtlCol="0" anchor="ctr"/>
+            <a:lstStyle/>
+            <a:p>
+              <a:pPr algn="ctr"/>
+              <a:r>
+                <a:rPr lang="zh-CN" altLang="en-US"/>
+                <a:t>中央控制</a:t>
+              </a:r>
+            </a:p>
+          </p:txBody>
+        </p:sp>
+        <p:sp>
+          <p:nvSpPr>
+            <p:cNvPr id="12" name="箭头: 右 11">
+              <a:extLst>
+                <a:ext uri="{FF2B5EF4-FFF2-40B4-BE49-F238E27FC236}">
+                  <a16:creationId xmlns:a16="http://schemas.microsoft.com/office/drawing/2014/main" id="{E33299EB-111B-467B-8FD3-75DF61E1C155}"/>
+                </a:ext>
+              </a:extLst>
+            </p:cNvPr>
+            <p:cNvSpPr/>
+            <p:nvPr/>
+          </p:nvSpPr>
+          <p:spPr>
+            <a:xfrm rot="5400000">
+              <a:off x="8235022" y="3142886"/>
+              <a:ext cx="704486" cy="257452"/>
+            </a:xfrm>
+            <a:prstGeom prst="rightArrow">
+              <a:avLst/>
+            </a:prstGeom>
+          </p:spPr>
+          <p:style>
+            <a:lnRef idx="2">
+              <a:schemeClr val="accent1">
+                <a:shade val="50000"/>
+              </a:schemeClr>
+            </a:lnRef>
+            <a:fillRef idx="1">
+              <a:schemeClr val="accent1"/>
+            </a:fillRef>
+            <a:effectRef idx="0">
+              <a:schemeClr val="accent1"/>
+            </a:effectRef>
+            <a:fontRef idx="minor">
+              <a:schemeClr val="lt1"/>
+            </a:fontRef>
+          </p:style>
+          <p:txBody>
+            <a:bodyPr rtlCol="0" anchor="ctr"/>
+            <a:lstStyle/>
+            <a:p>
+              <a:pPr algn="ctr"/>
+              <a:endParaRPr lang="zh-CN" altLang="en-US"/>
+            </a:p>
+          </p:txBody>
+        </p:sp>
+        <p:sp>
+          <p:nvSpPr>
+            <p:cNvPr id="13" name="箭头: 直角上 12">
+              <a:extLst>
+                <a:ext uri="{FF2B5EF4-FFF2-40B4-BE49-F238E27FC236}">
+                  <a16:creationId xmlns:a16="http://schemas.microsoft.com/office/drawing/2014/main" id="{83615F6F-8874-4EBD-ADE9-4F30CD80955B}"/>
+                </a:ext>
+              </a:extLst>
+            </p:cNvPr>
+            <p:cNvSpPr/>
+            <p:nvPr/>
+          </p:nvSpPr>
+          <p:spPr>
+            <a:xfrm>
+              <a:off x="9462604" y="2940636"/>
+              <a:ext cx="2024109" cy="1303356"/>
+            </a:xfrm>
+            <a:prstGeom prst="bentUpArrow">
+              <a:avLst>
+                <a:gd name="adj1" fmla="val 10192"/>
+                <a:gd name="adj2" fmla="val 13644"/>
+                <a:gd name="adj3" fmla="val 14620"/>
+              </a:avLst>
+            </a:prstGeom>
+          </p:spPr>
+          <p:style>
+            <a:lnRef idx="2">
+              <a:schemeClr val="accent1">
+                <a:shade val="50000"/>
+              </a:schemeClr>
+            </a:lnRef>
+            <a:fillRef idx="1">
+              <a:schemeClr val="accent1"/>
+            </a:fillRef>
+            <a:effectRef idx="0">
+              <a:schemeClr val="accent1"/>
+            </a:effectRef>
+            <a:fontRef idx="minor">
+              <a:schemeClr val="lt1"/>
+            </a:fontRef>
+          </p:style>
+          <p:txBody>
+            <a:bodyPr rtlCol="0" anchor="ctr"/>
+            <a:lstStyle/>
+            <a:p>
+              <a:pPr algn="ctr"/>
+              <a:endParaRPr lang="zh-CN" altLang="en-US"/>
+            </a:p>
+          </p:txBody>
+        </p:sp>
+        <p:sp>
+          <p:nvSpPr>
+            <p:cNvPr id="14" name="箭头: 直角上 13">
+              <a:extLst>
+                <a:ext uri="{FF2B5EF4-FFF2-40B4-BE49-F238E27FC236}">
+                  <a16:creationId xmlns:a16="http://schemas.microsoft.com/office/drawing/2014/main" id="{F7DEB598-DBA3-4BA7-A3C6-40E5FD848963}"/>
+                </a:ext>
+              </a:extLst>
+            </p:cNvPr>
+            <p:cNvSpPr/>
+            <p:nvPr/>
+          </p:nvSpPr>
+          <p:spPr>
+            <a:xfrm rot="5400000" flipV="1">
+              <a:off x="9730296" y="2672946"/>
+              <a:ext cx="1693513" cy="2228893"/>
+            </a:xfrm>
+            <a:prstGeom prst="bentUpArrow">
+              <a:avLst>
+                <a:gd name="adj1" fmla="val 8095"/>
+                <a:gd name="adj2" fmla="val 9188"/>
+                <a:gd name="adj3" fmla="val 11999"/>
+              </a:avLst>
+            </a:prstGeom>
+          </p:spPr>
+          <p:style>
+            <a:lnRef idx="2">
+              <a:schemeClr val="accent1">
+                <a:shade val="50000"/>
+              </a:schemeClr>
+            </a:lnRef>
+            <a:fillRef idx="1">
+              <a:schemeClr val="accent1"/>
+            </a:fillRef>
+            <a:effectRef idx="0">
+              <a:schemeClr val="accent1"/>
+            </a:effectRef>
+            <a:fontRef idx="minor">
+              <a:schemeClr val="lt1"/>
+            </a:fontRef>
+          </p:style>
+          <p:txBody>
+            <a:bodyPr rtlCol="0" anchor="ctr"/>
+            <a:lstStyle/>
+            <a:p>
+              <a:pPr algn="ctr"/>
+              <a:endParaRPr lang="zh-CN" altLang="en-US"/>
+            </a:p>
+          </p:txBody>
+        </p:sp>
+        <p:sp>
+          <p:nvSpPr>
+            <p:cNvPr id="16" name="矩形 15">
+              <a:extLst>
+                <a:ext uri="{FF2B5EF4-FFF2-40B4-BE49-F238E27FC236}">
+                  <a16:creationId xmlns:a16="http://schemas.microsoft.com/office/drawing/2014/main" id="{899FB79E-DAC8-4E16-B329-4B1E9D4295EF}"/>
+                </a:ext>
+              </a:extLst>
+            </p:cNvPr>
+            <p:cNvSpPr/>
+            <p:nvPr/>
+          </p:nvSpPr>
+          <p:spPr>
+            <a:xfrm>
+              <a:off x="5360337" y="3781893"/>
+              <a:ext cx="1543531" cy="852256"/>
+            </a:xfrm>
+            <a:prstGeom prst="rect">
+              <a:avLst/>
+            </a:prstGeom>
+          </p:spPr>
+          <p:style>
+            <a:lnRef idx="2">
+              <a:schemeClr val="accent6">
+                <a:shade val="50000"/>
+              </a:schemeClr>
+            </a:lnRef>
+            <a:fillRef idx="1">
+              <a:schemeClr val="accent6"/>
+            </a:fillRef>
+            <a:effectRef idx="0">
+              <a:schemeClr val="accent6"/>
+            </a:effectRef>
+            <a:fontRef idx="minor">
+              <a:schemeClr val="lt1"/>
+            </a:fontRef>
+          </p:style>
+          <p:txBody>
+            <a:bodyPr rtlCol="0" anchor="ctr"/>
+            <a:lstStyle/>
+            <a:p>
+              <a:pPr algn="ctr"/>
+              <a:r>
+                <a:rPr lang="zh-CN" altLang="en-US"/>
+                <a:t>供电</a:t>
+              </a:r>
+            </a:p>
+          </p:txBody>
+        </p:sp>
+        <p:sp>
+          <p:nvSpPr>
+            <p:cNvPr id="17" name="矩形 16">
+              <a:extLst>
+                <a:ext uri="{FF2B5EF4-FFF2-40B4-BE49-F238E27FC236}">
+                  <a16:creationId xmlns:a16="http://schemas.microsoft.com/office/drawing/2014/main" id="{C94169E2-6362-4CB1-9D64-75FAA9B262A1}"/>
+                </a:ext>
+              </a:extLst>
+            </p:cNvPr>
+            <p:cNvSpPr/>
+            <p:nvPr/>
+          </p:nvSpPr>
+          <p:spPr>
+            <a:xfrm>
+              <a:off x="6952794" y="5602405"/>
+              <a:ext cx="1543531" cy="852256"/>
+            </a:xfrm>
+            <a:prstGeom prst="rect">
+              <a:avLst/>
+            </a:prstGeom>
+          </p:spPr>
+          <p:style>
+            <a:lnRef idx="2">
+              <a:schemeClr val="accent1">
+                <a:shade val="50000"/>
+              </a:schemeClr>
+            </a:lnRef>
+            <a:fillRef idx="1">
+              <a:schemeClr val="accent1"/>
+            </a:fillRef>
+            <a:effectRef idx="0">
+              <a:schemeClr val="accent1"/>
+            </a:effectRef>
+            <a:fontRef idx="minor">
+              <a:schemeClr val="lt1"/>
+            </a:fontRef>
+          </p:style>
+          <p:txBody>
+            <a:bodyPr rtlCol="0" anchor="ctr"/>
+            <a:lstStyle/>
+            <a:p>
+              <a:pPr algn="ctr"/>
+              <a:r>
+                <a:rPr lang="zh-CN" altLang="en-US"/>
+                <a:t>调用深度学习</a:t>
+              </a:r>
+              <a:r>
+                <a:rPr lang="en-US" altLang="zh-CN"/>
+                <a:t>API</a:t>
+              </a:r>
+              <a:endParaRPr lang="zh-CN" altLang="en-US"/>
+            </a:p>
+          </p:txBody>
+        </p:sp>
+        <p:sp>
+          <p:nvSpPr>
+            <p:cNvPr id="18" name="矩形 17">
+              <a:extLst>
+                <a:ext uri="{FF2B5EF4-FFF2-40B4-BE49-F238E27FC236}">
+                  <a16:creationId xmlns:a16="http://schemas.microsoft.com/office/drawing/2014/main" id="{CFB8F2B3-A58D-4C8D-87A4-A46C665A495F}"/>
+                </a:ext>
+              </a:extLst>
+            </p:cNvPr>
+            <p:cNvSpPr/>
+            <p:nvPr/>
+          </p:nvSpPr>
+          <p:spPr>
+            <a:xfrm>
+              <a:off x="8830853" y="5624453"/>
+              <a:ext cx="1543531" cy="852256"/>
+            </a:xfrm>
+            <a:prstGeom prst="rect">
+              <a:avLst/>
+            </a:prstGeom>
+          </p:spPr>
+          <p:style>
+            <a:lnRef idx="2">
+              <a:schemeClr val="accent1">
+                <a:shade val="50000"/>
+              </a:schemeClr>
+            </a:lnRef>
+            <a:fillRef idx="1">
+              <a:schemeClr val="accent1"/>
+            </a:fillRef>
+            <a:effectRef idx="0">
+              <a:schemeClr val="accent1"/>
+            </a:effectRef>
+            <a:fontRef idx="minor">
+              <a:schemeClr val="lt1"/>
+            </a:fontRef>
+          </p:style>
+          <p:txBody>
+            <a:bodyPr rtlCol="0" anchor="ctr"/>
+            <a:lstStyle/>
+            <a:p>
+              <a:pPr algn="ctr"/>
+              <a:r>
+                <a:rPr lang="zh-CN" altLang="en-US"/>
+                <a:t>云端上传读书数据</a:t>
+              </a:r>
+            </a:p>
+          </p:txBody>
+        </p:sp>
+        <p:sp>
+          <p:nvSpPr>
+            <p:cNvPr id="19" name="箭头: 右 18">
+              <a:extLst>
+                <a:ext uri="{FF2B5EF4-FFF2-40B4-BE49-F238E27FC236}">
+                  <a16:creationId xmlns:a16="http://schemas.microsoft.com/office/drawing/2014/main" id="{5D388485-28B2-4BD5-8496-65195502BC12}"/>
+                </a:ext>
+              </a:extLst>
+            </p:cNvPr>
+            <p:cNvSpPr/>
+            <p:nvPr/>
+          </p:nvSpPr>
+          <p:spPr>
+            <a:xfrm>
+              <a:off x="7031637" y="4115266"/>
+              <a:ext cx="704486" cy="257452"/>
+            </a:xfrm>
+            <a:prstGeom prst="rightArrow">
+              <a:avLst/>
+            </a:prstGeom>
+          </p:spPr>
+          <p:style>
+            <a:lnRef idx="2">
+              <a:schemeClr val="accent6">
+                <a:shade val="50000"/>
+              </a:schemeClr>
+            </a:lnRef>
+            <a:fillRef idx="1">
+              <a:schemeClr val="accent6"/>
+            </a:fillRef>
+            <a:effectRef idx="0">
+              <a:schemeClr val="accent6"/>
+            </a:effectRef>
+            <a:fontRef idx="minor">
+              <a:schemeClr val="lt1"/>
+            </a:fontRef>
+          </p:style>
+          <p:txBody>
+            <a:bodyPr rtlCol="0" anchor="ctr"/>
+            <a:lstStyle/>
+            <a:p>
+              <a:pPr algn="ctr"/>
+              <a:endParaRPr lang="zh-CN" altLang="en-US"/>
+            </a:p>
+          </p:txBody>
+        </p:sp>
+        <p:sp>
+          <p:nvSpPr>
+            <p:cNvPr id="20" name="箭头: 右 19">
+              <a:extLst>
+                <a:ext uri="{FF2B5EF4-FFF2-40B4-BE49-F238E27FC236}">
+                  <a16:creationId xmlns:a16="http://schemas.microsoft.com/office/drawing/2014/main" id="{29B9018C-6639-4A5C-B15E-E7B4BFFE66C1}"/>
+                </a:ext>
+              </a:extLst>
+            </p:cNvPr>
+            <p:cNvSpPr/>
+            <p:nvPr/>
+          </p:nvSpPr>
+          <p:spPr>
+            <a:xfrm rot="7316169">
+              <a:off x="7696632" y="5113682"/>
+              <a:ext cx="704486" cy="257452"/>
+            </a:xfrm>
+            <a:prstGeom prst="rightArrow">
+              <a:avLst/>
+            </a:prstGeom>
+          </p:spPr>
+          <p:style>
+            <a:lnRef idx="2">
+              <a:schemeClr val="accent1">
+                <a:shade val="50000"/>
+              </a:schemeClr>
+            </a:lnRef>
+            <a:fillRef idx="1">
+              <a:schemeClr val="accent1"/>
+            </a:fillRef>
+            <a:effectRef idx="0">
+              <a:schemeClr val="accent1"/>
+            </a:effectRef>
+            <a:fontRef idx="minor">
+              <a:schemeClr val="lt1"/>
+            </a:fontRef>
+          </p:style>
+          <p:txBody>
+            <a:bodyPr rtlCol="0" anchor="ctr"/>
+            <a:lstStyle/>
+            <a:p>
+              <a:pPr algn="ctr"/>
+              <a:endParaRPr lang="zh-CN" altLang="en-US"/>
+            </a:p>
+          </p:txBody>
+        </p:sp>
+        <p:sp>
+          <p:nvSpPr>
+            <p:cNvPr id="21" name="箭头: 右 20">
+              <a:extLst>
+                <a:ext uri="{FF2B5EF4-FFF2-40B4-BE49-F238E27FC236}">
+                  <a16:creationId xmlns:a16="http://schemas.microsoft.com/office/drawing/2014/main" id="{0F149374-D4BE-4F7D-98BC-17707E08FCF2}"/>
+                </a:ext>
+              </a:extLst>
+            </p:cNvPr>
+            <p:cNvSpPr/>
+            <p:nvPr/>
+          </p:nvSpPr>
+          <p:spPr>
+            <a:xfrm rot="3760414">
+              <a:off x="8808725" y="5124869"/>
+              <a:ext cx="704486" cy="257452"/>
+            </a:xfrm>
+            <a:prstGeom prst="rightArrow">
+              <a:avLst/>
+            </a:prstGeom>
+          </p:spPr>
+          <p:style>
+            <a:lnRef idx="2">
+              <a:schemeClr val="accent1">
+                <a:shade val="50000"/>
+              </a:schemeClr>
+            </a:lnRef>
+            <a:fillRef idx="1">
+              <a:schemeClr val="accent1"/>
+            </a:fillRef>
+            <a:effectRef idx="0">
+              <a:schemeClr val="accent1"/>
+            </a:effectRef>
+            <a:fontRef idx="minor">
+              <a:schemeClr val="lt1"/>
+            </a:fontRef>
+          </p:style>
+          <p:txBody>
+            <a:bodyPr rtlCol="0" anchor="ctr"/>
+            <a:lstStyle/>
+            <a:p>
+              <a:pPr algn="ctr"/>
+              <a:endParaRPr lang="zh-CN" altLang="en-US"/>
+            </a:p>
+          </p:txBody>
+        </p:sp>
+        <p:sp>
+          <p:nvSpPr>
+            <p:cNvPr id="22" name="矩形 21">
+              <a:extLst>
+                <a:ext uri="{FF2B5EF4-FFF2-40B4-BE49-F238E27FC236}">
+                  <a16:creationId xmlns:a16="http://schemas.microsoft.com/office/drawing/2014/main" id="{5776CD71-01B4-44BA-A680-C3B3286073D2}"/>
+                </a:ext>
+              </a:extLst>
+            </p:cNvPr>
+            <p:cNvSpPr/>
+            <p:nvPr/>
+          </p:nvSpPr>
+          <p:spPr>
+            <a:xfrm>
+              <a:off x="5117291" y="5433144"/>
+              <a:ext cx="752617" cy="133165"/>
+            </a:xfrm>
+            <a:prstGeom prst="rect">
+              <a:avLst/>
+            </a:prstGeom>
+          </p:spPr>
+          <p:style>
+            <a:lnRef idx="2">
+              <a:schemeClr val="accent1">
+                <a:shade val="50000"/>
+              </a:schemeClr>
+            </a:lnRef>
+            <a:fillRef idx="1">
+              <a:schemeClr val="accent1"/>
+            </a:fillRef>
+            <a:effectRef idx="0">
+              <a:schemeClr val="accent1"/>
+            </a:effectRef>
+            <a:fontRef idx="minor">
+              <a:schemeClr val="lt1"/>
+            </a:fontRef>
+          </p:style>
+          <p:txBody>
+            <a:bodyPr rtlCol="0" anchor="ctr"/>
+            <a:lstStyle/>
+            <a:p>
+              <a:pPr algn="ctr"/>
+              <a:endParaRPr lang="zh-CN" altLang="en-US"/>
+            </a:p>
+          </p:txBody>
+        </p:sp>
+        <p:sp>
+          <p:nvSpPr>
+            <p:cNvPr id="23" name="矩形 22">
+              <a:extLst>
+                <a:ext uri="{FF2B5EF4-FFF2-40B4-BE49-F238E27FC236}">
+                  <a16:creationId xmlns:a16="http://schemas.microsoft.com/office/drawing/2014/main" id="{2AF60F4F-2647-4466-80F7-427C6A1470C5}"/>
+                </a:ext>
+              </a:extLst>
+            </p:cNvPr>
+            <p:cNvSpPr/>
+            <p:nvPr/>
+          </p:nvSpPr>
+          <p:spPr>
+            <a:xfrm>
+              <a:off x="5117291" y="5925788"/>
+              <a:ext cx="752617" cy="133165"/>
+            </a:xfrm>
+            <a:prstGeom prst="rect">
+              <a:avLst/>
+            </a:prstGeom>
+          </p:spPr>
+          <p:style>
+            <a:lnRef idx="2">
+              <a:schemeClr val="accent6">
+                <a:shade val="50000"/>
+              </a:schemeClr>
+            </a:lnRef>
+            <a:fillRef idx="1">
+              <a:schemeClr val="accent6"/>
+            </a:fillRef>
+            <a:effectRef idx="0">
+              <a:schemeClr val="accent6"/>
+            </a:effectRef>
+            <a:fontRef idx="minor">
+              <a:schemeClr val="lt1"/>
+            </a:fontRef>
+          </p:style>
+          <p:txBody>
+            <a:bodyPr rtlCol="0" anchor="ctr"/>
+            <a:lstStyle/>
+            <a:p>
+              <a:pPr algn="ctr"/>
+              <a:endParaRPr lang="zh-CN" altLang="en-US"/>
+            </a:p>
+          </p:txBody>
+        </p:sp>
+        <p:sp>
+          <p:nvSpPr>
+            <p:cNvPr id="24" name="矩形 23">
+              <a:extLst>
+                <a:ext uri="{FF2B5EF4-FFF2-40B4-BE49-F238E27FC236}">
+                  <a16:creationId xmlns:a16="http://schemas.microsoft.com/office/drawing/2014/main" id="{66B3F027-59E2-40BE-BC80-176BD3B60F90}"/>
+                </a:ext>
+              </a:extLst>
+            </p:cNvPr>
+            <p:cNvSpPr/>
+            <p:nvPr/>
+          </p:nvSpPr>
+          <p:spPr>
+            <a:xfrm>
+              <a:off x="5782032" y="5823093"/>
+              <a:ext cx="1278325" cy="338554"/>
+            </a:xfrm>
+            <a:prstGeom prst="rect">
+              <a:avLst/>
+            </a:prstGeom>
+            <a:noFill/>
+          </p:spPr>
+          <p:txBody>
+            <a:bodyPr wrap="square" lIns="91440" tIns="45720" rIns="91440" bIns="45720">
+              <a:spAutoFit/>
+            </a:bodyPr>
+            <a:lstStyle/>
+            <a:p>
+              <a:pPr algn="ctr"/>
+              <a:r>
+                <a:rPr lang="zh-CN" altLang="en-US" sz="1600" b="1">
+                  <a:ln w="0"/>
+                  <a:effectLst>
+                    <a:outerShdw blurRad="38100" dist="19050" dir="2700000" algn="tl" rotWithShape="0">
+                      <a:schemeClr val="dk1">
+                        <a:alpha val="40000"/>
+                      </a:schemeClr>
+                    </a:outerShdw>
+                  </a:effectLst>
+                </a:rPr>
+                <a:t>软件模块</a:t>
+              </a:r>
+              <a:endParaRPr lang="zh-CN" altLang="en-US" sz="1600" b="1" cap="none" spc="0">
+                <a:ln w="0"/>
+                <a:solidFill>
+                  <a:schemeClr val="tx1"/>
+                </a:solidFill>
+                <a:effectLst>
+                  <a:outerShdw blurRad="38100" dist="19050" dir="2700000" algn="tl" rotWithShape="0">
+                    <a:schemeClr val="dk1">
+                      <a:alpha val="40000"/>
+                    </a:schemeClr>
+                  </a:outerShdw>
+                </a:effectLst>
+              </a:endParaRPr>
+            </a:p>
+          </p:txBody>
+        </p:sp>
+        <p:sp>
+          <p:nvSpPr>
+            <p:cNvPr id="25" name="矩形 24">
+              <a:extLst>
+                <a:ext uri="{FF2B5EF4-FFF2-40B4-BE49-F238E27FC236}">
+                  <a16:creationId xmlns:a16="http://schemas.microsoft.com/office/drawing/2014/main" id="{1AEEEC79-AA13-4124-9F84-C7E488A1C2EA}"/>
+                </a:ext>
+              </a:extLst>
+            </p:cNvPr>
+            <p:cNvSpPr/>
+            <p:nvPr/>
+          </p:nvSpPr>
+          <p:spPr>
+            <a:xfrm>
+              <a:off x="5771206" y="5349302"/>
+              <a:ext cx="1278325" cy="338554"/>
+            </a:xfrm>
+            <a:prstGeom prst="rect">
+              <a:avLst/>
+            </a:prstGeom>
+            <a:noFill/>
+          </p:spPr>
+          <p:txBody>
+            <a:bodyPr wrap="square" lIns="91440" tIns="45720" rIns="91440" bIns="45720">
+              <a:spAutoFit/>
+            </a:bodyPr>
+            <a:lstStyle/>
+            <a:p>
+              <a:pPr algn="ctr"/>
+              <a:r>
+                <a:rPr lang="zh-CN" altLang="en-US" sz="1600" b="1">
+                  <a:ln w="0"/>
+                  <a:effectLst>
+                    <a:outerShdw blurRad="38100" dist="19050" dir="2700000" algn="tl" rotWithShape="0">
+                      <a:schemeClr val="dk1">
+                        <a:alpha val="40000"/>
+                      </a:schemeClr>
+                    </a:outerShdw>
+                  </a:effectLst>
+                </a:rPr>
+                <a:t>硬件模块</a:t>
+              </a:r>
+              <a:endParaRPr lang="zh-CN" altLang="en-US" sz="1600" b="1" cap="none" spc="0">
+                <a:ln w="0"/>
+                <a:solidFill>
+                  <a:schemeClr val="tx1"/>
+                </a:solidFill>
+                <a:effectLst>
+                  <a:outerShdw blurRad="38100" dist="19050" dir="2700000" algn="tl" rotWithShape="0">
+                    <a:schemeClr val="dk1">
+                      <a:alpha val="40000"/>
+                    </a:schemeClr>
+                  </a:outerShdw>
+                </a:effectLst>
+              </a:endParaRPr>
+            </a:p>
+          </p:txBody>
+        </p:sp>
+        <p:sp>
+          <p:nvSpPr>
+            <p:cNvPr id="27" name="矩形 26">
+              <a:extLst>
+                <a:ext uri="{FF2B5EF4-FFF2-40B4-BE49-F238E27FC236}">
+                  <a16:creationId xmlns:a16="http://schemas.microsoft.com/office/drawing/2014/main" id="{1D324D75-49B5-4D50-90AB-4E36A15DF27B}"/>
+                </a:ext>
+              </a:extLst>
+            </p:cNvPr>
+            <p:cNvSpPr/>
+            <p:nvPr/>
+          </p:nvSpPr>
+          <p:spPr>
+            <a:xfrm>
+              <a:off x="4731798" y="1633491"/>
+              <a:ext cx="7332955" cy="5053636"/>
+            </a:xfrm>
+            <a:prstGeom prst="rect">
+              <a:avLst/>
+            </a:prstGeom>
+            <a:noFill/>
+            <a:ln w="57150" cap="flat" cmpd="sng" algn="ctr">
+              <a:solidFill>
+                <a:schemeClr val="accent1"/>
+              </a:solidFill>
+              <a:prstDash val="dash"/>
+              <a:round/>
+              <a:headEnd type="none" w="med" len="med"/>
+              <a:tailEnd type="none" w="med" len="med"/>
+            </a:ln>
+          </p:spPr>
+          <p:style>
+            <a:lnRef idx="0">
+              <a:scrgbClr r="0" g="0" b="0"/>
+            </a:lnRef>
+            <a:fillRef idx="0">
+              <a:scrgbClr r="0" g="0" b="0"/>
+            </a:fillRef>
+            <a:effectRef idx="0">
+              <a:scrgbClr r="0" g="0" b="0"/>
+            </a:effectRef>
+            <a:fontRef idx="minor">
+              <a:schemeClr val="accent1"/>
+            </a:fontRef>
+          </p:style>
+          <p:txBody>
+            <a:bodyPr rtlCol="0" anchor="ctr"/>
+            <a:lstStyle/>
+            <a:p>
+              <a:pPr algn="ctr"/>
+              <a:endParaRPr lang="zh-CN" altLang="en-US"/>
+            </a:p>
+          </p:txBody>
+        </p:sp>
+      </p:grpSp>
     </p:spTree>
     <p:extLst>
       <p:ext uri="{BB962C8B-B14F-4D97-AF65-F5344CB8AC3E}">
-        <p14:creationId xmlns:p14="http://schemas.microsoft.com/office/powerpoint/2010/main" val="498028052"/>
+        <p14:creationId xmlns:p14="http://schemas.microsoft.com/office/powerpoint/2010/main" val="914006586"/>
       </p:ext>
     </p:extLst>
   </p:cSld>
@@ -4511,7 +5759,7 @@
 </p:sld>
 </file>
 
-<file path=ppt/slides/slide5.xml><?xml version="1.0" encoding="utf-8"?>
+<file path=ppt/slides/slide4.xml><?xml version="1.0" encoding="utf-8"?>
 <p:sld xmlns:a="http://schemas.openxmlformats.org/drawingml/2006/main" xmlns:r="http://schemas.openxmlformats.org/officeDocument/2006/relationships" xmlns:p="http://schemas.openxmlformats.org/presentationml/2006/main">
   <p:cSld>
     <p:spTree>
@@ -5520,6 +6768,219 @@
 </p:sld>
 </file>
 
+<file path=ppt/slides/slide5.xml><?xml version="1.0" encoding="utf-8"?>
+<p:sld xmlns:a="http://schemas.openxmlformats.org/drawingml/2006/main" xmlns:r="http://schemas.openxmlformats.org/officeDocument/2006/relationships" xmlns:p="http://schemas.openxmlformats.org/presentationml/2006/main">
+  <p:cSld>
+    <p:spTree>
+      <p:nvGrpSpPr>
+        <p:cNvPr id="1" name=""/>
+        <p:cNvGrpSpPr/>
+        <p:nvPr/>
+      </p:nvGrpSpPr>
+      <p:grpSpPr>
+        <a:xfrm>
+          <a:off x="0" y="0"/>
+          <a:ext cx="0" cy="0"/>
+          <a:chOff x="0" y="0"/>
+          <a:chExt cx="0" cy="0"/>
+        </a:xfrm>
+      </p:grpSpPr>
+      <p:sp>
+        <p:nvSpPr>
+          <p:cNvPr id="2" name="标题 1">
+            <a:extLst>
+              <a:ext uri="{FF2B5EF4-FFF2-40B4-BE49-F238E27FC236}">
+                <a16:creationId xmlns:a16="http://schemas.microsoft.com/office/drawing/2014/main" id="{0B721174-3A82-40DD-B97C-5288E6FADA36}"/>
+              </a:ext>
+            </a:extLst>
+          </p:cNvPr>
+          <p:cNvSpPr>
+            <a:spLocks noGrp="1"/>
+          </p:cNvSpPr>
+          <p:nvPr>
+            <p:ph type="title"/>
+          </p:nvPr>
+        </p:nvSpPr>
+        <p:spPr/>
+        <p:txBody>
+          <a:bodyPr/>
+          <a:lstStyle/>
+          <a:p>
+            <a:r>
+              <a:rPr lang="zh-CN" altLang="en-US"/>
+              <a:t>关键信号流分析</a:t>
+            </a:r>
+          </a:p>
+        </p:txBody>
+      </p:sp>
+      <p:sp>
+        <p:nvSpPr>
+          <p:cNvPr id="3" name="内容占位符 2">
+            <a:extLst>
+              <a:ext uri="{FF2B5EF4-FFF2-40B4-BE49-F238E27FC236}">
+                <a16:creationId xmlns:a16="http://schemas.microsoft.com/office/drawing/2014/main" id="{2E3CAB9F-2DD3-434D-8467-36ED41CBF320}"/>
+              </a:ext>
+            </a:extLst>
+          </p:cNvPr>
+          <p:cNvSpPr>
+            <a:spLocks noGrp="1"/>
+          </p:cNvSpPr>
+          <p:nvPr>
+            <p:ph idx="1"/>
+          </p:nvPr>
+        </p:nvSpPr>
+        <p:spPr/>
+        <p:txBody>
+          <a:bodyPr>
+            <a:normAutofit fontScale="92500" lnSpcReduction="10000"/>
+          </a:bodyPr>
+          <a:lstStyle/>
+          <a:p>
+            <a:r>
+              <a:rPr lang="zh-CN" altLang="en-US"/>
+              <a:t>图像</a:t>
+            </a:r>
+            <a:endParaRPr lang="en-US" altLang="zh-CN"/>
+          </a:p>
+          <a:p>
+            <a:pPr lvl="1"/>
+            <a:r>
+              <a:rPr lang="zh-CN" altLang="en-US"/>
+              <a:t>相机分辨率足够高，满足文字识别的要求</a:t>
+            </a:r>
+            <a:endParaRPr lang="en-US" altLang="zh-CN"/>
+          </a:p>
+          <a:p>
+            <a:pPr lvl="1"/>
+            <a:r>
+              <a:rPr lang="zh-CN" altLang="en-US"/>
+              <a:t>针对传入的图像进一步的增强处理</a:t>
+            </a:r>
+            <a:endParaRPr lang="en-US" altLang="zh-CN"/>
+          </a:p>
+          <a:p>
+            <a:r>
+              <a:rPr lang="zh-CN" altLang="en-US"/>
+              <a:t>音频</a:t>
+            </a:r>
+            <a:endParaRPr lang="en-US" altLang="zh-CN"/>
+          </a:p>
+          <a:p>
+            <a:pPr lvl="1"/>
+            <a:r>
+              <a:rPr lang="zh-CN" altLang="en-US"/>
+              <a:t>放大器电路运放的选择</a:t>
+            </a:r>
+            <a:endParaRPr lang="en-US" altLang="zh-CN"/>
+          </a:p>
+          <a:p>
+            <a:pPr lvl="1"/>
+            <a:r>
+              <a:rPr lang="zh-CN" altLang="en-US"/>
+              <a:t>带通滤波器的频带范围：</a:t>
+            </a:r>
+            <a:r>
+              <a:rPr lang="en-US" altLang="zh-CN"/>
+              <a:t>300Hz-3400Hz</a:t>
+            </a:r>
+          </a:p>
+          <a:p>
+            <a:pPr lvl="1"/>
+            <a:r>
+              <a:rPr lang="zh-CN" altLang="en-US"/>
+              <a:t>电平调整器输出范围：</a:t>
+            </a:r>
+            <a:r>
+              <a:rPr lang="en-US" altLang="zh-CN"/>
+              <a:t>0~5V</a:t>
+            </a:r>
+          </a:p>
+          <a:p>
+            <a:pPr lvl="1"/>
+            <a:r>
+              <a:rPr lang="zh-CN" altLang="en-US"/>
+              <a:t>模数转换电路芯片</a:t>
+            </a:r>
+            <a:endParaRPr lang="en-US" altLang="zh-CN"/>
+          </a:p>
+          <a:p>
+            <a:pPr lvl="2"/>
+            <a:r>
+              <a:rPr lang="zh-CN" altLang="en-US"/>
+              <a:t>采样速率取决于树莓派</a:t>
+            </a:r>
+            <a:r>
+              <a:rPr lang="en-US" altLang="zh-CN"/>
+              <a:t>I2C</a:t>
+            </a:r>
+            <a:r>
+              <a:rPr lang="zh-CN" altLang="en-US"/>
+              <a:t>设置</a:t>
+            </a:r>
+            <a:endParaRPr lang="en-US" altLang="zh-CN"/>
+          </a:p>
+          <a:p>
+            <a:pPr lvl="2"/>
+            <a:r>
+              <a:rPr lang="zh-CN" altLang="en-US"/>
+              <a:t>信号位宽</a:t>
+            </a:r>
+            <a:r>
+              <a:rPr lang="en-US" altLang="zh-CN"/>
+              <a:t>8Bit</a:t>
+            </a:r>
+          </a:p>
+        </p:txBody>
+      </p:sp>
+      <p:pic>
+        <p:nvPicPr>
+          <p:cNvPr id="5" name="图片 4">
+            <a:extLst>
+              <a:ext uri="{FF2B5EF4-FFF2-40B4-BE49-F238E27FC236}">
+                <a16:creationId xmlns:a16="http://schemas.microsoft.com/office/drawing/2014/main" id="{CC0D2B3C-B4EC-457C-9C2D-A35FA698B76F}"/>
+              </a:ext>
+            </a:extLst>
+          </p:cNvPr>
+          <p:cNvPicPr>
+            <a:picLocks noChangeAspect="1"/>
+          </p:cNvPicPr>
+          <p:nvPr/>
+        </p:nvPicPr>
+        <p:blipFill>
+          <a:blip r:embed="rId2">
+            <a:extLst>
+              <a:ext uri="{28A0092B-C50C-407E-A947-70E740481C1C}">
+                <a14:useLocalDpi xmlns:a14="http://schemas.microsoft.com/office/drawing/2010/main" val="0"/>
+              </a:ext>
+            </a:extLst>
+          </a:blip>
+          <a:stretch>
+            <a:fillRect/>
+          </a:stretch>
+        </p:blipFill>
+        <p:spPr>
+          <a:xfrm>
+            <a:off x="7497923" y="1438433"/>
+            <a:ext cx="3332834" cy="5310254"/>
+          </a:xfrm>
+          <a:prstGeom prst="rect">
+            <a:avLst/>
+          </a:prstGeom>
+        </p:spPr>
+      </p:pic>
+    </p:spTree>
+    <p:extLst>
+      <p:ext uri="{BB962C8B-B14F-4D97-AF65-F5344CB8AC3E}">
+        <p14:creationId xmlns:p14="http://schemas.microsoft.com/office/powerpoint/2010/main" val="1726155529"/>
+      </p:ext>
+    </p:extLst>
+  </p:cSld>
+  <p:clrMapOvr>
+    <a:masterClrMapping/>
+  </p:clrMapOvr>
+</p:sld>
+</file>
+
 <file path=ppt/slides/slide6.xml><?xml version="1.0" encoding="utf-8"?>
 <p:sld xmlns:a="http://schemas.openxmlformats.org/drawingml/2006/main" xmlns:r="http://schemas.openxmlformats.org/officeDocument/2006/relationships" xmlns:p="http://schemas.openxmlformats.org/presentationml/2006/main">
   <p:cSld>
@@ -5542,7 +7003,7 @@
           <p:cNvPr id="2" name="标题 1">
             <a:extLst>
               <a:ext uri="{FF2B5EF4-FFF2-40B4-BE49-F238E27FC236}">
-                <a16:creationId xmlns:a16="http://schemas.microsoft.com/office/drawing/2014/main" id="{6528546D-8FB6-4CED-AF3F-F977514E6F87}"/>
+                <a16:creationId xmlns:a16="http://schemas.microsoft.com/office/drawing/2014/main" id="{86F531CB-68FC-4CDB-B908-A1C865F3ECA0}"/>
               </a:ext>
             </a:extLst>
           </p:cNvPr>
@@ -5560,7 +7021,7 @@
           <a:p>
             <a:r>
               <a:rPr lang="zh-CN" altLang="en-US"/>
-              <a:t>软硬件架构级设计</a:t>
+              <a:t>硬件模块框图</a:t>
             </a:r>
           </a:p>
         </p:txBody>
@@ -5570,7 +7031,7 @@
           <p:cNvPr id="3" name="内容占位符 2">
             <a:extLst>
               <a:ext uri="{FF2B5EF4-FFF2-40B4-BE49-F238E27FC236}">
-                <a16:creationId xmlns:a16="http://schemas.microsoft.com/office/drawing/2014/main" id="{A8285A90-BC7B-464D-B8C9-7AA9A8B542B2}"/>
+                <a16:creationId xmlns:a16="http://schemas.microsoft.com/office/drawing/2014/main" id="{FBB0288F-3EE8-4A84-A45B-418378DAD0B5}"/>
               </a:ext>
             </a:extLst>
           </p:cNvPr>
@@ -5583,14 +7044,12 @@
         </p:nvSpPr>
         <p:spPr/>
         <p:txBody>
-          <a:bodyPr>
-            <a:normAutofit fontScale="92500"/>
-          </a:bodyPr>
+          <a:bodyPr/>
           <a:lstStyle/>
           <a:p>
             <a:r>
               <a:rPr lang="zh-CN" altLang="en-US"/>
-              <a:t>软件模块</a:t>
+              <a:t>处理器模块</a:t>
             </a:r>
             <a:endParaRPr lang="en-US" altLang="zh-CN"/>
           </a:p>
@@ -5598,7 +7057,7 @@
             <a:pPr lvl="1"/>
             <a:r>
               <a:rPr lang="zh-CN" altLang="en-US"/>
-              <a:t>按键检测</a:t>
+              <a:t>选择树莓派作为开发平台</a:t>
             </a:r>
             <a:endParaRPr lang="en-US" altLang="zh-CN"/>
           </a:p>
@@ -5606,70 +7065,1329 @@
             <a:pPr lvl="1"/>
             <a:r>
               <a:rPr lang="zh-CN" altLang="en-US"/>
-              <a:t>图像处理</a:t>
-            </a:r>
-            <a:endParaRPr lang="en-US" altLang="zh-CN"/>
-          </a:p>
-          <a:p>
-            <a:pPr lvl="1"/>
-            <a:r>
-              <a:rPr lang="zh-CN" altLang="en-US"/>
-              <a:t>书籍位置提醒</a:t>
-            </a:r>
-            <a:endParaRPr lang="en-US" altLang="zh-CN"/>
-          </a:p>
-          <a:p>
-            <a:pPr lvl="1"/>
-            <a:r>
-              <a:rPr lang="zh-CN" altLang="en-US"/>
-              <a:t>调用</a:t>
-            </a:r>
-            <a:r>
-              <a:rPr lang="en-US" altLang="zh-CN"/>
-              <a:t>API</a:t>
-            </a:r>
-          </a:p>
-          <a:p>
-            <a:pPr lvl="1"/>
-            <a:r>
-              <a:rPr lang="zh-CN" altLang="en-US"/>
-              <a:t>上传读书数据</a:t>
-            </a:r>
-            <a:endParaRPr lang="en-US" altLang="zh-CN"/>
-          </a:p>
-          <a:p>
-            <a:r>
-              <a:rPr lang="zh-CN" altLang="en-US"/>
-              <a:t>硬件模块</a:t>
-            </a:r>
-            <a:endParaRPr lang="en-US" altLang="zh-CN"/>
-          </a:p>
-          <a:p>
-            <a:pPr lvl="1"/>
-            <a:r>
-              <a:rPr lang="zh-CN" altLang="en-US"/>
-              <a:t>音频处理模块</a:t>
-            </a:r>
-            <a:endParaRPr lang="en-US" altLang="zh-CN"/>
-          </a:p>
-          <a:p>
-            <a:pPr lvl="1"/>
-            <a:r>
-              <a:rPr lang="zh-CN" altLang="en-US"/>
-              <a:t>电源模块</a:t>
-            </a:r>
-            <a:endParaRPr lang="en-US" altLang="zh-CN"/>
-          </a:p>
-          <a:p>
-            <a:pPr lvl="1"/>
-            <a:endParaRPr lang="zh-CN" altLang="en-US"/>
+              <a:t>集成了无线通信模块</a:t>
+            </a:r>
           </a:p>
         </p:txBody>
       </p:sp>
+      <p:grpSp>
+        <p:nvGrpSpPr>
+          <p:cNvPr id="34" name="组合 33">
+            <a:extLst>
+              <a:ext uri="{FF2B5EF4-FFF2-40B4-BE49-F238E27FC236}">
+                <a16:creationId xmlns:a16="http://schemas.microsoft.com/office/drawing/2014/main" id="{8E9D2FA9-5B14-4E14-83E7-54C9DF8751BF}"/>
+              </a:ext>
+            </a:extLst>
+          </p:cNvPr>
+          <p:cNvGrpSpPr/>
+          <p:nvPr/>
+        </p:nvGrpSpPr>
+        <p:grpSpPr>
+          <a:xfrm>
+            <a:off x="695115" y="3252021"/>
+            <a:ext cx="10653162" cy="3605305"/>
+            <a:chOff x="695115" y="3252021"/>
+            <a:chExt cx="10653162" cy="3605305"/>
+          </a:xfrm>
+        </p:grpSpPr>
+        <p:pic>
+          <p:nvPicPr>
+            <p:cNvPr id="5" name="图形 4" descr="处理器">
+              <a:extLst>
+                <a:ext uri="{FF2B5EF4-FFF2-40B4-BE49-F238E27FC236}">
+                  <a16:creationId xmlns:a16="http://schemas.microsoft.com/office/drawing/2014/main" id="{F8C0DDBA-1AAD-4A84-A2F0-D406C85BDDF1}"/>
+                </a:ext>
+              </a:extLst>
+            </p:cNvPr>
+            <p:cNvPicPr>
+              <a:picLocks noChangeAspect="1"/>
+            </p:cNvPicPr>
+            <p:nvPr/>
+          </p:nvPicPr>
+          <p:blipFill>
+            <a:blip r:embed="rId2">
+              <a:extLst>
+                <a:ext uri="{28A0092B-C50C-407E-A947-70E740481C1C}">
+                  <a14:useLocalDpi xmlns:a14="http://schemas.microsoft.com/office/drawing/2010/main" val="0"/>
+                </a:ext>
+                <a:ext uri="{96DAC541-7B7A-43D3-8B79-37D633B846F1}">
+                  <asvg:svgBlip xmlns:asvg="http://schemas.microsoft.com/office/drawing/2016/SVG/main" r:embed="rId3"/>
+                </a:ext>
+              </a:extLst>
+            </a:blip>
+            <a:stretch>
+              <a:fillRect/>
+            </a:stretch>
+          </p:blipFill>
+          <p:spPr>
+            <a:xfrm>
+              <a:off x="6096000" y="3252021"/>
+              <a:ext cx="2424510" cy="2424510"/>
+            </a:xfrm>
+            <a:prstGeom prst="rect">
+              <a:avLst/>
+            </a:prstGeom>
+          </p:spPr>
+        </p:pic>
+        <p:pic>
+          <p:nvPicPr>
+            <p:cNvPr id="7" name="图形 6" descr="Web 摄像头">
+              <a:extLst>
+                <a:ext uri="{FF2B5EF4-FFF2-40B4-BE49-F238E27FC236}">
+                  <a16:creationId xmlns:a16="http://schemas.microsoft.com/office/drawing/2014/main" id="{7558088B-28EA-47FA-B74D-5DC6B1E3CCBE}"/>
+                </a:ext>
+              </a:extLst>
+            </p:cNvPr>
+            <p:cNvPicPr>
+              <a:picLocks noChangeAspect="1"/>
+            </p:cNvPicPr>
+            <p:nvPr/>
+          </p:nvPicPr>
+          <p:blipFill>
+            <a:blip r:embed="rId4">
+              <a:extLst>
+                <a:ext uri="{28A0092B-C50C-407E-A947-70E740481C1C}">
+                  <a14:useLocalDpi xmlns:a14="http://schemas.microsoft.com/office/drawing/2010/main" val="0"/>
+                </a:ext>
+                <a:ext uri="{96DAC541-7B7A-43D3-8B79-37D633B846F1}">
+                  <asvg:svgBlip xmlns:asvg="http://schemas.microsoft.com/office/drawing/2016/SVG/main" r:embed="rId5"/>
+                </a:ext>
+              </a:extLst>
+            </a:blip>
+            <a:stretch>
+              <a:fillRect/>
+            </a:stretch>
+          </p:blipFill>
+          <p:spPr>
+            <a:xfrm>
+              <a:off x="3695150" y="3267900"/>
+              <a:ext cx="1105729" cy="1105729"/>
+            </a:xfrm>
+            <a:prstGeom prst="rect">
+              <a:avLst/>
+            </a:prstGeom>
+          </p:spPr>
+        </p:pic>
+        <p:pic>
+          <p:nvPicPr>
+            <p:cNvPr id="9" name="图形 8" descr="耳机">
+              <a:extLst>
+                <a:ext uri="{FF2B5EF4-FFF2-40B4-BE49-F238E27FC236}">
+                  <a16:creationId xmlns:a16="http://schemas.microsoft.com/office/drawing/2014/main" id="{980E95D0-255A-470B-91FD-87ADA5F2FE14}"/>
+                </a:ext>
+              </a:extLst>
+            </p:cNvPr>
+            <p:cNvPicPr>
+              <a:picLocks noChangeAspect="1"/>
+            </p:cNvPicPr>
+            <p:nvPr/>
+          </p:nvPicPr>
+          <p:blipFill>
+            <a:blip r:embed="rId6">
+              <a:extLst>
+                <a:ext uri="{28A0092B-C50C-407E-A947-70E740481C1C}">
+                  <a14:useLocalDpi xmlns:a14="http://schemas.microsoft.com/office/drawing/2010/main" val="0"/>
+                </a:ext>
+                <a:ext uri="{96DAC541-7B7A-43D3-8B79-37D633B846F1}">
+                  <asvg:svgBlip xmlns:asvg="http://schemas.microsoft.com/office/drawing/2016/SVG/main" r:embed="rId7"/>
+                </a:ext>
+              </a:extLst>
+            </a:blip>
+            <a:stretch>
+              <a:fillRect/>
+            </a:stretch>
+          </p:blipFill>
+          <p:spPr>
+            <a:xfrm>
+              <a:off x="9876597" y="4053197"/>
+              <a:ext cx="914400" cy="914400"/>
+            </a:xfrm>
+            <a:prstGeom prst="rect">
+              <a:avLst/>
+            </a:prstGeom>
+          </p:spPr>
+        </p:pic>
+        <p:pic>
+          <p:nvPicPr>
+            <p:cNvPr id="11" name="图形 10" descr="无线话筒">
+              <a:extLst>
+                <a:ext uri="{FF2B5EF4-FFF2-40B4-BE49-F238E27FC236}">
+                  <a16:creationId xmlns:a16="http://schemas.microsoft.com/office/drawing/2014/main" id="{B285CF4F-65AA-49C7-ACCE-56B2A012569F}"/>
+                </a:ext>
+              </a:extLst>
+            </p:cNvPr>
+            <p:cNvPicPr>
+              <a:picLocks noChangeAspect="1"/>
+            </p:cNvPicPr>
+            <p:nvPr/>
+          </p:nvPicPr>
+          <p:blipFill>
+            <a:blip r:embed="rId8">
+              <a:extLst>
+                <a:ext uri="{28A0092B-C50C-407E-A947-70E740481C1C}">
+                  <a14:useLocalDpi xmlns:a14="http://schemas.microsoft.com/office/drawing/2010/main" val="0"/>
+                </a:ext>
+                <a:ext uri="{96DAC541-7B7A-43D3-8B79-37D633B846F1}">
+                  <asvg:svgBlip xmlns:asvg="http://schemas.microsoft.com/office/drawing/2016/SVG/main" r:embed="rId9"/>
+                </a:ext>
+              </a:extLst>
+            </a:blip>
+            <a:stretch>
+              <a:fillRect/>
+            </a:stretch>
+          </p:blipFill>
+          <p:spPr>
+            <a:xfrm>
+              <a:off x="1267106" y="4439929"/>
+              <a:ext cx="914400" cy="914400"/>
+            </a:xfrm>
+            <a:prstGeom prst="rect">
+              <a:avLst/>
+            </a:prstGeom>
+          </p:spPr>
+        </p:pic>
+        <p:sp>
+          <p:nvSpPr>
+            <p:cNvPr id="12" name="箭头: 右 11">
+              <a:extLst>
+                <a:ext uri="{FF2B5EF4-FFF2-40B4-BE49-F238E27FC236}">
+                  <a16:creationId xmlns:a16="http://schemas.microsoft.com/office/drawing/2014/main" id="{0CF30027-FFE4-4461-8F75-5CD80FF56743}"/>
+                </a:ext>
+              </a:extLst>
+            </p:cNvPr>
+            <p:cNvSpPr/>
+            <p:nvPr/>
+          </p:nvSpPr>
+          <p:spPr>
+            <a:xfrm>
+              <a:off x="4844247" y="3793559"/>
+              <a:ext cx="1374280" cy="239697"/>
+            </a:xfrm>
+            <a:prstGeom prst="rightArrow">
+              <a:avLst/>
+            </a:prstGeom>
+          </p:spPr>
+          <p:style>
+            <a:lnRef idx="2">
+              <a:schemeClr val="accent1">
+                <a:shade val="50000"/>
+              </a:schemeClr>
+            </a:lnRef>
+            <a:fillRef idx="1">
+              <a:schemeClr val="accent1"/>
+            </a:fillRef>
+            <a:effectRef idx="0">
+              <a:schemeClr val="accent1"/>
+            </a:effectRef>
+            <a:fontRef idx="minor">
+              <a:schemeClr val="lt1"/>
+            </a:fontRef>
+          </p:style>
+          <p:txBody>
+            <a:bodyPr rtlCol="0" anchor="ctr"/>
+            <a:lstStyle/>
+            <a:p>
+              <a:pPr algn="ctr"/>
+              <a:endParaRPr lang="zh-CN" altLang="en-US"/>
+            </a:p>
+          </p:txBody>
+        </p:sp>
+        <p:sp>
+          <p:nvSpPr>
+            <p:cNvPr id="13" name="箭头: 右 12">
+              <a:extLst>
+                <a:ext uri="{FF2B5EF4-FFF2-40B4-BE49-F238E27FC236}">
+                  <a16:creationId xmlns:a16="http://schemas.microsoft.com/office/drawing/2014/main" id="{D65155DD-6F6B-4346-B184-9FADFCA9F1C9}"/>
+                </a:ext>
+              </a:extLst>
+            </p:cNvPr>
+            <p:cNvSpPr/>
+            <p:nvPr/>
+          </p:nvSpPr>
+          <p:spPr>
+            <a:xfrm>
+              <a:off x="2252053" y="4847751"/>
+              <a:ext cx="1306832" cy="239696"/>
+            </a:xfrm>
+            <a:prstGeom prst="rightArrow">
+              <a:avLst/>
+            </a:prstGeom>
+          </p:spPr>
+          <p:style>
+            <a:lnRef idx="2">
+              <a:schemeClr val="accent1">
+                <a:shade val="50000"/>
+              </a:schemeClr>
+            </a:lnRef>
+            <a:fillRef idx="1">
+              <a:schemeClr val="accent1"/>
+            </a:fillRef>
+            <a:effectRef idx="0">
+              <a:schemeClr val="accent1"/>
+            </a:effectRef>
+            <a:fontRef idx="minor">
+              <a:schemeClr val="lt1"/>
+            </a:fontRef>
+          </p:style>
+          <p:txBody>
+            <a:bodyPr rtlCol="0" anchor="ctr"/>
+            <a:lstStyle/>
+            <a:p>
+              <a:pPr algn="ctr"/>
+              <a:endParaRPr lang="zh-CN" altLang="en-US"/>
+            </a:p>
+          </p:txBody>
+        </p:sp>
+        <p:sp>
+          <p:nvSpPr>
+            <p:cNvPr id="14" name="矩形 13">
+              <a:extLst>
+                <a:ext uri="{FF2B5EF4-FFF2-40B4-BE49-F238E27FC236}">
+                  <a16:creationId xmlns:a16="http://schemas.microsoft.com/office/drawing/2014/main" id="{98B7E327-1E21-4F88-B225-0FD4D2E9D650}"/>
+                </a:ext>
+              </a:extLst>
+            </p:cNvPr>
+            <p:cNvSpPr/>
+            <p:nvPr/>
+          </p:nvSpPr>
+          <p:spPr>
+            <a:xfrm>
+              <a:off x="3695150" y="4610129"/>
+              <a:ext cx="1001137" cy="663207"/>
+            </a:xfrm>
+            <a:prstGeom prst="rect">
+              <a:avLst/>
+            </a:prstGeom>
+          </p:spPr>
+          <p:style>
+            <a:lnRef idx="2">
+              <a:schemeClr val="accent1">
+                <a:shade val="50000"/>
+              </a:schemeClr>
+            </a:lnRef>
+            <a:fillRef idx="1">
+              <a:schemeClr val="accent1"/>
+            </a:fillRef>
+            <a:effectRef idx="0">
+              <a:schemeClr val="accent1"/>
+            </a:effectRef>
+            <a:fontRef idx="minor">
+              <a:schemeClr val="lt1"/>
+            </a:fontRef>
+          </p:style>
+          <p:txBody>
+            <a:bodyPr rtlCol="0" anchor="ctr"/>
+            <a:lstStyle/>
+            <a:p>
+              <a:pPr algn="ctr"/>
+              <a:r>
+                <a:rPr lang="en-US" altLang="zh-CN"/>
+                <a:t>ADC</a:t>
+              </a:r>
+              <a:endParaRPr lang="zh-CN" altLang="en-US"/>
+            </a:p>
+          </p:txBody>
+        </p:sp>
+        <p:sp>
+          <p:nvSpPr>
+            <p:cNvPr id="15" name="箭头: 右 14">
+              <a:extLst>
+                <a:ext uri="{FF2B5EF4-FFF2-40B4-BE49-F238E27FC236}">
+                  <a16:creationId xmlns:a16="http://schemas.microsoft.com/office/drawing/2014/main" id="{5EEBA4AD-C207-43A4-8C1C-2ACEBF07523D}"/>
+                </a:ext>
+              </a:extLst>
+            </p:cNvPr>
+            <p:cNvSpPr/>
+            <p:nvPr/>
+          </p:nvSpPr>
+          <p:spPr>
+            <a:xfrm>
+              <a:off x="4844247" y="4847749"/>
+              <a:ext cx="1374280" cy="239697"/>
+            </a:xfrm>
+            <a:prstGeom prst="rightArrow">
+              <a:avLst/>
+            </a:prstGeom>
+          </p:spPr>
+          <p:style>
+            <a:lnRef idx="2">
+              <a:schemeClr val="accent1">
+                <a:shade val="50000"/>
+              </a:schemeClr>
+            </a:lnRef>
+            <a:fillRef idx="1">
+              <a:schemeClr val="accent1"/>
+            </a:fillRef>
+            <a:effectRef idx="0">
+              <a:schemeClr val="accent1"/>
+            </a:effectRef>
+            <a:fontRef idx="minor">
+              <a:schemeClr val="lt1"/>
+            </a:fontRef>
+          </p:style>
+          <p:txBody>
+            <a:bodyPr rtlCol="0" anchor="ctr"/>
+            <a:lstStyle/>
+            <a:p>
+              <a:pPr algn="ctr"/>
+              <a:endParaRPr lang="zh-CN" altLang="en-US"/>
+            </a:p>
+          </p:txBody>
+        </p:sp>
+        <p:sp>
+          <p:nvSpPr>
+            <p:cNvPr id="16" name="箭头: 右 15">
+              <a:extLst>
+                <a:ext uri="{FF2B5EF4-FFF2-40B4-BE49-F238E27FC236}">
+                  <a16:creationId xmlns:a16="http://schemas.microsoft.com/office/drawing/2014/main" id="{C56CC689-EA81-43FB-9544-F78207863C75}"/>
+                </a:ext>
+              </a:extLst>
+            </p:cNvPr>
+            <p:cNvSpPr/>
+            <p:nvPr/>
+          </p:nvSpPr>
+          <p:spPr>
+            <a:xfrm>
+              <a:off x="8456726" y="4385599"/>
+              <a:ext cx="1374280" cy="239697"/>
+            </a:xfrm>
+            <a:prstGeom prst="rightArrow">
+              <a:avLst/>
+            </a:prstGeom>
+          </p:spPr>
+          <p:style>
+            <a:lnRef idx="2">
+              <a:schemeClr val="accent1">
+                <a:shade val="50000"/>
+              </a:schemeClr>
+            </a:lnRef>
+            <a:fillRef idx="1">
+              <a:schemeClr val="accent1"/>
+            </a:fillRef>
+            <a:effectRef idx="0">
+              <a:schemeClr val="accent1"/>
+            </a:effectRef>
+            <a:fontRef idx="minor">
+              <a:schemeClr val="lt1"/>
+            </a:fontRef>
+          </p:style>
+          <p:txBody>
+            <a:bodyPr rtlCol="0" anchor="ctr"/>
+            <a:lstStyle/>
+            <a:p>
+              <a:pPr algn="ctr"/>
+              <a:endParaRPr lang="zh-CN" altLang="en-US"/>
+            </a:p>
+          </p:txBody>
+        </p:sp>
+        <p:sp>
+          <p:nvSpPr>
+            <p:cNvPr id="17" name="矩形 16">
+              <a:extLst>
+                <a:ext uri="{FF2B5EF4-FFF2-40B4-BE49-F238E27FC236}">
+                  <a16:creationId xmlns:a16="http://schemas.microsoft.com/office/drawing/2014/main" id="{A8F3862C-C16F-4D43-BBB4-4C59791852BA}"/>
+                </a:ext>
+              </a:extLst>
+            </p:cNvPr>
+            <p:cNvSpPr/>
+            <p:nvPr/>
+          </p:nvSpPr>
+          <p:spPr>
+            <a:xfrm>
+              <a:off x="4808659" y="3424227"/>
+              <a:ext cx="1382110" cy="400110"/>
+            </a:xfrm>
+            <a:prstGeom prst="rect">
+              <a:avLst/>
+            </a:prstGeom>
+            <a:noFill/>
+          </p:spPr>
+          <p:txBody>
+            <a:bodyPr wrap="none" lIns="91440" tIns="45720" rIns="91440" bIns="45720">
+              <a:spAutoFit/>
+            </a:bodyPr>
+            <a:lstStyle/>
+            <a:p>
+              <a:pPr algn="ctr"/>
+              <a:r>
+                <a:rPr lang="en-US" altLang="zh-CN" sz="2000" b="1" cap="none" spc="0">
+                  <a:ln w="0"/>
+                  <a:solidFill>
+                    <a:schemeClr val="tx1"/>
+                  </a:solidFill>
+                  <a:effectLst>
+                    <a:outerShdw blurRad="38100" dist="19050" dir="2700000" algn="tl" rotWithShape="0">
+                      <a:schemeClr val="dk1">
+                        <a:alpha val="40000"/>
+                      </a:schemeClr>
+                    </a:outerShdw>
+                  </a:effectLst>
+                </a:rPr>
+                <a:t>Pi CAMERA</a:t>
+              </a:r>
+              <a:endParaRPr lang="zh-CN" altLang="en-US" sz="2000" b="1" cap="none" spc="0">
+                <a:ln w="0"/>
+                <a:solidFill>
+                  <a:schemeClr val="tx1"/>
+                </a:solidFill>
+                <a:effectLst>
+                  <a:outerShdw blurRad="38100" dist="19050" dir="2700000" algn="tl" rotWithShape="0">
+                    <a:schemeClr val="dk1">
+                      <a:alpha val="40000"/>
+                    </a:schemeClr>
+                  </a:outerShdw>
+                </a:effectLst>
+              </a:endParaRPr>
+            </a:p>
+          </p:txBody>
+        </p:sp>
+        <p:sp>
+          <p:nvSpPr>
+            <p:cNvPr id="18" name="矩形 17">
+              <a:extLst>
+                <a:ext uri="{FF2B5EF4-FFF2-40B4-BE49-F238E27FC236}">
+                  <a16:creationId xmlns:a16="http://schemas.microsoft.com/office/drawing/2014/main" id="{B9D373F3-5F42-43D1-807D-185382C56830}"/>
+                </a:ext>
+              </a:extLst>
+            </p:cNvPr>
+            <p:cNvSpPr/>
+            <p:nvPr/>
+          </p:nvSpPr>
+          <p:spPr>
+            <a:xfrm>
+              <a:off x="2494779" y="4505447"/>
+              <a:ext cx="724878" cy="400110"/>
+            </a:xfrm>
+            <a:prstGeom prst="rect">
+              <a:avLst/>
+            </a:prstGeom>
+            <a:noFill/>
+          </p:spPr>
+          <p:txBody>
+            <a:bodyPr wrap="none" lIns="91440" tIns="45720" rIns="91440" bIns="45720">
+              <a:spAutoFit/>
+            </a:bodyPr>
+            <a:lstStyle/>
+            <a:p>
+              <a:pPr algn="ctr"/>
+              <a:r>
+                <a:rPr lang="en-US" altLang="zh-CN" sz="2000" b="1">
+                  <a:ln w="0"/>
+                  <a:effectLst>
+                    <a:outerShdw blurRad="38100" dist="19050" dir="2700000" algn="tl" rotWithShape="0">
+                      <a:schemeClr val="dk1">
+                        <a:alpha val="40000"/>
+                      </a:schemeClr>
+                    </a:outerShdw>
+                  </a:effectLst>
+                </a:rPr>
+                <a:t>0~5V</a:t>
+              </a:r>
+              <a:endParaRPr lang="zh-CN" altLang="en-US" sz="2000" b="1" cap="none" spc="0">
+                <a:ln w="0"/>
+                <a:solidFill>
+                  <a:schemeClr val="tx1"/>
+                </a:solidFill>
+                <a:effectLst>
+                  <a:outerShdw blurRad="38100" dist="19050" dir="2700000" algn="tl" rotWithShape="0">
+                    <a:schemeClr val="dk1">
+                      <a:alpha val="40000"/>
+                    </a:schemeClr>
+                  </a:outerShdw>
+                </a:effectLst>
+              </a:endParaRPr>
+            </a:p>
+          </p:txBody>
+        </p:sp>
+        <p:sp>
+          <p:nvSpPr>
+            <p:cNvPr id="19" name="矩形 18">
+              <a:extLst>
+                <a:ext uri="{FF2B5EF4-FFF2-40B4-BE49-F238E27FC236}">
+                  <a16:creationId xmlns:a16="http://schemas.microsoft.com/office/drawing/2014/main" id="{3AEA50C5-22D2-46A6-B2EB-E4D13F1E85C6}"/>
+                </a:ext>
+              </a:extLst>
+            </p:cNvPr>
+            <p:cNvSpPr/>
+            <p:nvPr/>
+          </p:nvSpPr>
+          <p:spPr>
+            <a:xfrm>
+              <a:off x="5239867" y="4505447"/>
+              <a:ext cx="519694" cy="400110"/>
+            </a:xfrm>
+            <a:prstGeom prst="rect">
+              <a:avLst/>
+            </a:prstGeom>
+            <a:noFill/>
+          </p:spPr>
+          <p:txBody>
+            <a:bodyPr wrap="none" lIns="91440" tIns="45720" rIns="91440" bIns="45720">
+              <a:spAutoFit/>
+            </a:bodyPr>
+            <a:lstStyle/>
+            <a:p>
+              <a:pPr algn="ctr"/>
+              <a:r>
+                <a:rPr lang="en-US" altLang="zh-CN" sz="2000" b="1">
+                  <a:ln w="0"/>
+                  <a:effectLst>
+                    <a:outerShdw blurRad="38100" dist="19050" dir="2700000" algn="tl" rotWithShape="0">
+                      <a:schemeClr val="dk1">
+                        <a:alpha val="40000"/>
+                      </a:schemeClr>
+                    </a:outerShdw>
+                  </a:effectLst>
+                </a:rPr>
+                <a:t>I2C</a:t>
+              </a:r>
+              <a:endParaRPr lang="zh-CN" altLang="en-US" sz="2000" b="1" cap="none" spc="0">
+                <a:ln w="0"/>
+                <a:solidFill>
+                  <a:schemeClr val="tx1"/>
+                </a:solidFill>
+                <a:effectLst>
+                  <a:outerShdw blurRad="38100" dist="19050" dir="2700000" algn="tl" rotWithShape="0">
+                    <a:schemeClr val="dk1">
+                      <a:alpha val="40000"/>
+                    </a:schemeClr>
+                  </a:outerShdw>
+                </a:effectLst>
+              </a:endParaRPr>
+            </a:p>
+          </p:txBody>
+        </p:sp>
+        <p:sp>
+          <p:nvSpPr>
+            <p:cNvPr id="20" name="矩形 19">
+              <a:extLst>
+                <a:ext uri="{FF2B5EF4-FFF2-40B4-BE49-F238E27FC236}">
+                  <a16:creationId xmlns:a16="http://schemas.microsoft.com/office/drawing/2014/main" id="{AF66C349-98B1-429D-9BFA-51E4DDAE4BC8}"/>
+                </a:ext>
+              </a:extLst>
+            </p:cNvPr>
+            <p:cNvSpPr/>
+            <p:nvPr/>
+          </p:nvSpPr>
+          <p:spPr>
+            <a:xfrm>
+              <a:off x="8563380" y="4070597"/>
+              <a:ext cx="1270348" cy="400110"/>
+            </a:xfrm>
+            <a:prstGeom prst="rect">
+              <a:avLst/>
+            </a:prstGeom>
+            <a:noFill/>
+          </p:spPr>
+          <p:txBody>
+            <a:bodyPr wrap="none" lIns="91440" tIns="45720" rIns="91440" bIns="45720">
+              <a:spAutoFit/>
+            </a:bodyPr>
+            <a:lstStyle/>
+            <a:p>
+              <a:pPr algn="ctr"/>
+              <a:r>
+                <a:rPr lang="en-US" altLang="zh-CN" sz="2000" b="1">
+                  <a:ln w="0"/>
+                  <a:effectLst>
+                    <a:outerShdw blurRad="38100" dist="19050" dir="2700000" algn="tl" rotWithShape="0">
+                      <a:schemeClr val="dk1">
+                        <a:alpha val="40000"/>
+                      </a:schemeClr>
+                    </a:outerShdw>
+                  </a:effectLst>
+                </a:rPr>
+                <a:t>AUX/</a:t>
+              </a:r>
+              <a:r>
+                <a:rPr lang="zh-CN" altLang="en-US" sz="2000" b="1">
+                  <a:ln w="0"/>
+                  <a:effectLst>
+                    <a:outerShdw blurRad="38100" dist="19050" dir="2700000" algn="tl" rotWithShape="0">
+                      <a:schemeClr val="dk1">
+                        <a:alpha val="40000"/>
+                      </a:schemeClr>
+                    </a:outerShdw>
+                  </a:effectLst>
+                </a:rPr>
+                <a:t>蓝牙</a:t>
+              </a:r>
+              <a:endParaRPr lang="zh-CN" altLang="en-US" sz="2000" b="1" cap="none" spc="0">
+                <a:ln w="0"/>
+                <a:solidFill>
+                  <a:schemeClr val="tx1"/>
+                </a:solidFill>
+                <a:effectLst>
+                  <a:outerShdw blurRad="38100" dist="19050" dir="2700000" algn="tl" rotWithShape="0">
+                    <a:schemeClr val="dk1">
+                      <a:alpha val="40000"/>
+                    </a:schemeClr>
+                  </a:outerShdw>
+                </a:effectLst>
+              </a:endParaRPr>
+            </a:p>
+          </p:txBody>
+        </p:sp>
+        <p:sp>
+          <p:nvSpPr>
+            <p:cNvPr id="21" name="矩形 20">
+              <a:extLst>
+                <a:ext uri="{FF2B5EF4-FFF2-40B4-BE49-F238E27FC236}">
+                  <a16:creationId xmlns:a16="http://schemas.microsoft.com/office/drawing/2014/main" id="{CC86DBCC-FEE8-4412-BC4D-16F7D890CBBB}"/>
+                </a:ext>
+              </a:extLst>
+            </p:cNvPr>
+            <p:cNvSpPr/>
+            <p:nvPr/>
+          </p:nvSpPr>
+          <p:spPr>
+            <a:xfrm>
+              <a:off x="7221065" y="6023920"/>
+              <a:ext cx="1001137" cy="663207"/>
+            </a:xfrm>
+            <a:prstGeom prst="rect">
+              <a:avLst/>
+            </a:prstGeom>
+          </p:spPr>
+          <p:style>
+            <a:lnRef idx="2">
+              <a:schemeClr val="accent6">
+                <a:shade val="50000"/>
+              </a:schemeClr>
+            </a:lnRef>
+            <a:fillRef idx="1">
+              <a:schemeClr val="accent6"/>
+            </a:fillRef>
+            <a:effectRef idx="0">
+              <a:schemeClr val="accent6"/>
+            </a:effectRef>
+            <a:fontRef idx="minor">
+              <a:schemeClr val="lt1"/>
+            </a:fontRef>
+          </p:style>
+          <p:txBody>
+            <a:bodyPr rtlCol="0" anchor="ctr"/>
+            <a:lstStyle/>
+            <a:p>
+              <a:pPr algn="ctr"/>
+              <a:r>
+                <a:rPr lang="zh-CN" altLang="en-US"/>
+                <a:t>电池</a:t>
+              </a:r>
+            </a:p>
+          </p:txBody>
+        </p:sp>
+        <p:sp>
+          <p:nvSpPr>
+            <p:cNvPr id="22" name="箭头: 上 21">
+              <a:extLst>
+                <a:ext uri="{FF2B5EF4-FFF2-40B4-BE49-F238E27FC236}">
+                  <a16:creationId xmlns:a16="http://schemas.microsoft.com/office/drawing/2014/main" id="{ACD62DBE-5DDD-40AD-81EA-236238E387E8}"/>
+                </a:ext>
+              </a:extLst>
+            </p:cNvPr>
+            <p:cNvSpPr/>
+            <p:nvPr/>
+          </p:nvSpPr>
+          <p:spPr>
+            <a:xfrm>
+              <a:off x="7638265" y="5450888"/>
+              <a:ext cx="218473" cy="573031"/>
+            </a:xfrm>
+            <a:prstGeom prst="upArrow">
+              <a:avLst/>
+            </a:prstGeom>
+          </p:spPr>
+          <p:style>
+            <a:lnRef idx="2">
+              <a:schemeClr val="accent6">
+                <a:shade val="50000"/>
+              </a:schemeClr>
+            </a:lnRef>
+            <a:fillRef idx="1">
+              <a:schemeClr val="accent6"/>
+            </a:fillRef>
+            <a:effectRef idx="0">
+              <a:schemeClr val="accent6"/>
+            </a:effectRef>
+            <a:fontRef idx="minor">
+              <a:schemeClr val="lt1"/>
+            </a:fontRef>
+          </p:style>
+          <p:txBody>
+            <a:bodyPr rtlCol="0" anchor="ctr"/>
+            <a:lstStyle/>
+            <a:p>
+              <a:pPr algn="ctr"/>
+              <a:endParaRPr lang="zh-CN" altLang="en-US"/>
+            </a:p>
+          </p:txBody>
+        </p:sp>
+        <p:sp>
+          <p:nvSpPr>
+            <p:cNvPr id="23" name="矩形 22">
+              <a:extLst>
+                <a:ext uri="{FF2B5EF4-FFF2-40B4-BE49-F238E27FC236}">
+                  <a16:creationId xmlns:a16="http://schemas.microsoft.com/office/drawing/2014/main" id="{02396663-DDCC-40AA-A7AD-35D8EB9AAD09}"/>
+                </a:ext>
+              </a:extLst>
+            </p:cNvPr>
+            <p:cNvSpPr/>
+            <p:nvPr/>
+          </p:nvSpPr>
+          <p:spPr>
+            <a:xfrm>
+              <a:off x="843723" y="5902013"/>
+              <a:ext cx="1853395" cy="663207"/>
+            </a:xfrm>
+            <a:prstGeom prst="rect">
+              <a:avLst/>
+            </a:prstGeom>
+          </p:spPr>
+          <p:style>
+            <a:lnRef idx="2">
+              <a:schemeClr val="accent6">
+                <a:shade val="50000"/>
+              </a:schemeClr>
+            </a:lnRef>
+            <a:fillRef idx="1">
+              <a:schemeClr val="accent6"/>
+            </a:fillRef>
+            <a:effectRef idx="0">
+              <a:schemeClr val="accent6"/>
+            </a:effectRef>
+            <a:fontRef idx="minor">
+              <a:schemeClr val="lt1"/>
+            </a:fontRef>
+          </p:style>
+          <p:txBody>
+            <a:bodyPr rtlCol="0" anchor="ctr"/>
+            <a:lstStyle/>
+            <a:p>
+              <a:pPr algn="ctr"/>
+              <a:r>
+                <a:rPr lang="zh-CN" altLang="en-US"/>
+                <a:t>电源转换模块</a:t>
+              </a:r>
+            </a:p>
+          </p:txBody>
+        </p:sp>
+        <p:sp>
+          <p:nvSpPr>
+            <p:cNvPr id="24" name="箭头: 直角上 23">
+              <a:extLst>
+                <a:ext uri="{FF2B5EF4-FFF2-40B4-BE49-F238E27FC236}">
+                  <a16:creationId xmlns:a16="http://schemas.microsoft.com/office/drawing/2014/main" id="{94C577FF-C677-40D2-8E3F-F8519C8D2B98}"/>
+                </a:ext>
+              </a:extLst>
+            </p:cNvPr>
+            <p:cNvSpPr/>
+            <p:nvPr/>
+          </p:nvSpPr>
+          <p:spPr>
+            <a:xfrm rot="16200000" flipH="1">
+              <a:off x="4485101" y="3811389"/>
+              <a:ext cx="874794" cy="4242553"/>
+            </a:xfrm>
+            <a:prstGeom prst="bentUpArrow">
+              <a:avLst>
+                <a:gd name="adj1" fmla="val 11769"/>
+                <a:gd name="adj2" fmla="val 14313"/>
+                <a:gd name="adj3" fmla="val 17876"/>
+              </a:avLst>
+            </a:prstGeom>
+          </p:spPr>
+          <p:style>
+            <a:lnRef idx="2">
+              <a:schemeClr val="accent6">
+                <a:shade val="50000"/>
+              </a:schemeClr>
+            </a:lnRef>
+            <a:fillRef idx="1">
+              <a:schemeClr val="accent6"/>
+            </a:fillRef>
+            <a:effectRef idx="0">
+              <a:schemeClr val="accent6"/>
+            </a:effectRef>
+            <a:fontRef idx="minor">
+              <a:schemeClr val="lt1"/>
+            </a:fontRef>
+          </p:style>
+          <p:txBody>
+            <a:bodyPr rtlCol="0" anchor="ctr"/>
+            <a:lstStyle/>
+            <a:p>
+              <a:pPr algn="ctr"/>
+              <a:endParaRPr lang="zh-CN" altLang="en-US"/>
+            </a:p>
+          </p:txBody>
+        </p:sp>
+        <p:sp>
+          <p:nvSpPr>
+            <p:cNvPr id="25" name="箭头: 右 24">
+              <a:extLst>
+                <a:ext uri="{FF2B5EF4-FFF2-40B4-BE49-F238E27FC236}">
+                  <a16:creationId xmlns:a16="http://schemas.microsoft.com/office/drawing/2014/main" id="{A277191D-4C43-4F4C-AEF1-1176AF9764FC}"/>
+                </a:ext>
+              </a:extLst>
+            </p:cNvPr>
+            <p:cNvSpPr/>
+            <p:nvPr/>
+          </p:nvSpPr>
+          <p:spPr>
+            <a:xfrm rot="16200000">
+              <a:off x="1464374" y="5490625"/>
+              <a:ext cx="547684" cy="275090"/>
+            </a:xfrm>
+            <a:prstGeom prst="rightArrow">
+              <a:avLst/>
+            </a:prstGeom>
+          </p:spPr>
+          <p:style>
+            <a:lnRef idx="2">
+              <a:schemeClr val="accent6">
+                <a:shade val="50000"/>
+              </a:schemeClr>
+            </a:lnRef>
+            <a:fillRef idx="1">
+              <a:schemeClr val="accent6"/>
+            </a:fillRef>
+            <a:effectRef idx="0">
+              <a:schemeClr val="accent6"/>
+            </a:effectRef>
+            <a:fontRef idx="minor">
+              <a:schemeClr val="lt1"/>
+            </a:fontRef>
+          </p:style>
+          <p:txBody>
+            <a:bodyPr rtlCol="0" anchor="ctr"/>
+            <a:lstStyle/>
+            <a:p>
+              <a:pPr algn="ctr"/>
+              <a:endParaRPr lang="zh-CN" altLang="en-US"/>
+            </a:p>
+          </p:txBody>
+        </p:sp>
+        <p:sp>
+          <p:nvSpPr>
+            <p:cNvPr id="26" name="箭头: 左 25">
+              <a:extLst>
+                <a:ext uri="{FF2B5EF4-FFF2-40B4-BE49-F238E27FC236}">
+                  <a16:creationId xmlns:a16="http://schemas.microsoft.com/office/drawing/2014/main" id="{FECD4524-C9CF-4C72-B1CA-2E1E6B41CAEF}"/>
+                </a:ext>
+              </a:extLst>
+            </p:cNvPr>
+            <p:cNvSpPr/>
+            <p:nvPr/>
+          </p:nvSpPr>
+          <p:spPr>
+            <a:xfrm>
+              <a:off x="4836442" y="5149742"/>
+              <a:ext cx="1389890" cy="236311"/>
+            </a:xfrm>
+            <a:prstGeom prst="leftArrow">
+              <a:avLst/>
+            </a:prstGeom>
+          </p:spPr>
+          <p:style>
+            <a:lnRef idx="2">
+              <a:schemeClr val="accent6">
+                <a:shade val="50000"/>
+              </a:schemeClr>
+            </a:lnRef>
+            <a:fillRef idx="1">
+              <a:schemeClr val="accent6"/>
+            </a:fillRef>
+            <a:effectRef idx="0">
+              <a:schemeClr val="accent6"/>
+            </a:effectRef>
+            <a:fontRef idx="minor">
+              <a:schemeClr val="lt1"/>
+            </a:fontRef>
+          </p:style>
+          <p:txBody>
+            <a:bodyPr rtlCol="0" anchor="ctr"/>
+            <a:lstStyle/>
+            <a:p>
+              <a:pPr algn="ctr"/>
+              <a:endParaRPr lang="zh-CN" altLang="en-US"/>
+            </a:p>
+          </p:txBody>
+        </p:sp>
+        <p:sp>
+          <p:nvSpPr>
+            <p:cNvPr id="27" name="矩形 26">
+              <a:extLst>
+                <a:ext uri="{FF2B5EF4-FFF2-40B4-BE49-F238E27FC236}">
+                  <a16:creationId xmlns:a16="http://schemas.microsoft.com/office/drawing/2014/main" id="{F99DEF60-DA37-434C-970A-797286C9C6E5}"/>
+                </a:ext>
+              </a:extLst>
+            </p:cNvPr>
+            <p:cNvSpPr/>
+            <p:nvPr/>
+          </p:nvSpPr>
+          <p:spPr>
+            <a:xfrm>
+              <a:off x="1134860" y="3808987"/>
+              <a:ext cx="1223412" cy="523220"/>
+            </a:xfrm>
+            <a:prstGeom prst="rect">
+              <a:avLst/>
+            </a:prstGeom>
+            <a:noFill/>
+          </p:spPr>
+          <p:txBody>
+            <a:bodyPr wrap="none" lIns="91440" tIns="45720" rIns="91440" bIns="45720">
+              <a:spAutoFit/>
+            </a:bodyPr>
+            <a:lstStyle/>
+            <a:p>
+              <a:pPr algn="ctr"/>
+              <a:r>
+                <a:rPr lang="en-US" altLang="zh-CN" sz="2800" b="1">
+                  <a:ln w="9525">
+                    <a:solidFill>
+                      <a:schemeClr val="bg1"/>
+                    </a:solidFill>
+                    <a:prstDash val="solid"/>
+                  </a:ln>
+                  <a:solidFill>
+                    <a:schemeClr val="accent5"/>
+                  </a:solidFill>
+                  <a:effectLst>
+                    <a:outerShdw blurRad="12700" dist="38100" dir="2700000" algn="tl" rotWithShape="0">
+                      <a:schemeClr val="accent5">
+                        <a:lumMod val="60000"/>
+                        <a:lumOff val="40000"/>
+                      </a:schemeClr>
+                    </a:outerShdw>
+                  </a:effectLst>
+                </a:rPr>
+                <a:t>Analog</a:t>
+              </a:r>
+              <a:endParaRPr lang="zh-CN" altLang="en-US" sz="2800" b="1">
+                <a:ln w="9525">
+                  <a:solidFill>
+                    <a:schemeClr val="bg1"/>
+                  </a:solidFill>
+                  <a:prstDash val="solid"/>
+                </a:ln>
+                <a:solidFill>
+                  <a:schemeClr val="accent5"/>
+                </a:solidFill>
+                <a:effectLst>
+                  <a:outerShdw blurRad="12700" dist="38100" dir="2700000" algn="tl" rotWithShape="0">
+                    <a:schemeClr val="accent5">
+                      <a:lumMod val="60000"/>
+                      <a:lumOff val="40000"/>
+                    </a:schemeClr>
+                  </a:outerShdw>
+                </a:effectLst>
+              </a:endParaRPr>
+            </a:p>
+          </p:txBody>
+        </p:sp>
+        <p:sp>
+          <p:nvSpPr>
+            <p:cNvPr id="28" name="矩形 27">
+              <a:extLst>
+                <a:ext uri="{FF2B5EF4-FFF2-40B4-BE49-F238E27FC236}">
+                  <a16:creationId xmlns:a16="http://schemas.microsoft.com/office/drawing/2014/main" id="{EA547F1D-F140-46BB-9B29-30DD47476F89}"/>
+                </a:ext>
+              </a:extLst>
+            </p:cNvPr>
+            <p:cNvSpPr/>
+            <p:nvPr/>
+          </p:nvSpPr>
+          <p:spPr>
+            <a:xfrm>
+              <a:off x="1224088" y="4385599"/>
+              <a:ext cx="984947" cy="968728"/>
+            </a:xfrm>
+            <a:prstGeom prst="rect">
+              <a:avLst/>
+            </a:prstGeom>
+            <a:noFill/>
+            <a:ln w="57150" cap="flat" cmpd="sng" algn="ctr">
+              <a:solidFill>
+                <a:schemeClr val="accent1"/>
+              </a:solidFill>
+              <a:prstDash val="sysDot"/>
+              <a:round/>
+              <a:headEnd type="none" w="med" len="med"/>
+              <a:tailEnd type="none" w="med" len="med"/>
+            </a:ln>
+          </p:spPr>
+          <p:style>
+            <a:lnRef idx="0">
+              <a:scrgbClr r="0" g="0" b="0"/>
+            </a:lnRef>
+            <a:fillRef idx="0">
+              <a:scrgbClr r="0" g="0" b="0"/>
+            </a:fillRef>
+            <a:effectRef idx="0">
+              <a:scrgbClr r="0" g="0" b="0"/>
+            </a:effectRef>
+            <a:fontRef idx="minor">
+              <a:schemeClr val="accent1"/>
+            </a:fontRef>
+          </p:style>
+          <p:txBody>
+            <a:bodyPr rtlCol="0" anchor="ctr"/>
+            <a:lstStyle/>
+            <a:p>
+              <a:pPr algn="ctr"/>
+              <a:endParaRPr lang="zh-CN" altLang="en-US"/>
+            </a:p>
+          </p:txBody>
+        </p:sp>
+        <p:sp>
+          <p:nvSpPr>
+            <p:cNvPr id="29" name="矩形 28">
+              <a:extLst>
+                <a:ext uri="{FF2B5EF4-FFF2-40B4-BE49-F238E27FC236}">
+                  <a16:creationId xmlns:a16="http://schemas.microsoft.com/office/drawing/2014/main" id="{BAD8CA0D-076C-4831-A85E-7958DA17A98B}"/>
+                </a:ext>
+              </a:extLst>
+            </p:cNvPr>
+            <p:cNvSpPr/>
+            <p:nvPr/>
+          </p:nvSpPr>
+          <p:spPr>
+            <a:xfrm>
+              <a:off x="8799449" y="5625709"/>
+              <a:ext cx="752617" cy="133165"/>
+            </a:xfrm>
+            <a:prstGeom prst="rect">
+              <a:avLst/>
+            </a:prstGeom>
+          </p:spPr>
+          <p:style>
+            <a:lnRef idx="2">
+              <a:schemeClr val="accent1">
+                <a:shade val="50000"/>
+              </a:schemeClr>
+            </a:lnRef>
+            <a:fillRef idx="1">
+              <a:schemeClr val="accent1"/>
+            </a:fillRef>
+            <a:effectRef idx="0">
+              <a:schemeClr val="accent1"/>
+            </a:effectRef>
+            <a:fontRef idx="minor">
+              <a:schemeClr val="lt1"/>
+            </a:fontRef>
+          </p:style>
+          <p:txBody>
+            <a:bodyPr rtlCol="0" anchor="ctr"/>
+            <a:lstStyle/>
+            <a:p>
+              <a:pPr algn="ctr"/>
+              <a:endParaRPr lang="zh-CN" altLang="en-US"/>
+            </a:p>
+          </p:txBody>
+        </p:sp>
+        <p:sp>
+          <p:nvSpPr>
+            <p:cNvPr id="30" name="矩形 29">
+              <a:extLst>
+                <a:ext uri="{FF2B5EF4-FFF2-40B4-BE49-F238E27FC236}">
+                  <a16:creationId xmlns:a16="http://schemas.microsoft.com/office/drawing/2014/main" id="{4996D1AF-BE97-4190-94DF-8BE4E1C0F012}"/>
+                </a:ext>
+              </a:extLst>
+            </p:cNvPr>
+            <p:cNvSpPr/>
+            <p:nvPr/>
+          </p:nvSpPr>
+          <p:spPr>
+            <a:xfrm>
+              <a:off x="8797541" y="6122389"/>
+              <a:ext cx="752617" cy="133165"/>
+            </a:xfrm>
+            <a:prstGeom prst="rect">
+              <a:avLst/>
+            </a:prstGeom>
+          </p:spPr>
+          <p:style>
+            <a:lnRef idx="2">
+              <a:schemeClr val="accent6">
+                <a:shade val="50000"/>
+              </a:schemeClr>
+            </a:lnRef>
+            <a:fillRef idx="1">
+              <a:schemeClr val="accent6"/>
+            </a:fillRef>
+            <a:effectRef idx="0">
+              <a:schemeClr val="accent6"/>
+            </a:effectRef>
+            <a:fontRef idx="minor">
+              <a:schemeClr val="lt1"/>
+            </a:fontRef>
+          </p:style>
+          <p:txBody>
+            <a:bodyPr rtlCol="0" anchor="ctr"/>
+            <a:lstStyle/>
+            <a:p>
+              <a:pPr algn="ctr"/>
+              <a:endParaRPr lang="zh-CN" altLang="en-US"/>
+            </a:p>
+          </p:txBody>
+        </p:sp>
+        <p:sp>
+          <p:nvSpPr>
+            <p:cNvPr id="31" name="矩形 30">
+              <a:extLst>
+                <a:ext uri="{FF2B5EF4-FFF2-40B4-BE49-F238E27FC236}">
+                  <a16:creationId xmlns:a16="http://schemas.microsoft.com/office/drawing/2014/main" id="{32FB7A63-3562-4DB0-A1C7-2CF6F611D54D}"/>
+                </a:ext>
+              </a:extLst>
+            </p:cNvPr>
+            <p:cNvSpPr/>
+            <p:nvPr/>
+          </p:nvSpPr>
+          <p:spPr>
+            <a:xfrm>
+              <a:off x="9304143" y="6019695"/>
+              <a:ext cx="1278325" cy="338554"/>
+            </a:xfrm>
+            <a:prstGeom prst="rect">
+              <a:avLst/>
+            </a:prstGeom>
+            <a:noFill/>
+          </p:spPr>
+          <p:txBody>
+            <a:bodyPr wrap="square" lIns="91440" tIns="45720" rIns="91440" bIns="45720">
+              <a:spAutoFit/>
+            </a:bodyPr>
+            <a:lstStyle/>
+            <a:p>
+              <a:pPr algn="ctr"/>
+              <a:r>
+                <a:rPr lang="zh-CN" altLang="en-US" sz="1600" b="1" cap="none" spc="0">
+                  <a:ln w="0"/>
+                  <a:solidFill>
+                    <a:schemeClr val="tx1"/>
+                  </a:solidFill>
+                  <a:effectLst>
+                    <a:outerShdw blurRad="38100" dist="19050" dir="2700000" algn="tl" rotWithShape="0">
+                      <a:schemeClr val="dk1">
+                        <a:alpha val="40000"/>
+                      </a:schemeClr>
+                    </a:outerShdw>
+                  </a:effectLst>
+                </a:rPr>
+                <a:t>供电</a:t>
+              </a:r>
+            </a:p>
+          </p:txBody>
+        </p:sp>
+        <p:sp>
+          <p:nvSpPr>
+            <p:cNvPr id="32" name="矩形 31">
+              <a:extLst>
+                <a:ext uri="{FF2B5EF4-FFF2-40B4-BE49-F238E27FC236}">
+                  <a16:creationId xmlns:a16="http://schemas.microsoft.com/office/drawing/2014/main" id="{759022FF-4602-4DAA-AAC1-2EC740683629}"/>
+                </a:ext>
+              </a:extLst>
+            </p:cNvPr>
+            <p:cNvSpPr/>
+            <p:nvPr/>
+          </p:nvSpPr>
+          <p:spPr>
+            <a:xfrm>
+              <a:off x="9293317" y="5545904"/>
+              <a:ext cx="1278325" cy="338554"/>
+            </a:xfrm>
+            <a:prstGeom prst="rect">
+              <a:avLst/>
+            </a:prstGeom>
+            <a:noFill/>
+          </p:spPr>
+          <p:txBody>
+            <a:bodyPr wrap="square" lIns="91440" tIns="45720" rIns="91440" bIns="45720">
+              <a:spAutoFit/>
+            </a:bodyPr>
+            <a:lstStyle/>
+            <a:p>
+              <a:pPr algn="ctr"/>
+              <a:r>
+                <a:rPr lang="zh-CN" altLang="en-US" sz="1600" b="1" cap="none" spc="0">
+                  <a:ln w="0"/>
+                  <a:solidFill>
+                    <a:schemeClr val="tx1"/>
+                  </a:solidFill>
+                  <a:effectLst>
+                    <a:outerShdw blurRad="38100" dist="19050" dir="2700000" algn="tl" rotWithShape="0">
+                      <a:schemeClr val="dk1">
+                        <a:alpha val="40000"/>
+                      </a:schemeClr>
+                    </a:outerShdw>
+                  </a:effectLst>
+                </a:rPr>
+                <a:t>信号</a:t>
+              </a:r>
+            </a:p>
+          </p:txBody>
+        </p:sp>
+        <p:sp>
+          <p:nvSpPr>
+            <p:cNvPr id="33" name="矩形 32">
+              <a:extLst>
+                <a:ext uri="{FF2B5EF4-FFF2-40B4-BE49-F238E27FC236}">
+                  <a16:creationId xmlns:a16="http://schemas.microsoft.com/office/drawing/2014/main" id="{56533DD8-FA61-43D2-8B4E-4C7F7701B387}"/>
+                </a:ext>
+              </a:extLst>
+            </p:cNvPr>
+            <p:cNvSpPr/>
+            <p:nvPr/>
+          </p:nvSpPr>
+          <p:spPr>
+            <a:xfrm>
+              <a:off x="695115" y="3267899"/>
+              <a:ext cx="10653162" cy="3589427"/>
+            </a:xfrm>
+            <a:prstGeom prst="rect">
+              <a:avLst/>
+            </a:prstGeom>
+            <a:noFill/>
+            <a:ln w="57150" cap="flat" cmpd="sng" algn="ctr">
+              <a:solidFill>
+                <a:schemeClr val="accent1"/>
+              </a:solidFill>
+              <a:prstDash val="dash"/>
+              <a:round/>
+              <a:headEnd type="none" w="med" len="med"/>
+              <a:tailEnd type="none" w="med" len="med"/>
+            </a:ln>
+          </p:spPr>
+          <p:style>
+            <a:lnRef idx="0">
+              <a:scrgbClr r="0" g="0" b="0"/>
+            </a:lnRef>
+            <a:fillRef idx="0">
+              <a:scrgbClr r="0" g="0" b="0"/>
+            </a:fillRef>
+            <a:effectRef idx="0">
+              <a:scrgbClr r="0" g="0" b="0"/>
+            </a:effectRef>
+            <a:fontRef idx="minor">
+              <a:schemeClr val="accent1"/>
+            </a:fontRef>
+          </p:style>
+          <p:txBody>
+            <a:bodyPr rtlCol="0" anchor="ctr"/>
+            <a:lstStyle/>
+            <a:p>
+              <a:pPr algn="ctr"/>
+              <a:endParaRPr lang="zh-CN" altLang="en-US"/>
+            </a:p>
+          </p:txBody>
+        </p:sp>
+      </p:grpSp>
     </p:spTree>
     <p:extLst>
       <p:ext uri="{BB962C8B-B14F-4D97-AF65-F5344CB8AC3E}">
-        <p14:creationId xmlns:p14="http://schemas.microsoft.com/office/powerpoint/2010/main" val="914006586"/>
+        <p14:creationId xmlns:p14="http://schemas.microsoft.com/office/powerpoint/2010/main" val="43125142"/>
       </p:ext>
     </p:extLst>
   </p:cSld>
@@ -6299,7 +9017,7 @@
             <a:solidFill>
               <a:schemeClr val="accent5"/>
             </a:solidFill>
-            <a:prstDash val="solid"/>
+            <a:prstDash val="dash"/>
             <a:round/>
             <a:headEnd type="none" w="med" len="med"/>
             <a:tailEnd type="none" w="med" len="med"/>
@@ -6562,7 +9280,7 @@
           <p:cNvPr id="2" name="标题 1">
             <a:extLst>
               <a:ext uri="{FF2B5EF4-FFF2-40B4-BE49-F238E27FC236}">
-                <a16:creationId xmlns:a16="http://schemas.microsoft.com/office/drawing/2014/main" id="{1BDF98F6-A699-48E8-97C8-C6FE38DEBFA5}"/>
+                <a16:creationId xmlns:a16="http://schemas.microsoft.com/office/drawing/2014/main" id="{33F77340-5760-4A10-8D26-27385B15F659}"/>
               </a:ext>
             </a:extLst>
           </p:cNvPr>
@@ -6580,28 +9298,160 @@
           <a:p>
             <a:r>
               <a:rPr lang="zh-CN" altLang="en-US"/>
-              <a:t>提示图书位置移动 方案一</a:t>
-            </a:r>
+              <a:t>图像预处理</a:t>
+            </a:r>
+          </a:p>
+        </p:txBody>
+      </p:sp>
+      <p:sp>
+        <p:nvSpPr>
+          <p:cNvPr id="3" name="内容占位符 2">
+            <a:extLst>
+              <a:ext uri="{FF2B5EF4-FFF2-40B4-BE49-F238E27FC236}">
+                <a16:creationId xmlns:a16="http://schemas.microsoft.com/office/drawing/2014/main" id="{C896692B-FCF4-4485-9643-AEC10FED93E4}"/>
+              </a:ext>
+            </a:extLst>
+          </p:cNvPr>
+          <p:cNvSpPr>
+            <a:spLocks noGrp="1"/>
+          </p:cNvSpPr>
+          <p:nvPr>
+            <p:ph idx="1"/>
+          </p:nvPr>
+        </p:nvSpPr>
+        <p:spPr/>
+        <p:txBody>
+          <a:bodyPr>
+            <a:normAutofit fontScale="92500" lnSpcReduction="20000"/>
+          </a:bodyPr>
+          <a:lstStyle/>
+          <a:p>
+            <a:r>
+              <a:rPr lang="zh-CN" altLang="en-US"/>
+              <a:t>透视校正</a:t>
+            </a:r>
+            <a:endParaRPr lang="en-US" altLang="zh-CN"/>
+          </a:p>
+          <a:p>
+            <a:pPr lvl="1"/>
+            <a:r>
+              <a:rPr lang="zh-CN" altLang="en-US"/>
+              <a:t>方法</a:t>
+            </a:r>
+            <a:endParaRPr lang="en-US" altLang="zh-CN"/>
+          </a:p>
+          <a:p>
+            <a:pPr lvl="2"/>
+            <a:r>
+              <a:rPr lang="zh-CN" altLang="en-US"/>
+              <a:t>使用霍夫线检测的方法，计算检测出的直线平均角度</a:t>
+            </a:r>
+            <a:endParaRPr lang="en-US" altLang="zh-CN"/>
+          </a:p>
+          <a:p>
+            <a:pPr lvl="1"/>
+            <a:r>
+              <a:rPr lang="zh-CN" altLang="en-US"/>
+              <a:t>问题</a:t>
+            </a:r>
+            <a:endParaRPr lang="en-US" altLang="zh-CN"/>
+          </a:p>
+          <a:p>
+            <a:pPr lvl="2"/>
+            <a:r>
+              <a:rPr lang="zh-CN" altLang="en-US"/>
+              <a:t>效果有限</a:t>
+            </a:r>
+            <a:endParaRPr lang="en-US" altLang="zh-CN"/>
+          </a:p>
+          <a:p>
+            <a:pPr lvl="2"/>
+            <a:r>
+              <a:rPr lang="zh-CN" altLang="en-US"/>
+              <a:t>不能解决书籍完全拿反的问题</a:t>
+            </a:r>
+            <a:endParaRPr lang="en-US" altLang="zh-CN"/>
+          </a:p>
+          <a:p>
+            <a:r>
+              <a:rPr lang="zh-CN" altLang="en-US"/>
+              <a:t>清晰度的增强</a:t>
+            </a:r>
+            <a:endParaRPr lang="en-US" altLang="zh-CN"/>
+          </a:p>
+          <a:p>
+            <a:pPr lvl="1"/>
+            <a:r>
+              <a:rPr lang="zh-CN" altLang="en-US"/>
+              <a:t>方法</a:t>
+            </a:r>
+            <a:endParaRPr lang="en-US" altLang="zh-CN"/>
+          </a:p>
+          <a:p>
+            <a:pPr lvl="2"/>
+            <a:r>
+              <a:rPr lang="zh-CN" altLang="en-US"/>
+              <a:t>二值化</a:t>
+            </a:r>
+            <a:endParaRPr lang="en-US" altLang="zh-CN"/>
+          </a:p>
+          <a:p>
+            <a:pPr lvl="2"/>
+            <a:r>
+              <a:rPr lang="zh-CN" altLang="en-US"/>
+              <a:t>摄像头分辨率提高</a:t>
+            </a:r>
+            <a:endParaRPr lang="en-US" altLang="zh-CN"/>
+          </a:p>
+          <a:p>
+            <a:pPr lvl="1"/>
+            <a:r>
+              <a:rPr lang="zh-CN" altLang="en-US"/>
+              <a:t>注：</a:t>
+            </a:r>
+            <a:r>
+              <a:rPr lang="en-US" altLang="zh-CN"/>
+              <a:t>API</a:t>
+            </a:r>
+            <a:r>
+              <a:rPr lang="zh-CN" altLang="en-US"/>
+              <a:t>接口图片大小不能超过</a:t>
+            </a:r>
+            <a:r>
+              <a:rPr lang="en-US" altLang="zh-CN"/>
+              <a:t>4MB</a:t>
+            </a:r>
+            <a:r>
+              <a:rPr lang="zh-CN" altLang="en-US"/>
+              <a:t>（高清版不能超过</a:t>
+            </a:r>
+            <a:r>
+              <a:rPr lang="en-US" altLang="zh-CN"/>
+              <a:t>10MB</a:t>
+            </a:r>
+            <a:r>
+              <a:rPr lang="zh-CN" altLang="en-US"/>
+              <a:t>）</a:t>
+            </a:r>
+            <a:endParaRPr lang="en-US" altLang="zh-CN"/>
           </a:p>
         </p:txBody>
       </p:sp>
       <p:pic>
         <p:nvPicPr>
-          <p:cNvPr id="5" name="内容占位符 4">
+          <p:cNvPr id="5" name="图片 4">
             <a:extLst>
               <a:ext uri="{FF2B5EF4-FFF2-40B4-BE49-F238E27FC236}">
-                <a16:creationId xmlns:a16="http://schemas.microsoft.com/office/drawing/2014/main" id="{DA0FB7AF-9231-4779-95C8-328B8B57C813}"/>
+                <a16:creationId xmlns:a16="http://schemas.microsoft.com/office/drawing/2014/main" id="{E4F8A9EA-8574-45A6-82F3-84742CA77138}"/>
               </a:ext>
             </a:extLst>
           </p:cNvPr>
           <p:cNvPicPr>
-            <a:picLocks noGrp="1" noChangeAspect="1"/>
+            <a:picLocks noChangeAspect="1"/>
           </p:cNvPicPr>
-          <p:nvPr>
-            <p:ph idx="1"/>
-          </p:nvPr>
+          <p:nvPr/>
         </p:nvPicPr>
-        <p:blipFill>
+        <p:blipFill rotWithShape="1">
           <a:blip r:embed="rId2">
             <a:extLst>
               <a:ext uri="{28A0092B-C50C-407E-A947-70E740481C1C}">
@@ -6609,21 +9459,23 @@
               </a:ext>
             </a:extLst>
           </a:blip>
-          <a:stretch>
-            <a:fillRect/>
-          </a:stretch>
+          <a:srcRect r="21059" b="21530"/>
+          <a:stretch/>
         </p:blipFill>
         <p:spPr>
           <a:xfrm>
-            <a:off x="853198" y="1631127"/>
-            <a:ext cx="9935204" cy="4796306"/>
+            <a:off x="8191395" y="1467034"/>
+            <a:ext cx="3336141" cy="4540639"/>
           </a:xfrm>
+          <a:prstGeom prst="rect">
+            <a:avLst/>
+          </a:prstGeom>
         </p:spPr>
       </p:pic>
     </p:spTree>
     <p:extLst>
       <p:ext uri="{BB962C8B-B14F-4D97-AF65-F5344CB8AC3E}">
-        <p14:creationId xmlns:p14="http://schemas.microsoft.com/office/powerpoint/2010/main" val="4240375110"/>
+        <p14:creationId xmlns:p14="http://schemas.microsoft.com/office/powerpoint/2010/main" val="267944224"/>
       </p:ext>
     </p:extLst>
   </p:cSld>
@@ -6892,4 +9744,299 @@
     </a:ext>
   </a:extLst>
 </a:theme>
+</file>
+
+<file path=ppt/theme/theme2.xml><?xml version="1.0" encoding="utf-8"?>
+<a:theme xmlns:a="http://schemas.openxmlformats.org/drawingml/2006/main" name="Office 主题​​">
+  <a:themeElements>
+    <a:clrScheme name="Office">
+      <a:dk1>
+        <a:sysClr val="windowText" lastClr="000000"/>
+      </a:dk1>
+      <a:lt1>
+        <a:sysClr val="window" lastClr="FFFFFF"/>
+      </a:lt1>
+      <a:dk2>
+        <a:srgbClr val="44546A"/>
+      </a:dk2>
+      <a:lt2>
+        <a:srgbClr val="E7E6E6"/>
+      </a:lt2>
+      <a:accent1>
+        <a:srgbClr val="4472C4"/>
+      </a:accent1>
+      <a:accent2>
+        <a:srgbClr val="ED7D31"/>
+      </a:accent2>
+      <a:accent3>
+        <a:srgbClr val="A5A5A5"/>
+      </a:accent3>
+      <a:accent4>
+        <a:srgbClr val="FFC000"/>
+      </a:accent4>
+      <a:accent5>
+        <a:srgbClr val="5B9BD5"/>
+      </a:accent5>
+      <a:accent6>
+        <a:srgbClr val="70AD47"/>
+      </a:accent6>
+      <a:hlink>
+        <a:srgbClr val="0563C1"/>
+      </a:hlink>
+      <a:folHlink>
+        <a:srgbClr val="954F72"/>
+      </a:folHlink>
+    </a:clrScheme>
+    <a:fontScheme name="Office">
+      <a:majorFont>
+        <a:latin typeface="等线 Light" panose="020F0302020204030204"/>
+        <a:ea typeface=""/>
+        <a:cs typeface=""/>
+        <a:font script="Jpan" typeface="游ゴシック Light"/>
+        <a:font script="Hang" typeface="맑은 고딕"/>
+        <a:font script="Hans" typeface="等线 Light"/>
+        <a:font script="Hant" typeface="新細明體"/>
+        <a:font script="Arab" typeface="Times New Roman"/>
+        <a:font script="Hebr" typeface="Times New Roman"/>
+        <a:font script="Thai" typeface="Angsana New"/>
+        <a:font script="Ethi" typeface="Nyala"/>
+        <a:font script="Beng" typeface="Vrinda"/>
+        <a:font script="Gujr" typeface="Shruti"/>
+        <a:font script="Khmr" typeface="MoolBoran"/>
+        <a:font script="Knda" typeface="Tunga"/>
+        <a:font script="Guru" typeface="Raavi"/>
+        <a:font script="Cans" typeface="Euphemia"/>
+        <a:font script="Cher" typeface="Plantagenet Cherokee"/>
+        <a:font script="Yiii" typeface="Microsoft Yi Baiti"/>
+        <a:font script="Tibt" typeface="Microsoft Himalaya"/>
+        <a:font script="Thaa" typeface="MV Boli"/>
+        <a:font script="Deva" typeface="Mangal"/>
+        <a:font script="Telu" typeface="Gautami"/>
+        <a:font script="Taml" typeface="Latha"/>
+        <a:font script="Syrc" typeface="Estrangelo Edessa"/>
+        <a:font script="Orya" typeface="Kalinga"/>
+        <a:font script="Mlym" typeface="Kartika"/>
+        <a:font script="Laoo" typeface="DokChampa"/>
+        <a:font script="Sinh" typeface="Iskoola Pota"/>
+        <a:font script="Mong" typeface="Mongolian Baiti"/>
+        <a:font script="Viet" typeface="Times New Roman"/>
+        <a:font script="Uigh" typeface="Microsoft Uighur"/>
+        <a:font script="Geor" typeface="Sylfaen"/>
+        <a:font script="Armn" typeface="Arial"/>
+        <a:font script="Bugi" typeface="Leelawadee UI"/>
+        <a:font script="Bopo" typeface="Microsoft JhengHei"/>
+        <a:font script="Java" typeface="Javanese Text"/>
+        <a:font script="Lisu" typeface="Segoe UI"/>
+        <a:font script="Mymr" typeface="Myanmar Text"/>
+        <a:font script="Nkoo" typeface="Ebrima"/>
+        <a:font script="Olck" typeface="Nirmala UI"/>
+        <a:font script="Osma" typeface="Ebrima"/>
+        <a:font script="Phag" typeface="Phagspa"/>
+        <a:font script="Syrn" typeface="Estrangelo Edessa"/>
+        <a:font script="Syrj" typeface="Estrangelo Edessa"/>
+        <a:font script="Syre" typeface="Estrangelo Edessa"/>
+        <a:font script="Sora" typeface="Nirmala UI"/>
+        <a:font script="Tale" typeface="Microsoft Tai Le"/>
+        <a:font script="Talu" typeface="Microsoft New Tai Lue"/>
+        <a:font script="Tfng" typeface="Ebrima"/>
+      </a:majorFont>
+      <a:minorFont>
+        <a:latin typeface="等线" panose="020F0502020204030204"/>
+        <a:ea typeface=""/>
+        <a:cs typeface=""/>
+        <a:font script="Jpan" typeface="游ゴシック"/>
+        <a:font script="Hang" typeface="맑은 고딕"/>
+        <a:font script="Hans" typeface="等线"/>
+        <a:font script="Hant" typeface="新細明體"/>
+        <a:font script="Arab" typeface="Arial"/>
+        <a:font script="Hebr" typeface="Arial"/>
+        <a:font script="Thai" typeface="Cordia New"/>
+        <a:font script="Ethi" typeface="Nyala"/>
+        <a:font script="Beng" typeface="Vrinda"/>
+        <a:font script="Gujr" typeface="Shruti"/>
+        <a:font script="Khmr" typeface="DaunPenh"/>
+        <a:font script="Knda" typeface="Tunga"/>
+        <a:font script="Guru" typeface="Raavi"/>
+        <a:font script="Cans" typeface="Euphemia"/>
+        <a:font script="Cher" typeface="Plantagenet Cherokee"/>
+        <a:font script="Yiii" typeface="Microsoft Yi Baiti"/>
+        <a:font script="Tibt" typeface="Microsoft Himalaya"/>
+        <a:font script="Thaa" typeface="MV Boli"/>
+        <a:font script="Deva" typeface="Mangal"/>
+        <a:font script="Telu" typeface="Gautami"/>
+        <a:font script="Taml" typeface="Latha"/>
+        <a:font script="Syrc" typeface="Estrangelo Edessa"/>
+        <a:font script="Orya" typeface="Kalinga"/>
+        <a:font script="Mlym" typeface="Kartika"/>
+        <a:font script="Laoo" typeface="DokChampa"/>
+        <a:font script="Sinh" typeface="Iskoola Pota"/>
+        <a:font script="Mong" typeface="Mongolian Baiti"/>
+        <a:font script="Viet" typeface="Arial"/>
+        <a:font script="Uigh" typeface="Microsoft Uighur"/>
+        <a:font script="Geor" typeface="Sylfaen"/>
+        <a:font script="Armn" typeface="Arial"/>
+        <a:font script="Bugi" typeface="Leelawadee UI"/>
+        <a:font script="Bopo" typeface="Microsoft JhengHei"/>
+        <a:font script="Java" typeface="Javanese Text"/>
+        <a:font script="Lisu" typeface="Segoe UI"/>
+        <a:font script="Mymr" typeface="Myanmar Text"/>
+        <a:font script="Nkoo" typeface="Ebrima"/>
+        <a:font script="Olck" typeface="Nirmala UI"/>
+        <a:font script="Osma" typeface="Ebrima"/>
+        <a:font script="Phag" typeface="Phagspa"/>
+        <a:font script="Syrn" typeface="Estrangelo Edessa"/>
+        <a:font script="Syrj" typeface="Estrangelo Edessa"/>
+        <a:font script="Syre" typeface="Estrangelo Edessa"/>
+        <a:font script="Sora" typeface="Nirmala UI"/>
+        <a:font script="Tale" typeface="Microsoft Tai Le"/>
+        <a:font script="Talu" typeface="Microsoft New Tai Lue"/>
+        <a:font script="Tfng" typeface="Ebrima"/>
+      </a:minorFont>
+    </a:fontScheme>
+    <a:fmtScheme name="Office">
+      <a:fillStyleLst>
+        <a:solidFill>
+          <a:schemeClr val="phClr"/>
+        </a:solidFill>
+        <a:gradFill rotWithShape="1">
+          <a:gsLst>
+            <a:gs pos="0">
+              <a:schemeClr val="phClr">
+                <a:lumMod val="110000"/>
+                <a:satMod val="105000"/>
+                <a:tint val="67000"/>
+              </a:schemeClr>
+            </a:gs>
+            <a:gs pos="50000">
+              <a:schemeClr val="phClr">
+                <a:lumMod val="105000"/>
+                <a:satMod val="103000"/>
+                <a:tint val="73000"/>
+              </a:schemeClr>
+            </a:gs>
+            <a:gs pos="100000">
+              <a:schemeClr val="phClr">
+                <a:lumMod val="105000"/>
+                <a:satMod val="109000"/>
+                <a:tint val="81000"/>
+              </a:schemeClr>
+            </a:gs>
+          </a:gsLst>
+          <a:lin ang="5400000" scaled="0"/>
+        </a:gradFill>
+        <a:gradFill rotWithShape="1">
+          <a:gsLst>
+            <a:gs pos="0">
+              <a:schemeClr val="phClr">
+                <a:satMod val="103000"/>
+                <a:lumMod val="102000"/>
+                <a:tint val="94000"/>
+              </a:schemeClr>
+            </a:gs>
+            <a:gs pos="50000">
+              <a:schemeClr val="phClr">
+                <a:satMod val="110000"/>
+                <a:lumMod val="100000"/>
+                <a:shade val="100000"/>
+              </a:schemeClr>
+            </a:gs>
+            <a:gs pos="100000">
+              <a:schemeClr val="phClr">
+                <a:lumMod val="99000"/>
+                <a:satMod val="120000"/>
+                <a:shade val="78000"/>
+              </a:schemeClr>
+            </a:gs>
+          </a:gsLst>
+          <a:lin ang="5400000" scaled="0"/>
+        </a:gradFill>
+      </a:fillStyleLst>
+      <a:lnStyleLst>
+        <a:ln w="6350" cap="flat" cmpd="sng" algn="ctr">
+          <a:solidFill>
+            <a:schemeClr val="phClr"/>
+          </a:solidFill>
+          <a:prstDash val="solid"/>
+          <a:miter lim="800000"/>
+        </a:ln>
+        <a:ln w="12700" cap="flat" cmpd="sng" algn="ctr">
+          <a:solidFill>
+            <a:schemeClr val="phClr"/>
+          </a:solidFill>
+          <a:prstDash val="solid"/>
+          <a:miter lim="800000"/>
+        </a:ln>
+        <a:ln w="19050" cap="flat" cmpd="sng" algn="ctr">
+          <a:solidFill>
+            <a:schemeClr val="phClr"/>
+          </a:solidFill>
+          <a:prstDash val="solid"/>
+          <a:miter lim="800000"/>
+        </a:ln>
+      </a:lnStyleLst>
+      <a:effectStyleLst>
+        <a:effectStyle>
+          <a:effectLst/>
+        </a:effectStyle>
+        <a:effectStyle>
+          <a:effectLst/>
+        </a:effectStyle>
+        <a:effectStyle>
+          <a:effectLst>
+            <a:outerShdw blurRad="57150" dist="19050" dir="5400000" algn="ctr" rotWithShape="0">
+              <a:srgbClr val="000000">
+                <a:alpha val="63000"/>
+              </a:srgbClr>
+            </a:outerShdw>
+          </a:effectLst>
+        </a:effectStyle>
+      </a:effectStyleLst>
+      <a:bgFillStyleLst>
+        <a:solidFill>
+          <a:schemeClr val="phClr"/>
+        </a:solidFill>
+        <a:solidFill>
+          <a:schemeClr val="phClr">
+            <a:tint val="95000"/>
+            <a:satMod val="170000"/>
+          </a:schemeClr>
+        </a:solidFill>
+        <a:gradFill rotWithShape="1">
+          <a:gsLst>
+            <a:gs pos="0">
+              <a:schemeClr val="phClr">
+                <a:tint val="93000"/>
+                <a:satMod val="150000"/>
+                <a:shade val="98000"/>
+                <a:lumMod val="102000"/>
+              </a:schemeClr>
+            </a:gs>
+            <a:gs pos="50000">
+              <a:schemeClr val="phClr">
+                <a:tint val="98000"/>
+                <a:satMod val="130000"/>
+                <a:shade val="90000"/>
+                <a:lumMod val="103000"/>
+              </a:schemeClr>
+            </a:gs>
+            <a:gs pos="100000">
+              <a:schemeClr val="phClr">
+                <a:shade val="63000"/>
+                <a:satMod val="120000"/>
+              </a:schemeClr>
+            </a:gs>
+          </a:gsLst>
+          <a:lin ang="5400000" scaled="0"/>
+        </a:gradFill>
+      </a:bgFillStyleLst>
+    </a:fmtScheme>
+  </a:themeElements>
+  <a:objectDefaults/>
+  <a:extraClrSchemeLst/>
+  <a:extLst>
+    <a:ext uri="{05A4C25C-085E-4340-85A3-A5531E510DB2}">
+      <thm15:themeFamily xmlns:thm15="http://schemas.microsoft.com/office/thememl/2012/main" name="Office Theme" id="{62F939B6-93AF-4DB8-9C6B-D6C7DFDC589F}" vid="{4A3C46E8-61CC-4603-A589-7422A47A8E4A}"/>
+    </a:ext>
+  </a:extLst>
+</a:theme>
 </file>
</xml_diff>